<commit_message>
updated ppt with summary and contact info slides
</commit_message>
<xml_diff>
--- a/DDS_Project_2_Presentation.pptx
+++ b/DDS_Project_2_Presentation.pptx
@@ -23,6 +23,8 @@
     <p:sldId id="284" r:id="rId17"/>
     <p:sldId id="290" r:id="rId18"/>
     <p:sldId id="287" r:id="rId19"/>
+    <p:sldId id="304" r:id="rId20"/>
+    <p:sldId id="305" r:id="rId21"/>
   </p:sldIdLst>
   <p:sldSz cx="12192000" cy="6858000"/>
   <p:notesSz cx="6858000" cy="9144000"/>
@@ -142,7 +144,7 @@
   <pc:docChgLst>
     <pc:chgData name="Pandey, Shikha" userId="62b2c247-44c0-476d-a294-f01c5623c9dc" providerId="ADAL" clId="{F72F3FB8-19C0-4758-9009-50FF7556B545}"/>
     <pc:docChg chg="undo redo custSel addSld delSld modSld sldOrd">
-      <pc:chgData name="Pandey, Shikha" userId="62b2c247-44c0-476d-a294-f01c5623c9dc" providerId="ADAL" clId="{F72F3FB8-19C0-4758-9009-50FF7556B545}" dt="2021-12-09T03:33:19.809" v="1346" actId="20577"/>
+      <pc:chgData name="Pandey, Shikha" userId="62b2c247-44c0-476d-a294-f01c5623c9dc" providerId="ADAL" clId="{F72F3FB8-19C0-4758-9009-50FF7556B545}" dt="2021-12-09T04:59:14.130" v="1375" actId="20577"/>
       <pc:docMkLst>
         <pc:docMk/>
       </pc:docMkLst>
@@ -1660,6 +1662,44 @@
           <pc:docMk/>
           <pc:sldMk cId="776828111" sldId="284"/>
         </pc:sldMkLst>
+      </pc:sldChg>
+      <pc:sldChg chg="delSp modSp add mod">
+        <pc:chgData name="Pandey, Shikha" userId="62b2c247-44c0-476d-a294-f01c5623c9dc" providerId="ADAL" clId="{F72F3FB8-19C0-4758-9009-50FF7556B545}" dt="2021-12-09T04:58:50.666" v="1355" actId="20577"/>
+        <pc:sldMkLst>
+          <pc:docMk/>
+          <pc:sldMk cId="2642334168" sldId="304"/>
+        </pc:sldMkLst>
+        <pc:spChg chg="mod">
+          <ac:chgData name="Pandey, Shikha" userId="62b2c247-44c0-476d-a294-f01c5623c9dc" providerId="ADAL" clId="{F72F3FB8-19C0-4758-9009-50FF7556B545}" dt="2021-12-09T04:58:50.666" v="1355" actId="20577"/>
+          <ac:spMkLst>
+            <pc:docMk/>
+            <pc:sldMk cId="2642334168" sldId="304"/>
+            <ac:spMk id="9" creationId="{DF4B9AD8-E4FC-FA40-8BCA-CF0480A9D206}"/>
+          </ac:spMkLst>
+        </pc:spChg>
+        <pc:picChg chg="del">
+          <ac:chgData name="Pandey, Shikha" userId="62b2c247-44c0-476d-a294-f01c5623c9dc" providerId="ADAL" clId="{F72F3FB8-19C0-4758-9009-50FF7556B545}" dt="2021-12-09T04:58:46.291" v="1348" actId="478"/>
+          <ac:picMkLst>
+            <pc:docMk/>
+            <pc:sldMk cId="2642334168" sldId="304"/>
+            <ac:picMk id="10" creationId="{D38BDAFC-61F8-9F41-B91A-A4FA9226E751}"/>
+          </ac:picMkLst>
+        </pc:picChg>
+      </pc:sldChg>
+      <pc:sldChg chg="modSp add mod">
+        <pc:chgData name="Pandey, Shikha" userId="62b2c247-44c0-476d-a294-f01c5623c9dc" providerId="ADAL" clId="{F72F3FB8-19C0-4758-9009-50FF7556B545}" dt="2021-12-09T04:59:14.130" v="1375" actId="20577"/>
+        <pc:sldMkLst>
+          <pc:docMk/>
+          <pc:sldMk cId="658250400" sldId="305"/>
+        </pc:sldMkLst>
+        <pc:spChg chg="mod">
+          <ac:chgData name="Pandey, Shikha" userId="62b2c247-44c0-476d-a294-f01c5623c9dc" providerId="ADAL" clId="{F72F3FB8-19C0-4758-9009-50FF7556B545}" dt="2021-12-09T04:59:14.130" v="1375" actId="20577"/>
+          <ac:spMkLst>
+            <pc:docMk/>
+            <pc:sldMk cId="658250400" sldId="305"/>
+            <ac:spMk id="9" creationId="{DF4B9AD8-E4FC-FA40-8BCA-CF0480A9D206}"/>
+          </ac:spMkLst>
+        </pc:spChg>
       </pc:sldChg>
     </pc:docChg>
   </pc:docChgLst>
@@ -1797,7 +1837,7 @@
           <a:p>
             <a:fld id="{23FEA57E-7C1A-457B-A4CD-5DCEB057B502}" type="datetime1">
               <a:rPr lang="en-US" smtClean="0"/>
-              <a:t>12/8/21</a:t>
+              <a:t>12/8/2021</a:t>
             </a:fld>
             <a:endParaRPr lang="en-US" dirty="0"/>
           </a:p>
@@ -1971,7 +2011,7 @@
           <a:p>
             <a:fld id="{11789749-A4CD-447F-8298-2B7988C91CEA}" type="datetime1">
               <a:rPr lang="en-US" smtClean="0"/>
-              <a:t>12/8/21</a:t>
+              <a:t>12/8/2021</a:t>
             </a:fld>
             <a:endParaRPr lang="en-US"/>
           </a:p>
@@ -2155,7 +2195,7 @@
           <a:p>
             <a:fld id="{BA0444D3-C0BA-4587-A56C-581AB9F841BE}" type="datetime1">
               <a:rPr lang="en-US" smtClean="0"/>
-              <a:t>12/8/21</a:t>
+              <a:t>12/8/2021</a:t>
             </a:fld>
             <a:endParaRPr lang="en-US"/>
           </a:p>
@@ -2328,7 +2368,7 @@
           <a:p>
             <a:fld id="{201AF2CE-4F37-411C-A3EE-BBBE223265BF}" type="datetime1">
               <a:rPr lang="en-US" smtClean="0"/>
-              <a:t>12/8/21</a:t>
+              <a:t>12/8/2021</a:t>
             </a:fld>
             <a:endParaRPr lang="en-US"/>
           </a:p>
@@ -2577,7 +2617,7 @@
           <a:p>
             <a:fld id="{C96083D4-708C-4BB5-B4FD-30CE9FA12FD5}" type="datetime1">
               <a:rPr lang="en-US" smtClean="0"/>
-              <a:t>12/8/21</a:t>
+              <a:t>12/8/2021</a:t>
             </a:fld>
             <a:endParaRPr lang="en-US"/>
           </a:p>
@@ -2813,7 +2853,7 @@
           <a:p>
             <a:fld id="{D0D239B2-65BC-4C2A-A62B-3EABFE9590E4}" type="datetime1">
               <a:rPr lang="en-US" smtClean="0"/>
-              <a:t>12/8/21</a:t>
+              <a:t>12/8/2021</a:t>
             </a:fld>
             <a:endParaRPr lang="en-US"/>
           </a:p>
@@ -3183,7 +3223,7 @@
           <a:p>
             <a:fld id="{85E05F5A-E4A3-476F-A89E-C2B73F2431E4}" type="datetime1">
               <a:rPr lang="en-US" smtClean="0"/>
-              <a:t>12/8/21</a:t>
+              <a:t>12/8/2021</a:t>
             </a:fld>
             <a:endParaRPr lang="en-US"/>
           </a:p>
@@ -3304,7 +3344,7 @@
           <a:p>
             <a:fld id="{E3761515-4A26-4F31-9F61-5A10B1FABBFC}" type="datetime1">
               <a:rPr lang="en-US" smtClean="0"/>
-              <a:t>12/8/21</a:t>
+              <a:t>12/8/2021</a:t>
             </a:fld>
             <a:endParaRPr lang="en-US"/>
           </a:p>
@@ -3402,7 +3442,7 @@
           <a:p>
             <a:fld id="{4A75DC65-7D1F-4BAB-9695-F7E734143E14}" type="datetime1">
               <a:rPr lang="en-US" smtClean="0"/>
-              <a:t>12/8/21</a:t>
+              <a:t>12/8/2021</a:t>
             </a:fld>
             <a:endParaRPr lang="en-US"/>
           </a:p>
@@ -3682,7 +3722,7 @@
           <a:p>
             <a:fld id="{7E624077-BD55-4036-8E92-6558FDF3B653}" type="datetime1">
               <a:rPr lang="en-US" smtClean="0"/>
-              <a:t>12/8/21</a:t>
+              <a:t>12/8/2021</a:t>
             </a:fld>
             <a:endParaRPr lang="en-US"/>
           </a:p>
@@ -3942,7 +3982,7 @@
           <a:p>
             <a:fld id="{804225F2-7107-4609-BCC2-77C63064A5E8}" type="datetime1">
               <a:rPr lang="en-US" smtClean="0"/>
-              <a:t>12/8/21</a:t>
+              <a:t>12/8/2021</a:t>
             </a:fld>
             <a:endParaRPr lang="en-US"/>
           </a:p>
@@ -4158,7 +4198,7 @@
           <a:p>
             <a:fld id="{D3FE42E8-8B57-452D-A122-4DCE9AC771EF}" type="datetime1">
               <a:rPr lang="en-US" smtClean="0"/>
-              <a:t>12/8/21</a:t>
+              <a:t>12/8/2021</a:t>
             </a:fld>
             <a:endParaRPr lang="en-US"/>
           </a:p>
@@ -9888,6 +9928,294 @@
 </p:sld>
 </file>
 
+<file path=ppt/slides/slide19.xml><?xml version="1.0" encoding="utf-8"?>
+<p:sld xmlns:a="http://schemas.openxmlformats.org/drawingml/2006/main" xmlns:r="http://schemas.openxmlformats.org/officeDocument/2006/relationships" xmlns:p="http://schemas.openxmlformats.org/presentationml/2006/main">
+  <p:cSld>
+    <p:spTree>
+      <p:nvGrpSpPr>
+        <p:cNvPr id="1" name=""/>
+        <p:cNvGrpSpPr/>
+        <p:nvPr/>
+      </p:nvGrpSpPr>
+      <p:grpSpPr>
+        <a:xfrm>
+          <a:off x="0" y="0"/>
+          <a:ext cx="0" cy="0"/>
+          <a:chOff x="0" y="0"/>
+          <a:chExt cx="0" cy="0"/>
+        </a:xfrm>
+      </p:grpSpPr>
+      <p:sp>
+        <p:nvSpPr>
+          <p:cNvPr id="5" name="Right Triangle 4">
+            <a:extLst>
+              <a:ext uri="{FF2B5EF4-FFF2-40B4-BE49-F238E27FC236}">
+                <a16:creationId xmlns:a16="http://schemas.microsoft.com/office/drawing/2014/main" id="{5488A745-4D79-6747-B65A-803B31C1F8B4}"/>
+              </a:ext>
+            </a:extLst>
+          </p:cNvPr>
+          <p:cNvSpPr/>
+          <p:nvPr/>
+        </p:nvSpPr>
+        <p:spPr>
+          <a:xfrm rot="13068536">
+            <a:off x="-809065" y="4275183"/>
+            <a:ext cx="1600200" cy="2061882"/>
+          </a:xfrm>
+          <a:prstGeom prst="rtTriangle">
+            <a:avLst/>
+          </a:prstGeom>
+          <a:solidFill>
+            <a:srgbClr val="44E4C4"/>
+          </a:solidFill>
+          <a:ln>
+            <a:solidFill>
+              <a:srgbClr val="44E4C4"/>
+            </a:solidFill>
+          </a:ln>
+        </p:spPr>
+        <p:style>
+          <a:lnRef idx="2">
+            <a:schemeClr val="accent1">
+              <a:shade val="50000"/>
+            </a:schemeClr>
+          </a:lnRef>
+          <a:fillRef idx="1">
+            <a:schemeClr val="accent1"/>
+          </a:fillRef>
+          <a:effectRef idx="0">
+            <a:schemeClr val="accent1"/>
+          </a:effectRef>
+          <a:fontRef idx="minor">
+            <a:schemeClr val="lt1"/>
+          </a:fontRef>
+        </p:style>
+        <p:txBody>
+          <a:bodyPr rtlCol="0" anchor="ctr"/>
+          <a:lstStyle/>
+          <a:p>
+            <a:pPr algn="ctr"/>
+            <a:endParaRPr lang="en-US"/>
+          </a:p>
+        </p:txBody>
+      </p:sp>
+      <p:sp>
+        <p:nvSpPr>
+          <p:cNvPr id="6" name="Rectangle 5">
+            <a:extLst>
+              <a:ext uri="{FF2B5EF4-FFF2-40B4-BE49-F238E27FC236}">
+                <a16:creationId xmlns:a16="http://schemas.microsoft.com/office/drawing/2014/main" id="{67C63295-B221-9A4E-BA44-2C4B26CF7FDE}"/>
+              </a:ext>
+            </a:extLst>
+          </p:cNvPr>
+          <p:cNvSpPr/>
+          <p:nvPr/>
+        </p:nvSpPr>
+        <p:spPr>
+          <a:xfrm rot="2351297">
+            <a:off x="281204" y="5024303"/>
+            <a:ext cx="880169" cy="978559"/>
+          </a:xfrm>
+          <a:prstGeom prst="rect">
+            <a:avLst/>
+          </a:prstGeom>
+          <a:solidFill>
+            <a:srgbClr val="2E27C7">
+              <a:alpha val="80000"/>
+            </a:srgbClr>
+          </a:solidFill>
+        </p:spPr>
+        <p:style>
+          <a:lnRef idx="2">
+            <a:schemeClr val="accent1">
+              <a:shade val="50000"/>
+            </a:schemeClr>
+          </a:lnRef>
+          <a:fillRef idx="1">
+            <a:schemeClr val="accent1"/>
+          </a:fillRef>
+          <a:effectRef idx="0">
+            <a:schemeClr val="accent1"/>
+          </a:effectRef>
+          <a:fontRef idx="minor">
+            <a:schemeClr val="lt1"/>
+          </a:fontRef>
+        </p:style>
+        <p:txBody>
+          <a:bodyPr rtlCol="0" anchor="ctr"/>
+          <a:lstStyle/>
+          <a:p>
+            <a:pPr algn="ctr"/>
+            <a:endParaRPr lang="en-US"/>
+          </a:p>
+        </p:txBody>
+      </p:sp>
+      <p:sp>
+        <p:nvSpPr>
+          <p:cNvPr id="7" name="Right Triangle 6">
+            <a:extLst>
+              <a:ext uri="{FF2B5EF4-FFF2-40B4-BE49-F238E27FC236}">
+                <a16:creationId xmlns:a16="http://schemas.microsoft.com/office/drawing/2014/main" id="{E9A9D123-E73C-5749-962A-D162E22D504C}"/>
+              </a:ext>
+            </a:extLst>
+          </p:cNvPr>
+          <p:cNvSpPr/>
+          <p:nvPr/>
+        </p:nvSpPr>
+        <p:spPr>
+          <a:xfrm rot="2259401">
+            <a:off x="11399428" y="428828"/>
+            <a:ext cx="1600200" cy="2066544"/>
+          </a:xfrm>
+          <a:prstGeom prst="rtTriangle">
+            <a:avLst/>
+          </a:prstGeom>
+          <a:solidFill>
+            <a:srgbClr val="2E27C7"/>
+          </a:solidFill>
+          <a:ln>
+            <a:solidFill>
+              <a:srgbClr val="2E27C7"/>
+            </a:solidFill>
+          </a:ln>
+        </p:spPr>
+        <p:style>
+          <a:lnRef idx="2">
+            <a:schemeClr val="accent1">
+              <a:shade val="50000"/>
+            </a:schemeClr>
+          </a:lnRef>
+          <a:fillRef idx="1">
+            <a:schemeClr val="accent1"/>
+          </a:fillRef>
+          <a:effectRef idx="0">
+            <a:schemeClr val="accent1"/>
+          </a:effectRef>
+          <a:fontRef idx="minor">
+            <a:schemeClr val="lt1"/>
+          </a:fontRef>
+        </p:style>
+        <p:txBody>
+          <a:bodyPr rtlCol="0" anchor="ctr"/>
+          <a:lstStyle/>
+          <a:p>
+            <a:pPr algn="ctr"/>
+            <a:endParaRPr lang="en-US"/>
+          </a:p>
+        </p:txBody>
+      </p:sp>
+      <p:sp>
+        <p:nvSpPr>
+          <p:cNvPr id="8" name="Rectangle 7">
+            <a:extLst>
+              <a:ext uri="{FF2B5EF4-FFF2-40B4-BE49-F238E27FC236}">
+                <a16:creationId xmlns:a16="http://schemas.microsoft.com/office/drawing/2014/main" id="{523C82C0-70C3-B347-A9AA-B75D37C19777}"/>
+              </a:ext>
+            </a:extLst>
+          </p:cNvPr>
+          <p:cNvSpPr/>
+          <p:nvPr/>
+        </p:nvSpPr>
+        <p:spPr>
+          <a:xfrm rot="13164033">
+            <a:off x="11030256" y="1657834"/>
+            <a:ext cx="880169" cy="978559"/>
+          </a:xfrm>
+          <a:prstGeom prst="rect">
+            <a:avLst/>
+          </a:prstGeom>
+          <a:solidFill>
+            <a:srgbClr val="44E4C4">
+              <a:alpha val="80000"/>
+            </a:srgbClr>
+          </a:solidFill>
+          <a:ln>
+            <a:solidFill>
+              <a:srgbClr val="44E4C4"/>
+            </a:solidFill>
+          </a:ln>
+        </p:spPr>
+        <p:style>
+          <a:lnRef idx="2">
+            <a:schemeClr val="accent1">
+              <a:shade val="50000"/>
+            </a:schemeClr>
+          </a:lnRef>
+          <a:fillRef idx="1">
+            <a:schemeClr val="accent1"/>
+          </a:fillRef>
+          <a:effectRef idx="0">
+            <a:schemeClr val="accent1"/>
+          </a:effectRef>
+          <a:fontRef idx="minor">
+            <a:schemeClr val="lt1"/>
+          </a:fontRef>
+        </p:style>
+        <p:txBody>
+          <a:bodyPr rtlCol="0" anchor="ctr"/>
+          <a:lstStyle/>
+          <a:p>
+            <a:pPr algn="ctr"/>
+            <a:endParaRPr lang="en-US"/>
+          </a:p>
+        </p:txBody>
+      </p:sp>
+      <p:sp>
+        <p:nvSpPr>
+          <p:cNvPr id="9" name="Title 1">
+            <a:extLst>
+              <a:ext uri="{FF2B5EF4-FFF2-40B4-BE49-F238E27FC236}">
+                <a16:creationId xmlns:a16="http://schemas.microsoft.com/office/drawing/2014/main" id="{DF4B9AD8-E4FC-FA40-8BCA-CF0480A9D206}"/>
+              </a:ext>
+            </a:extLst>
+          </p:cNvPr>
+          <p:cNvSpPr>
+            <a:spLocks noGrp="1"/>
+          </p:cNvSpPr>
+          <p:nvPr>
+            <p:ph type="title"/>
+          </p:nvPr>
+        </p:nvSpPr>
+        <p:spPr>
+          <a:xfrm>
+            <a:off x="643467" y="321735"/>
+            <a:ext cx="10905066" cy="634806"/>
+          </a:xfrm>
+        </p:spPr>
+        <p:txBody>
+          <a:bodyPr>
+            <a:normAutofit/>
+          </a:bodyPr>
+          <a:lstStyle/>
+          <a:p>
+            <a:pPr algn="ctr"/>
+            <a:r>
+              <a:rPr lang="en-US" sz="3600" b="1" dirty="0">
+                <a:latin typeface="Calibri" panose="020F0502020204030204" pitchFamily="34" charset="0"/>
+                <a:cs typeface="Calibri" panose="020F0502020204030204" pitchFamily="34" charset="0"/>
+              </a:rPr>
+              <a:t>Summary</a:t>
+            </a:r>
+            <a:endParaRPr lang="en-US" sz="3600" b="1" cap="none" dirty="0">
+              <a:latin typeface="Calibri" panose="020F0502020204030204" pitchFamily="34" charset="0"/>
+              <a:cs typeface="Calibri" panose="020F0502020204030204" pitchFamily="34" charset="0"/>
+            </a:endParaRPr>
+          </a:p>
+        </p:txBody>
+      </p:sp>
+    </p:spTree>
+    <p:extLst>
+      <p:ext uri="{BB962C8B-B14F-4D97-AF65-F5344CB8AC3E}">
+        <p14:creationId xmlns:p14="http://schemas.microsoft.com/office/powerpoint/2010/main" val="2642334168"/>
+      </p:ext>
+    </p:extLst>
+  </p:cSld>
+  <p:clrMapOvr>
+    <a:masterClrMapping/>
+  </p:clrMapOvr>
+</p:sld>
+</file>
+
 <file path=ppt/slides/slide2.xml><?xml version="1.0" encoding="utf-8"?>
 <p:sld xmlns:a="http://schemas.openxmlformats.org/drawingml/2006/main" xmlns:r="http://schemas.openxmlformats.org/officeDocument/2006/relationships" xmlns:p="http://schemas.openxmlformats.org/presentationml/2006/main">
   <p:cSld>
@@ -10504,6 +10832,294 @@
       </p:par>
     </p:tnLst>
   </p:timing>
+</p:sld>
+</file>
+
+<file path=ppt/slides/slide20.xml><?xml version="1.0" encoding="utf-8"?>
+<p:sld xmlns:a="http://schemas.openxmlformats.org/drawingml/2006/main" xmlns:r="http://schemas.openxmlformats.org/officeDocument/2006/relationships" xmlns:p="http://schemas.openxmlformats.org/presentationml/2006/main">
+  <p:cSld>
+    <p:spTree>
+      <p:nvGrpSpPr>
+        <p:cNvPr id="1" name=""/>
+        <p:cNvGrpSpPr/>
+        <p:nvPr/>
+      </p:nvGrpSpPr>
+      <p:grpSpPr>
+        <a:xfrm>
+          <a:off x="0" y="0"/>
+          <a:ext cx="0" cy="0"/>
+          <a:chOff x="0" y="0"/>
+          <a:chExt cx="0" cy="0"/>
+        </a:xfrm>
+      </p:grpSpPr>
+      <p:sp>
+        <p:nvSpPr>
+          <p:cNvPr id="5" name="Right Triangle 4">
+            <a:extLst>
+              <a:ext uri="{FF2B5EF4-FFF2-40B4-BE49-F238E27FC236}">
+                <a16:creationId xmlns:a16="http://schemas.microsoft.com/office/drawing/2014/main" id="{5488A745-4D79-6747-B65A-803B31C1F8B4}"/>
+              </a:ext>
+            </a:extLst>
+          </p:cNvPr>
+          <p:cNvSpPr/>
+          <p:nvPr/>
+        </p:nvSpPr>
+        <p:spPr>
+          <a:xfrm rot="13068536">
+            <a:off x="-809065" y="4275183"/>
+            <a:ext cx="1600200" cy="2061882"/>
+          </a:xfrm>
+          <a:prstGeom prst="rtTriangle">
+            <a:avLst/>
+          </a:prstGeom>
+          <a:solidFill>
+            <a:srgbClr val="44E4C4"/>
+          </a:solidFill>
+          <a:ln>
+            <a:solidFill>
+              <a:srgbClr val="44E4C4"/>
+            </a:solidFill>
+          </a:ln>
+        </p:spPr>
+        <p:style>
+          <a:lnRef idx="2">
+            <a:schemeClr val="accent1">
+              <a:shade val="50000"/>
+            </a:schemeClr>
+          </a:lnRef>
+          <a:fillRef idx="1">
+            <a:schemeClr val="accent1"/>
+          </a:fillRef>
+          <a:effectRef idx="0">
+            <a:schemeClr val="accent1"/>
+          </a:effectRef>
+          <a:fontRef idx="minor">
+            <a:schemeClr val="lt1"/>
+          </a:fontRef>
+        </p:style>
+        <p:txBody>
+          <a:bodyPr rtlCol="0" anchor="ctr"/>
+          <a:lstStyle/>
+          <a:p>
+            <a:pPr algn="ctr"/>
+            <a:endParaRPr lang="en-US"/>
+          </a:p>
+        </p:txBody>
+      </p:sp>
+      <p:sp>
+        <p:nvSpPr>
+          <p:cNvPr id="6" name="Rectangle 5">
+            <a:extLst>
+              <a:ext uri="{FF2B5EF4-FFF2-40B4-BE49-F238E27FC236}">
+                <a16:creationId xmlns:a16="http://schemas.microsoft.com/office/drawing/2014/main" id="{67C63295-B221-9A4E-BA44-2C4B26CF7FDE}"/>
+              </a:ext>
+            </a:extLst>
+          </p:cNvPr>
+          <p:cNvSpPr/>
+          <p:nvPr/>
+        </p:nvSpPr>
+        <p:spPr>
+          <a:xfrm rot="2351297">
+            <a:off x="281204" y="5024303"/>
+            <a:ext cx="880169" cy="978559"/>
+          </a:xfrm>
+          <a:prstGeom prst="rect">
+            <a:avLst/>
+          </a:prstGeom>
+          <a:solidFill>
+            <a:srgbClr val="2E27C7">
+              <a:alpha val="80000"/>
+            </a:srgbClr>
+          </a:solidFill>
+        </p:spPr>
+        <p:style>
+          <a:lnRef idx="2">
+            <a:schemeClr val="accent1">
+              <a:shade val="50000"/>
+            </a:schemeClr>
+          </a:lnRef>
+          <a:fillRef idx="1">
+            <a:schemeClr val="accent1"/>
+          </a:fillRef>
+          <a:effectRef idx="0">
+            <a:schemeClr val="accent1"/>
+          </a:effectRef>
+          <a:fontRef idx="minor">
+            <a:schemeClr val="lt1"/>
+          </a:fontRef>
+        </p:style>
+        <p:txBody>
+          <a:bodyPr rtlCol="0" anchor="ctr"/>
+          <a:lstStyle/>
+          <a:p>
+            <a:pPr algn="ctr"/>
+            <a:endParaRPr lang="en-US"/>
+          </a:p>
+        </p:txBody>
+      </p:sp>
+      <p:sp>
+        <p:nvSpPr>
+          <p:cNvPr id="7" name="Right Triangle 6">
+            <a:extLst>
+              <a:ext uri="{FF2B5EF4-FFF2-40B4-BE49-F238E27FC236}">
+                <a16:creationId xmlns:a16="http://schemas.microsoft.com/office/drawing/2014/main" id="{E9A9D123-E73C-5749-962A-D162E22D504C}"/>
+              </a:ext>
+            </a:extLst>
+          </p:cNvPr>
+          <p:cNvSpPr/>
+          <p:nvPr/>
+        </p:nvSpPr>
+        <p:spPr>
+          <a:xfrm rot="2259401">
+            <a:off x="11399428" y="428828"/>
+            <a:ext cx="1600200" cy="2066544"/>
+          </a:xfrm>
+          <a:prstGeom prst="rtTriangle">
+            <a:avLst/>
+          </a:prstGeom>
+          <a:solidFill>
+            <a:srgbClr val="2E27C7"/>
+          </a:solidFill>
+          <a:ln>
+            <a:solidFill>
+              <a:srgbClr val="2E27C7"/>
+            </a:solidFill>
+          </a:ln>
+        </p:spPr>
+        <p:style>
+          <a:lnRef idx="2">
+            <a:schemeClr val="accent1">
+              <a:shade val="50000"/>
+            </a:schemeClr>
+          </a:lnRef>
+          <a:fillRef idx="1">
+            <a:schemeClr val="accent1"/>
+          </a:fillRef>
+          <a:effectRef idx="0">
+            <a:schemeClr val="accent1"/>
+          </a:effectRef>
+          <a:fontRef idx="minor">
+            <a:schemeClr val="lt1"/>
+          </a:fontRef>
+        </p:style>
+        <p:txBody>
+          <a:bodyPr rtlCol="0" anchor="ctr"/>
+          <a:lstStyle/>
+          <a:p>
+            <a:pPr algn="ctr"/>
+            <a:endParaRPr lang="en-US"/>
+          </a:p>
+        </p:txBody>
+      </p:sp>
+      <p:sp>
+        <p:nvSpPr>
+          <p:cNvPr id="8" name="Rectangle 7">
+            <a:extLst>
+              <a:ext uri="{FF2B5EF4-FFF2-40B4-BE49-F238E27FC236}">
+                <a16:creationId xmlns:a16="http://schemas.microsoft.com/office/drawing/2014/main" id="{523C82C0-70C3-B347-A9AA-B75D37C19777}"/>
+              </a:ext>
+            </a:extLst>
+          </p:cNvPr>
+          <p:cNvSpPr/>
+          <p:nvPr/>
+        </p:nvSpPr>
+        <p:spPr>
+          <a:xfrm rot="13164033">
+            <a:off x="11030256" y="1657834"/>
+            <a:ext cx="880169" cy="978559"/>
+          </a:xfrm>
+          <a:prstGeom prst="rect">
+            <a:avLst/>
+          </a:prstGeom>
+          <a:solidFill>
+            <a:srgbClr val="44E4C4">
+              <a:alpha val="80000"/>
+            </a:srgbClr>
+          </a:solidFill>
+          <a:ln>
+            <a:solidFill>
+              <a:srgbClr val="44E4C4"/>
+            </a:solidFill>
+          </a:ln>
+        </p:spPr>
+        <p:style>
+          <a:lnRef idx="2">
+            <a:schemeClr val="accent1">
+              <a:shade val="50000"/>
+            </a:schemeClr>
+          </a:lnRef>
+          <a:fillRef idx="1">
+            <a:schemeClr val="accent1"/>
+          </a:fillRef>
+          <a:effectRef idx="0">
+            <a:schemeClr val="accent1"/>
+          </a:effectRef>
+          <a:fontRef idx="minor">
+            <a:schemeClr val="lt1"/>
+          </a:fontRef>
+        </p:style>
+        <p:txBody>
+          <a:bodyPr rtlCol="0" anchor="ctr"/>
+          <a:lstStyle/>
+          <a:p>
+            <a:pPr algn="ctr"/>
+            <a:endParaRPr lang="en-US"/>
+          </a:p>
+        </p:txBody>
+      </p:sp>
+      <p:sp>
+        <p:nvSpPr>
+          <p:cNvPr id="9" name="Title 1">
+            <a:extLst>
+              <a:ext uri="{FF2B5EF4-FFF2-40B4-BE49-F238E27FC236}">
+                <a16:creationId xmlns:a16="http://schemas.microsoft.com/office/drawing/2014/main" id="{DF4B9AD8-E4FC-FA40-8BCA-CF0480A9D206}"/>
+              </a:ext>
+            </a:extLst>
+          </p:cNvPr>
+          <p:cNvSpPr>
+            <a:spLocks noGrp="1"/>
+          </p:cNvSpPr>
+          <p:nvPr>
+            <p:ph type="title"/>
+          </p:nvPr>
+        </p:nvSpPr>
+        <p:spPr>
+          <a:xfrm>
+            <a:off x="643467" y="321735"/>
+            <a:ext cx="10905066" cy="634806"/>
+          </a:xfrm>
+        </p:spPr>
+        <p:txBody>
+          <a:bodyPr>
+            <a:normAutofit/>
+          </a:bodyPr>
+          <a:lstStyle/>
+          <a:p>
+            <a:pPr algn="ctr"/>
+            <a:r>
+              <a:rPr lang="en-US" sz="3600" b="1" dirty="0">
+                <a:latin typeface="Calibri" panose="020F0502020204030204" pitchFamily="34" charset="0"/>
+                <a:cs typeface="Calibri" panose="020F0502020204030204" pitchFamily="34" charset="0"/>
+              </a:rPr>
+              <a:t>Contact Information</a:t>
+            </a:r>
+            <a:endParaRPr lang="en-US" sz="3600" b="1" cap="none" dirty="0">
+              <a:latin typeface="Calibri" panose="020F0502020204030204" pitchFamily="34" charset="0"/>
+              <a:cs typeface="Calibri" panose="020F0502020204030204" pitchFamily="34" charset="0"/>
+            </a:endParaRPr>
+          </a:p>
+        </p:txBody>
+      </p:sp>
+    </p:spTree>
+    <p:extLst>
+      <p:ext uri="{BB962C8B-B14F-4D97-AF65-F5344CB8AC3E}">
+        <p14:creationId xmlns:p14="http://schemas.microsoft.com/office/powerpoint/2010/main" val="658250400"/>
+      </p:ext>
+    </p:extLst>
+  </p:cSld>
+  <p:clrMapOvr>
+    <a:masterClrMapping/>
+  </p:clrMapOvr>
 </p:sld>
 </file>
 

</xml_diff>

<commit_message>
updated rmd and ppt
</commit_message>
<xml_diff>
--- a/DDS_Project_2_Presentation.pptx
+++ b/DDS_Project_2_Presentation.pptx
@@ -17,14 +17,16 @@
     <p:sldId id="302" r:id="rId11"/>
     <p:sldId id="293" r:id="rId12"/>
     <p:sldId id="292" r:id="rId13"/>
-    <p:sldId id="291" r:id="rId14"/>
-    <p:sldId id="285" r:id="rId15"/>
-    <p:sldId id="288" r:id="rId16"/>
+    <p:sldId id="285" r:id="rId14"/>
+    <p:sldId id="288" r:id="rId15"/>
+    <p:sldId id="306" r:id="rId16"/>
     <p:sldId id="284" r:id="rId17"/>
-    <p:sldId id="290" r:id="rId18"/>
-    <p:sldId id="287" r:id="rId19"/>
-    <p:sldId id="304" r:id="rId20"/>
-    <p:sldId id="305" r:id="rId21"/>
+    <p:sldId id="307" r:id="rId18"/>
+    <p:sldId id="290" r:id="rId19"/>
+    <p:sldId id="287" r:id="rId20"/>
+    <p:sldId id="304" r:id="rId21"/>
+    <p:sldId id="308" r:id="rId22"/>
+    <p:sldId id="309" r:id="rId23"/>
   </p:sldIdLst>
   <p:sldSz cx="12192000" cy="6858000"/>
   <p:notesSz cx="6858000" cy="9144000"/>
@@ -134,7 +136,7 @@
 <file path=ppt/revisionInfo.xml><?xml version="1.0" encoding="utf-8"?>
 <p1510:revInfo xmlns:a="http://schemas.openxmlformats.org/drawingml/2006/main" xmlns:r="http://schemas.openxmlformats.org/officeDocument/2006/relationships" xmlns:p1510="http://schemas.microsoft.com/office/powerpoint/2015/10/main">
   <p1510:revLst>
-    <p1510:client id="{F72F3FB8-19C0-4758-9009-50FF7556B545}" v="91" dt="2021-12-10T02:21:57.703"/>
+    <p1510:client id="{F72F3FB8-19C0-4758-9009-50FF7556B545}" v="678" dt="2021-12-11T04:16:25.889"/>
   </p1510:revLst>
 </p1510:revInfo>
 </file>
@@ -144,7 +146,7 @@
   <pc:docChgLst>
     <pc:chgData name="Pandey, Shikha" userId="62b2c247-44c0-476d-a294-f01c5623c9dc" providerId="ADAL" clId="{F72F3FB8-19C0-4758-9009-50FF7556B545}"/>
     <pc:docChg chg="undo redo custSel addSld delSld modSld sldOrd">
-      <pc:chgData name="Pandey, Shikha" userId="62b2c247-44c0-476d-a294-f01c5623c9dc" providerId="ADAL" clId="{F72F3FB8-19C0-4758-9009-50FF7556B545}" dt="2021-12-10T04:06:23.604" v="1654" actId="1076"/>
+      <pc:chgData name="Pandey, Shikha" userId="62b2c247-44c0-476d-a294-f01c5623c9dc" providerId="ADAL" clId="{F72F3FB8-19C0-4758-9009-50FF7556B545}" dt="2021-12-11T04:16:25.889" v="2592" actId="20577"/>
       <pc:docMkLst>
         <pc:docMk/>
       </pc:docMkLst>
@@ -1740,14 +1742,14 @@
           </ac:picMkLst>
         </pc:picChg>
       </pc:sldChg>
-      <pc:sldChg chg="addSp delSp modSp mod modAnim">
-        <pc:chgData name="Pandey, Shikha" userId="62b2c247-44c0-476d-a294-f01c5623c9dc" providerId="ADAL" clId="{F72F3FB8-19C0-4758-9009-50FF7556B545}" dt="2021-12-10T02:00:43.334" v="1502"/>
+      <pc:sldChg chg="addSp delSp modSp mod delAnim modAnim">
+        <pc:chgData name="Pandey, Shikha" userId="62b2c247-44c0-476d-a294-f01c5623c9dc" providerId="ADAL" clId="{F72F3FB8-19C0-4758-9009-50FF7556B545}" dt="2021-12-11T03:49:57.825" v="2128"/>
         <pc:sldMkLst>
           <pc:docMk/>
           <pc:sldMk cId="216170584" sldId="289"/>
         </pc:sldMkLst>
         <pc:spChg chg="add mod">
-          <ac:chgData name="Pandey, Shikha" userId="62b2c247-44c0-476d-a294-f01c5623c9dc" providerId="ADAL" clId="{F72F3FB8-19C0-4758-9009-50FF7556B545}" dt="2021-12-10T01:53:48.524" v="1460" actId="208"/>
+          <ac:chgData name="Pandey, Shikha" userId="62b2c247-44c0-476d-a294-f01c5623c9dc" providerId="ADAL" clId="{F72F3FB8-19C0-4758-9009-50FF7556B545}" dt="2021-12-11T03:49:40.644" v="2126" actId="14100"/>
           <ac:spMkLst>
             <pc:docMk/>
             <pc:sldMk cId="216170584" sldId="289"/>
@@ -1755,23 +1757,23 @@
           </ac:spMkLst>
         </pc:spChg>
         <pc:spChg chg="add del mod">
-          <ac:chgData name="Pandey, Shikha" userId="62b2c247-44c0-476d-a294-f01c5623c9dc" providerId="ADAL" clId="{F72F3FB8-19C0-4758-9009-50FF7556B545}" dt="2021-12-10T01:56:55.276" v="1483" actId="207"/>
+          <ac:chgData name="Pandey, Shikha" userId="62b2c247-44c0-476d-a294-f01c5623c9dc" providerId="ADAL" clId="{F72F3FB8-19C0-4758-9009-50FF7556B545}" dt="2021-12-11T03:49:26.120" v="2123" actId="14100"/>
           <ac:spMkLst>
             <pc:docMk/>
             <pc:sldMk cId="216170584" sldId="289"/>
             <ac:spMk id="4" creationId="{D9EEC7DF-EFE6-4C4E-8C0C-CB0E28717A0A}"/>
           </ac:spMkLst>
         </pc:spChg>
-        <pc:spChg chg="add mod">
-          <ac:chgData name="Pandey, Shikha" userId="62b2c247-44c0-476d-a294-f01c5623c9dc" providerId="ADAL" clId="{F72F3FB8-19C0-4758-9009-50FF7556B545}" dt="2021-12-10T01:58:24.386" v="1492" actId="208"/>
+        <pc:spChg chg="add del mod">
+          <ac:chgData name="Pandey, Shikha" userId="62b2c247-44c0-476d-a294-f01c5623c9dc" providerId="ADAL" clId="{F72F3FB8-19C0-4758-9009-50FF7556B545}" dt="2021-12-11T03:48:19.518" v="2105" actId="478"/>
           <ac:spMkLst>
             <pc:docMk/>
             <pc:sldMk cId="216170584" sldId="289"/>
             <ac:spMk id="9" creationId="{34F14F9C-B97D-4A30-803F-EA9600784317}"/>
           </ac:spMkLst>
         </pc:spChg>
-        <pc:spChg chg="add mod">
-          <ac:chgData name="Pandey, Shikha" userId="62b2c247-44c0-476d-a294-f01c5623c9dc" providerId="ADAL" clId="{F72F3FB8-19C0-4758-9009-50FF7556B545}" dt="2021-12-10T01:59:02.666" v="1498" actId="208"/>
+        <pc:spChg chg="add del mod">
+          <ac:chgData name="Pandey, Shikha" userId="62b2c247-44c0-476d-a294-f01c5623c9dc" providerId="ADAL" clId="{F72F3FB8-19C0-4758-9009-50FF7556B545}" dt="2021-12-11T03:48:23.939" v="2106" actId="478"/>
           <ac:spMkLst>
             <pc:docMk/>
             <pc:sldMk cId="216170584" sldId="289"/>
@@ -1786,9 +1788,25 @@
             <ac:picMk id="3" creationId="{AF94A468-6A8E-4554-8D0C-575A9A743FA7}"/>
           </ac:picMkLst>
         </pc:picChg>
+        <pc:picChg chg="add mod ord">
+          <ac:chgData name="Pandey, Shikha" userId="62b2c247-44c0-476d-a294-f01c5623c9dc" providerId="ADAL" clId="{F72F3FB8-19C0-4758-9009-50FF7556B545}" dt="2021-12-11T03:48:05.217" v="2102" actId="1076"/>
+          <ac:picMkLst>
+            <pc:docMk/>
+            <pc:sldMk cId="216170584" sldId="289"/>
+            <ac:picMk id="11" creationId="{E2C0D4C9-E479-48F1-A4D2-35AB3BA25D8D}"/>
+          </ac:picMkLst>
+        </pc:picChg>
+        <pc:picChg chg="del">
+          <ac:chgData name="Pandey, Shikha" userId="62b2c247-44c0-476d-a294-f01c5623c9dc" providerId="ADAL" clId="{F72F3FB8-19C0-4758-9009-50FF7556B545}" dt="2021-12-11T03:47:48.458" v="2097" actId="478"/>
+          <ac:picMkLst>
+            <pc:docMk/>
+            <pc:sldMk cId="216170584" sldId="289"/>
+            <ac:picMk id="17" creationId="{A1F69826-2388-A34C-BA65-A5D02C5B373D}"/>
+          </ac:picMkLst>
+        </pc:picChg>
       </pc:sldChg>
-      <pc:sldChg chg="mod modShow">
-        <pc:chgData name="Pandey, Shikha" userId="62b2c247-44c0-476d-a294-f01c5623c9dc" providerId="ADAL" clId="{F72F3FB8-19C0-4758-9009-50FF7556B545}" dt="2021-12-10T03:27:13.379" v="1596" actId="729"/>
+      <pc:sldChg chg="del mod modShow">
+        <pc:chgData name="Pandey, Shikha" userId="62b2c247-44c0-476d-a294-f01c5623c9dc" providerId="ADAL" clId="{F72F3FB8-19C0-4758-9009-50FF7556B545}" dt="2021-12-11T04:13:31.037" v="2579" actId="2696"/>
         <pc:sldMkLst>
           <pc:docMk/>
           <pc:sldMk cId="95992096" sldId="291"/>
@@ -1918,12 +1936,20 @@
           </ac:spMkLst>
         </pc:spChg>
       </pc:sldChg>
-      <pc:sldChg chg="delSp modSp add mod">
-        <pc:chgData name="Pandey, Shikha" userId="62b2c247-44c0-476d-a294-f01c5623c9dc" providerId="ADAL" clId="{F72F3FB8-19C0-4758-9009-50FF7556B545}" dt="2021-12-09T04:58:50.666" v="1355" actId="20577"/>
+      <pc:sldChg chg="addSp delSp modSp add mod modAnim">
+        <pc:chgData name="Pandey, Shikha" userId="62b2c247-44c0-476d-a294-f01c5623c9dc" providerId="ADAL" clId="{F72F3FB8-19C0-4758-9009-50FF7556B545}" dt="2021-12-11T04:07:03.857" v="2426" actId="5793"/>
         <pc:sldMkLst>
           <pc:docMk/>
           <pc:sldMk cId="2642334168" sldId="304"/>
         </pc:sldMkLst>
+        <pc:spChg chg="add del mod">
+          <ac:chgData name="Pandey, Shikha" userId="62b2c247-44c0-476d-a294-f01c5623c9dc" providerId="ADAL" clId="{F72F3FB8-19C0-4758-9009-50FF7556B545}" dt="2021-12-11T02:21:54.519" v="1759"/>
+          <ac:spMkLst>
+            <pc:docMk/>
+            <pc:sldMk cId="2642334168" sldId="304"/>
+            <ac:spMk id="2" creationId="{C435E615-37F6-4EB7-9F83-99DF1EC300C8}"/>
+          </ac:spMkLst>
+        </pc:spChg>
         <pc:spChg chg="mod">
           <ac:chgData name="Pandey, Shikha" userId="62b2c247-44c0-476d-a294-f01c5623c9dc" providerId="ADAL" clId="{F72F3FB8-19C0-4758-9009-50FF7556B545}" dt="2021-12-09T04:58:50.666" v="1355" actId="20577"/>
           <ac:spMkLst>
@@ -1932,6 +1958,22 @@
             <ac:spMk id="9" creationId="{DF4B9AD8-E4FC-FA40-8BCA-CF0480A9D206}"/>
           </ac:spMkLst>
         </pc:spChg>
+        <pc:spChg chg="add mod">
+          <ac:chgData name="Pandey, Shikha" userId="62b2c247-44c0-476d-a294-f01c5623c9dc" providerId="ADAL" clId="{F72F3FB8-19C0-4758-9009-50FF7556B545}" dt="2021-12-11T04:07:03.857" v="2426" actId="5793"/>
+          <ac:spMkLst>
+            <pc:docMk/>
+            <pc:sldMk cId="2642334168" sldId="304"/>
+            <ac:spMk id="10" creationId="{711207F1-4A36-4478-AAE1-4383ACC20005}"/>
+          </ac:spMkLst>
+        </pc:spChg>
+        <pc:picChg chg="add del">
+          <ac:chgData name="Pandey, Shikha" userId="62b2c247-44c0-476d-a294-f01c5623c9dc" providerId="ADAL" clId="{F72F3FB8-19C0-4758-9009-50FF7556B545}" dt="2021-12-11T02:22:21.080" v="1763"/>
+          <ac:picMkLst>
+            <pc:docMk/>
+            <pc:sldMk cId="2642334168" sldId="304"/>
+            <ac:picMk id="3" creationId="{E3B0BBEE-DE7D-4800-BBC7-CFBB90CED950}"/>
+          </ac:picMkLst>
+        </pc:picChg>
         <pc:picChg chg="del">
           <ac:chgData name="Pandey, Shikha" userId="62b2c247-44c0-476d-a294-f01c5623c9dc" providerId="ADAL" clId="{F72F3FB8-19C0-4758-9009-50FF7556B545}" dt="2021-12-09T04:58:46.291" v="1348" actId="478"/>
           <ac:picMkLst>
@@ -1941,8 +1983,8 @@
           </ac:picMkLst>
         </pc:picChg>
       </pc:sldChg>
-      <pc:sldChg chg="modSp add mod">
-        <pc:chgData name="Pandey, Shikha" userId="62b2c247-44c0-476d-a294-f01c5623c9dc" providerId="ADAL" clId="{F72F3FB8-19C0-4758-9009-50FF7556B545}" dt="2021-12-09T04:59:14.130" v="1375" actId="20577"/>
+      <pc:sldChg chg="modSp add del mod">
+        <pc:chgData name="Pandey, Shikha" userId="62b2c247-44c0-476d-a294-f01c5623c9dc" providerId="ADAL" clId="{F72F3FB8-19C0-4758-9009-50FF7556B545}" dt="2021-12-11T04:07:08.870" v="2427" actId="2696"/>
         <pc:sldMkLst>
           <pc:docMk/>
           <pc:sldMk cId="658250400" sldId="305"/>
@@ -1955,6 +1997,178 @@
             <ac:spMk id="9" creationId="{DF4B9AD8-E4FC-FA40-8BCA-CF0480A9D206}"/>
           </ac:spMkLst>
         </pc:spChg>
+      </pc:sldChg>
+      <pc:sldChg chg="addSp delSp modSp add mod ord">
+        <pc:chgData name="Pandey, Shikha" userId="62b2c247-44c0-476d-a294-f01c5623c9dc" providerId="ADAL" clId="{F72F3FB8-19C0-4758-9009-50FF7556B545}" dt="2021-12-11T02:11:47.927" v="1708"/>
+        <pc:sldMkLst>
+          <pc:docMk/>
+          <pc:sldMk cId="2812659350" sldId="306"/>
+        </pc:sldMkLst>
+        <pc:spChg chg="mod">
+          <ac:chgData name="Pandey, Shikha" userId="62b2c247-44c0-476d-a294-f01c5623c9dc" providerId="ADAL" clId="{F72F3FB8-19C0-4758-9009-50FF7556B545}" dt="2021-12-11T02:10:45.346" v="1703" actId="20577"/>
+          <ac:spMkLst>
+            <pc:docMk/>
+            <pc:sldMk cId="2812659350" sldId="306"/>
+            <ac:spMk id="9" creationId="{0102CC5F-E7D1-A54C-93CA-FC20B1FB2E73}"/>
+          </ac:spMkLst>
+        </pc:spChg>
+        <pc:picChg chg="add mod">
+          <ac:chgData name="Pandey, Shikha" userId="62b2c247-44c0-476d-a294-f01c5623c9dc" providerId="ADAL" clId="{F72F3FB8-19C0-4758-9009-50FF7556B545}" dt="2021-12-11T02:11:19.149" v="1706" actId="1076"/>
+          <ac:picMkLst>
+            <pc:docMk/>
+            <pc:sldMk cId="2812659350" sldId="306"/>
+            <ac:picMk id="3" creationId="{4ABDB5C7-80BA-4345-8A29-F80181326C43}"/>
+          </ac:picMkLst>
+        </pc:picChg>
+        <pc:picChg chg="del">
+          <ac:chgData name="Pandey, Shikha" userId="62b2c247-44c0-476d-a294-f01c5623c9dc" providerId="ADAL" clId="{F72F3FB8-19C0-4758-9009-50FF7556B545}" dt="2021-12-11T02:10:02.498" v="1656" actId="478"/>
+          <ac:picMkLst>
+            <pc:docMk/>
+            <pc:sldMk cId="2812659350" sldId="306"/>
+            <ac:picMk id="11" creationId="{1A7CA878-157F-1447-AD9F-04C223641CDA}"/>
+          </ac:picMkLst>
+        </pc:picChg>
+      </pc:sldChg>
+      <pc:sldChg chg="addSp delSp modSp add mod modAnim">
+        <pc:chgData name="Pandey, Shikha" userId="62b2c247-44c0-476d-a294-f01c5623c9dc" providerId="ADAL" clId="{F72F3FB8-19C0-4758-9009-50FF7556B545}" dt="2021-12-11T02:21:02.847" v="1753" actId="14100"/>
+        <pc:sldMkLst>
+          <pc:docMk/>
+          <pc:sldMk cId="2148364705" sldId="307"/>
+        </pc:sldMkLst>
+        <pc:spChg chg="mod">
+          <ac:chgData name="Pandey, Shikha" userId="62b2c247-44c0-476d-a294-f01c5623c9dc" providerId="ADAL" clId="{F72F3FB8-19C0-4758-9009-50FF7556B545}" dt="2021-12-11T02:13:41.986" v="1736" actId="20577"/>
+          <ac:spMkLst>
+            <pc:docMk/>
+            <pc:sldMk cId="2148364705" sldId="307"/>
+            <ac:spMk id="9" creationId="{0102CC5F-E7D1-A54C-93CA-FC20B1FB2E73}"/>
+          </ac:spMkLst>
+        </pc:spChg>
+        <pc:picChg chg="add mod">
+          <ac:chgData name="Pandey, Shikha" userId="62b2c247-44c0-476d-a294-f01c5623c9dc" providerId="ADAL" clId="{F72F3FB8-19C0-4758-9009-50FF7556B545}" dt="2021-12-11T02:21:02.847" v="1753" actId="14100"/>
+          <ac:picMkLst>
+            <pc:docMk/>
+            <pc:sldMk cId="2148364705" sldId="307"/>
+            <ac:picMk id="2" creationId="{55304A3E-F6A5-4CF9-B573-010E7C30C547}"/>
+          </ac:picMkLst>
+        </pc:picChg>
+        <pc:picChg chg="add mod">
+          <ac:chgData name="Pandey, Shikha" userId="62b2c247-44c0-476d-a294-f01c5623c9dc" providerId="ADAL" clId="{F72F3FB8-19C0-4758-9009-50FF7556B545}" dt="2021-12-11T02:20:45.134" v="1750" actId="14100"/>
+          <ac:picMkLst>
+            <pc:docMk/>
+            <pc:sldMk cId="2148364705" sldId="307"/>
+            <ac:picMk id="10" creationId="{A2B514E4-898A-4549-B1CB-EBBB9B0E081A}"/>
+          </ac:picMkLst>
+        </pc:picChg>
+        <pc:picChg chg="del">
+          <ac:chgData name="Pandey, Shikha" userId="62b2c247-44c0-476d-a294-f01c5623c9dc" providerId="ADAL" clId="{F72F3FB8-19C0-4758-9009-50FF7556B545}" dt="2021-12-11T02:12:53.098" v="1710" actId="478"/>
+          <ac:picMkLst>
+            <pc:docMk/>
+            <pc:sldMk cId="2148364705" sldId="307"/>
+            <ac:picMk id="11" creationId="{1A7CA878-157F-1447-AD9F-04C223641CDA}"/>
+          </ac:picMkLst>
+        </pc:picChg>
+        <pc:picChg chg="add mod">
+          <ac:chgData name="Pandey, Shikha" userId="62b2c247-44c0-476d-a294-f01c5623c9dc" providerId="ADAL" clId="{F72F3FB8-19C0-4758-9009-50FF7556B545}" dt="2021-12-11T02:20:49.176" v="1752" actId="14100"/>
+          <ac:picMkLst>
+            <pc:docMk/>
+            <pc:sldMk cId="2148364705" sldId="307"/>
+            <ac:picMk id="12" creationId="{3CDDE65B-C5F4-4DF6-BCD6-98B5930C7C93}"/>
+          </ac:picMkLst>
+        </pc:picChg>
+      </pc:sldChg>
+      <pc:sldChg chg="addSp delSp modSp add mod modAnim">
+        <pc:chgData name="Pandey, Shikha" userId="62b2c247-44c0-476d-a294-f01c5623c9dc" providerId="ADAL" clId="{F72F3FB8-19C0-4758-9009-50FF7556B545}" dt="2021-12-11T04:16:25.889" v="2592" actId="20577"/>
+        <pc:sldMkLst>
+          <pc:docMk/>
+          <pc:sldMk cId="2066871153" sldId="308"/>
+        </pc:sldMkLst>
+        <pc:spChg chg="add del">
+          <ac:chgData name="Pandey, Shikha" userId="62b2c247-44c0-476d-a294-f01c5623c9dc" providerId="ADAL" clId="{F72F3FB8-19C0-4758-9009-50FF7556B545}" dt="2021-12-11T04:03:42.937" v="2401"/>
+          <ac:spMkLst>
+            <pc:docMk/>
+            <pc:sldMk cId="2066871153" sldId="308"/>
+            <ac:spMk id="2" creationId="{685CF646-75A5-466B-A486-3C8FFE798696}"/>
+          </ac:spMkLst>
+        </pc:spChg>
+        <pc:spChg chg="mod">
+          <ac:chgData name="Pandey, Shikha" userId="62b2c247-44c0-476d-a294-f01c5623c9dc" providerId="ADAL" clId="{F72F3FB8-19C0-4758-9009-50FF7556B545}" dt="2021-12-11T03:59:18.103" v="2214" actId="255"/>
+          <ac:spMkLst>
+            <pc:docMk/>
+            <pc:sldMk cId="2066871153" sldId="308"/>
+            <ac:spMk id="9" creationId="{DF4B9AD8-E4FC-FA40-8BCA-CF0480A9D206}"/>
+          </ac:spMkLst>
+        </pc:spChg>
+        <pc:spChg chg="mod">
+          <ac:chgData name="Pandey, Shikha" userId="62b2c247-44c0-476d-a294-f01c5623c9dc" providerId="ADAL" clId="{F72F3FB8-19C0-4758-9009-50FF7556B545}" dt="2021-12-11T04:16:25.889" v="2592" actId="20577"/>
+          <ac:spMkLst>
+            <pc:docMk/>
+            <pc:sldMk cId="2066871153" sldId="308"/>
+            <ac:spMk id="10" creationId="{711207F1-4A36-4478-AAE1-4383ACC20005}"/>
+          </ac:spMkLst>
+        </pc:spChg>
+      </pc:sldChg>
+      <pc:sldChg chg="addSp delSp modSp add mod modAnim">
+        <pc:chgData name="Pandey, Shikha" userId="62b2c247-44c0-476d-a294-f01c5623c9dc" providerId="ADAL" clId="{F72F3FB8-19C0-4758-9009-50FF7556B545}" dt="2021-12-11T04:12:28.811" v="2578" actId="6549"/>
+        <pc:sldMkLst>
+          <pc:docMk/>
+          <pc:sldMk cId="987614894" sldId="309"/>
+        </pc:sldMkLst>
+        <pc:spChg chg="mod">
+          <ac:chgData name="Pandey, Shikha" userId="62b2c247-44c0-476d-a294-f01c5623c9dc" providerId="ADAL" clId="{F72F3FB8-19C0-4758-9009-50FF7556B545}" dt="2021-12-11T04:11:46.688" v="2554" actId="20577"/>
+          <ac:spMkLst>
+            <pc:docMk/>
+            <pc:sldMk cId="987614894" sldId="309"/>
+            <ac:spMk id="9" creationId="{DF4B9AD8-E4FC-FA40-8BCA-CF0480A9D206}"/>
+          </ac:spMkLst>
+        </pc:spChg>
+        <pc:spChg chg="add del mod">
+          <ac:chgData name="Pandey, Shikha" userId="62b2c247-44c0-476d-a294-f01c5623c9dc" providerId="ADAL" clId="{F72F3FB8-19C0-4758-9009-50FF7556B545}" dt="2021-12-11T04:12:28.811" v="2578" actId="6549"/>
+          <ac:spMkLst>
+            <pc:docMk/>
+            <pc:sldMk cId="987614894" sldId="309"/>
+            <ac:spMk id="10" creationId="{711207F1-4A36-4478-AAE1-4383ACC20005}"/>
+          </ac:spMkLst>
+        </pc:spChg>
+        <pc:graphicFrameChg chg="add del">
+          <ac:chgData name="Pandey, Shikha" userId="62b2c247-44c0-476d-a294-f01c5623c9dc" providerId="ADAL" clId="{F72F3FB8-19C0-4758-9009-50FF7556B545}" dt="2021-12-11T04:09:40.406" v="2533" actId="26606"/>
+          <ac:graphicFrameMkLst>
+            <pc:docMk/>
+            <pc:sldMk cId="987614894" sldId="309"/>
+            <ac:graphicFrameMk id="12" creationId="{5B13E9ED-E186-4663-A705-6107F7321340}"/>
+          </ac:graphicFrameMkLst>
+        </pc:graphicFrameChg>
+        <pc:graphicFrameChg chg="add del">
+          <ac:chgData name="Pandey, Shikha" userId="62b2c247-44c0-476d-a294-f01c5623c9dc" providerId="ADAL" clId="{F72F3FB8-19C0-4758-9009-50FF7556B545}" dt="2021-12-11T04:09:44.836" v="2535" actId="26606"/>
+          <ac:graphicFrameMkLst>
+            <pc:docMk/>
+            <pc:sldMk cId="987614894" sldId="309"/>
+            <ac:graphicFrameMk id="14" creationId="{6939BA02-9C97-4D96-8031-850B1B5ED96C}"/>
+          </ac:graphicFrameMkLst>
+        </pc:graphicFrameChg>
+        <pc:graphicFrameChg chg="add del">
+          <ac:chgData name="Pandey, Shikha" userId="62b2c247-44c0-476d-a294-f01c5623c9dc" providerId="ADAL" clId="{F72F3FB8-19C0-4758-9009-50FF7556B545}" dt="2021-12-11T04:09:47.200" v="2537" actId="26606"/>
+          <ac:graphicFrameMkLst>
+            <pc:docMk/>
+            <pc:sldMk cId="987614894" sldId="309"/>
+            <ac:graphicFrameMk id="16" creationId="{4459F8DF-84A1-4E34-9162-C25302EB052D}"/>
+          </ac:graphicFrameMkLst>
+        </pc:graphicFrameChg>
+        <pc:graphicFrameChg chg="add del">
+          <ac:chgData name="Pandey, Shikha" userId="62b2c247-44c0-476d-a294-f01c5623c9dc" providerId="ADAL" clId="{F72F3FB8-19C0-4758-9009-50FF7556B545}" dt="2021-12-11T04:09:58.398" v="2539" actId="26606"/>
+          <ac:graphicFrameMkLst>
+            <pc:docMk/>
+            <pc:sldMk cId="987614894" sldId="309"/>
+            <ac:graphicFrameMk id="18" creationId="{A5856628-E40A-43A9-9D3D-395011B0DB32}"/>
+          </ac:graphicFrameMkLst>
+        </pc:graphicFrameChg>
+        <pc:graphicFrameChg chg="add del">
+          <ac:chgData name="Pandey, Shikha" userId="62b2c247-44c0-476d-a294-f01c5623c9dc" providerId="ADAL" clId="{F72F3FB8-19C0-4758-9009-50FF7556B545}" dt="2021-12-11T04:10:07.317" v="2541" actId="26606"/>
+          <ac:graphicFrameMkLst>
+            <pc:docMk/>
+            <pc:sldMk cId="987614894" sldId="309"/>
+            <ac:graphicFrameMk id="20" creationId="{5B13E9ED-E186-4663-A705-6107F7321340}"/>
+          </ac:graphicFrameMkLst>
+        </pc:graphicFrameChg>
       </pc:sldChg>
     </pc:docChg>
   </pc:docChgLst>
@@ -2092,7 +2306,7 @@
           <a:p>
             <a:fld id="{23FEA57E-7C1A-457B-A4CD-5DCEB057B502}" type="datetime1">
               <a:rPr lang="en-US" smtClean="0"/>
-              <a:t>12/9/2021</a:t>
+              <a:t>12/10/2021</a:t>
             </a:fld>
             <a:endParaRPr lang="en-US" dirty="0"/>
           </a:p>
@@ -2266,7 +2480,7 @@
           <a:p>
             <a:fld id="{11789749-A4CD-447F-8298-2B7988C91CEA}" type="datetime1">
               <a:rPr lang="en-US" smtClean="0"/>
-              <a:t>12/9/2021</a:t>
+              <a:t>12/10/2021</a:t>
             </a:fld>
             <a:endParaRPr lang="en-US"/>
           </a:p>
@@ -2450,7 +2664,7 @@
           <a:p>
             <a:fld id="{BA0444D3-C0BA-4587-A56C-581AB9F841BE}" type="datetime1">
               <a:rPr lang="en-US" smtClean="0"/>
-              <a:t>12/9/2021</a:t>
+              <a:t>12/10/2021</a:t>
             </a:fld>
             <a:endParaRPr lang="en-US"/>
           </a:p>
@@ -2623,7 +2837,7 @@
           <a:p>
             <a:fld id="{201AF2CE-4F37-411C-A3EE-BBBE223265BF}" type="datetime1">
               <a:rPr lang="en-US" smtClean="0"/>
-              <a:t>12/9/2021</a:t>
+              <a:t>12/10/2021</a:t>
             </a:fld>
             <a:endParaRPr lang="en-US"/>
           </a:p>
@@ -2872,7 +3086,7 @@
           <a:p>
             <a:fld id="{C96083D4-708C-4BB5-B4FD-30CE9FA12FD5}" type="datetime1">
               <a:rPr lang="en-US" smtClean="0"/>
-              <a:t>12/9/2021</a:t>
+              <a:t>12/10/2021</a:t>
             </a:fld>
             <a:endParaRPr lang="en-US"/>
           </a:p>
@@ -3108,7 +3322,7 @@
           <a:p>
             <a:fld id="{D0D239B2-65BC-4C2A-A62B-3EABFE9590E4}" type="datetime1">
               <a:rPr lang="en-US" smtClean="0"/>
-              <a:t>12/9/2021</a:t>
+              <a:t>12/10/2021</a:t>
             </a:fld>
             <a:endParaRPr lang="en-US"/>
           </a:p>
@@ -3478,7 +3692,7 @@
           <a:p>
             <a:fld id="{85E05F5A-E4A3-476F-A89E-C2B73F2431E4}" type="datetime1">
               <a:rPr lang="en-US" smtClean="0"/>
-              <a:t>12/9/2021</a:t>
+              <a:t>12/10/2021</a:t>
             </a:fld>
             <a:endParaRPr lang="en-US"/>
           </a:p>
@@ -3599,7 +3813,7 @@
           <a:p>
             <a:fld id="{E3761515-4A26-4F31-9F61-5A10B1FABBFC}" type="datetime1">
               <a:rPr lang="en-US" smtClean="0"/>
-              <a:t>12/9/2021</a:t>
+              <a:t>12/10/2021</a:t>
             </a:fld>
             <a:endParaRPr lang="en-US"/>
           </a:p>
@@ -3697,7 +3911,7 @@
           <a:p>
             <a:fld id="{4A75DC65-7D1F-4BAB-9695-F7E734143E14}" type="datetime1">
               <a:rPr lang="en-US" smtClean="0"/>
-              <a:t>12/9/2021</a:t>
+              <a:t>12/10/2021</a:t>
             </a:fld>
             <a:endParaRPr lang="en-US"/>
           </a:p>
@@ -3977,7 +4191,7 @@
           <a:p>
             <a:fld id="{7E624077-BD55-4036-8E92-6558FDF3B653}" type="datetime1">
               <a:rPr lang="en-US" smtClean="0"/>
-              <a:t>12/9/2021</a:t>
+              <a:t>12/10/2021</a:t>
             </a:fld>
             <a:endParaRPr lang="en-US"/>
           </a:p>
@@ -4237,7 +4451,7 @@
           <a:p>
             <a:fld id="{804225F2-7107-4609-BCC2-77C63064A5E8}" type="datetime1">
               <a:rPr lang="en-US" smtClean="0"/>
-              <a:t>12/9/2021</a:t>
+              <a:t>12/10/2021</a:t>
             </a:fld>
             <a:endParaRPr lang="en-US"/>
           </a:p>
@@ -4453,7 +4667,7 @@
           <a:p>
             <a:fld id="{D3FE42E8-8B57-452D-A122-4DCE9AC771EF}" type="datetime1">
               <a:rPr lang="en-US" smtClean="0"/>
-              <a:t>12/9/2021</a:t>
+              <a:t>12/10/2021</a:t>
             </a:fld>
             <a:endParaRPr lang="en-US"/>
           </a:p>
@@ -6767,320 +6981,6 @@
 </file>
 
 <file path=ppt/slides/slide13.xml><?xml version="1.0" encoding="utf-8"?>
-<p:sld xmlns:a="http://schemas.openxmlformats.org/drawingml/2006/main" xmlns:r="http://schemas.openxmlformats.org/officeDocument/2006/relationships" xmlns:p="http://schemas.openxmlformats.org/presentationml/2006/main" show="0">
-  <p:cSld>
-    <p:spTree>
-      <p:nvGrpSpPr>
-        <p:cNvPr id="1" name=""/>
-        <p:cNvGrpSpPr/>
-        <p:nvPr/>
-      </p:nvGrpSpPr>
-      <p:grpSpPr>
-        <a:xfrm>
-          <a:off x="0" y="0"/>
-          <a:ext cx="0" cy="0"/>
-          <a:chOff x="0" y="0"/>
-          <a:chExt cx="0" cy="0"/>
-        </a:xfrm>
-      </p:grpSpPr>
-      <p:sp>
-        <p:nvSpPr>
-          <p:cNvPr id="5" name="Right Triangle 4">
-            <a:extLst>
-              <a:ext uri="{FF2B5EF4-FFF2-40B4-BE49-F238E27FC236}">
-                <a16:creationId xmlns:a16="http://schemas.microsoft.com/office/drawing/2014/main" id="{5488A745-4D79-6747-B65A-803B31C1F8B4}"/>
-              </a:ext>
-            </a:extLst>
-          </p:cNvPr>
-          <p:cNvSpPr/>
-          <p:nvPr/>
-        </p:nvSpPr>
-        <p:spPr>
-          <a:xfrm rot="13068536">
-            <a:off x="-809065" y="4275183"/>
-            <a:ext cx="1600200" cy="2061882"/>
-          </a:xfrm>
-          <a:prstGeom prst="rtTriangle">
-            <a:avLst/>
-          </a:prstGeom>
-          <a:solidFill>
-            <a:srgbClr val="44E4C4"/>
-          </a:solidFill>
-          <a:ln>
-            <a:solidFill>
-              <a:srgbClr val="44E4C4"/>
-            </a:solidFill>
-          </a:ln>
-        </p:spPr>
-        <p:style>
-          <a:lnRef idx="2">
-            <a:schemeClr val="accent1">
-              <a:shade val="50000"/>
-            </a:schemeClr>
-          </a:lnRef>
-          <a:fillRef idx="1">
-            <a:schemeClr val="accent1"/>
-          </a:fillRef>
-          <a:effectRef idx="0">
-            <a:schemeClr val="accent1"/>
-          </a:effectRef>
-          <a:fontRef idx="minor">
-            <a:schemeClr val="lt1"/>
-          </a:fontRef>
-        </p:style>
-        <p:txBody>
-          <a:bodyPr rtlCol="0" anchor="ctr"/>
-          <a:lstStyle/>
-          <a:p>
-            <a:pPr algn="ctr"/>
-            <a:endParaRPr lang="en-US"/>
-          </a:p>
-        </p:txBody>
-      </p:sp>
-      <p:sp>
-        <p:nvSpPr>
-          <p:cNvPr id="6" name="Rectangle 5">
-            <a:extLst>
-              <a:ext uri="{FF2B5EF4-FFF2-40B4-BE49-F238E27FC236}">
-                <a16:creationId xmlns:a16="http://schemas.microsoft.com/office/drawing/2014/main" id="{67C63295-B221-9A4E-BA44-2C4B26CF7FDE}"/>
-              </a:ext>
-            </a:extLst>
-          </p:cNvPr>
-          <p:cNvSpPr/>
-          <p:nvPr/>
-        </p:nvSpPr>
-        <p:spPr>
-          <a:xfrm rot="2351297">
-            <a:off x="281204" y="5024303"/>
-            <a:ext cx="880169" cy="978559"/>
-          </a:xfrm>
-          <a:prstGeom prst="rect">
-            <a:avLst/>
-          </a:prstGeom>
-          <a:solidFill>
-            <a:srgbClr val="2E27C7">
-              <a:alpha val="80000"/>
-            </a:srgbClr>
-          </a:solidFill>
-        </p:spPr>
-        <p:style>
-          <a:lnRef idx="2">
-            <a:schemeClr val="accent1">
-              <a:shade val="50000"/>
-            </a:schemeClr>
-          </a:lnRef>
-          <a:fillRef idx="1">
-            <a:schemeClr val="accent1"/>
-          </a:fillRef>
-          <a:effectRef idx="0">
-            <a:schemeClr val="accent1"/>
-          </a:effectRef>
-          <a:fontRef idx="minor">
-            <a:schemeClr val="lt1"/>
-          </a:fontRef>
-        </p:style>
-        <p:txBody>
-          <a:bodyPr rtlCol="0" anchor="ctr"/>
-          <a:lstStyle/>
-          <a:p>
-            <a:pPr algn="ctr"/>
-            <a:endParaRPr lang="en-US"/>
-          </a:p>
-        </p:txBody>
-      </p:sp>
-      <p:sp>
-        <p:nvSpPr>
-          <p:cNvPr id="7" name="Right Triangle 6">
-            <a:extLst>
-              <a:ext uri="{FF2B5EF4-FFF2-40B4-BE49-F238E27FC236}">
-                <a16:creationId xmlns:a16="http://schemas.microsoft.com/office/drawing/2014/main" id="{E9A9D123-E73C-5749-962A-D162E22D504C}"/>
-              </a:ext>
-            </a:extLst>
-          </p:cNvPr>
-          <p:cNvSpPr/>
-          <p:nvPr/>
-        </p:nvSpPr>
-        <p:spPr>
-          <a:xfrm rot="2259401">
-            <a:off x="11399428" y="428828"/>
-            <a:ext cx="1600200" cy="2066544"/>
-          </a:xfrm>
-          <a:prstGeom prst="rtTriangle">
-            <a:avLst/>
-          </a:prstGeom>
-          <a:solidFill>
-            <a:srgbClr val="2E27C7"/>
-          </a:solidFill>
-          <a:ln>
-            <a:solidFill>
-              <a:srgbClr val="2E27C7"/>
-            </a:solidFill>
-          </a:ln>
-        </p:spPr>
-        <p:style>
-          <a:lnRef idx="2">
-            <a:schemeClr val="accent1">
-              <a:shade val="50000"/>
-            </a:schemeClr>
-          </a:lnRef>
-          <a:fillRef idx="1">
-            <a:schemeClr val="accent1"/>
-          </a:fillRef>
-          <a:effectRef idx="0">
-            <a:schemeClr val="accent1"/>
-          </a:effectRef>
-          <a:fontRef idx="minor">
-            <a:schemeClr val="lt1"/>
-          </a:fontRef>
-        </p:style>
-        <p:txBody>
-          <a:bodyPr rtlCol="0" anchor="ctr"/>
-          <a:lstStyle/>
-          <a:p>
-            <a:pPr algn="ctr"/>
-            <a:endParaRPr lang="en-US"/>
-          </a:p>
-        </p:txBody>
-      </p:sp>
-      <p:sp>
-        <p:nvSpPr>
-          <p:cNvPr id="8" name="Rectangle 7">
-            <a:extLst>
-              <a:ext uri="{FF2B5EF4-FFF2-40B4-BE49-F238E27FC236}">
-                <a16:creationId xmlns:a16="http://schemas.microsoft.com/office/drawing/2014/main" id="{523C82C0-70C3-B347-A9AA-B75D37C19777}"/>
-              </a:ext>
-            </a:extLst>
-          </p:cNvPr>
-          <p:cNvSpPr/>
-          <p:nvPr/>
-        </p:nvSpPr>
-        <p:spPr>
-          <a:xfrm rot="13164033">
-            <a:off x="11030256" y="1657834"/>
-            <a:ext cx="880169" cy="978559"/>
-          </a:xfrm>
-          <a:prstGeom prst="rect">
-            <a:avLst/>
-          </a:prstGeom>
-          <a:solidFill>
-            <a:srgbClr val="44E4C4">
-              <a:alpha val="80000"/>
-            </a:srgbClr>
-          </a:solidFill>
-          <a:ln>
-            <a:solidFill>
-              <a:srgbClr val="44E4C4"/>
-            </a:solidFill>
-          </a:ln>
-        </p:spPr>
-        <p:style>
-          <a:lnRef idx="2">
-            <a:schemeClr val="accent1">
-              <a:shade val="50000"/>
-            </a:schemeClr>
-          </a:lnRef>
-          <a:fillRef idx="1">
-            <a:schemeClr val="accent1"/>
-          </a:fillRef>
-          <a:effectRef idx="0">
-            <a:schemeClr val="accent1"/>
-          </a:effectRef>
-          <a:fontRef idx="minor">
-            <a:schemeClr val="lt1"/>
-          </a:fontRef>
-        </p:style>
-        <p:txBody>
-          <a:bodyPr rtlCol="0" anchor="ctr"/>
-          <a:lstStyle/>
-          <a:p>
-            <a:pPr algn="ctr"/>
-            <a:endParaRPr lang="en-US"/>
-          </a:p>
-        </p:txBody>
-      </p:sp>
-      <p:pic>
-        <p:nvPicPr>
-          <p:cNvPr id="2" name="Picture 1">
-            <a:extLst>
-              <a:ext uri="{FF2B5EF4-FFF2-40B4-BE49-F238E27FC236}">
-                <a16:creationId xmlns:a16="http://schemas.microsoft.com/office/drawing/2014/main" id="{EE46A041-1E42-1940-A726-7DC7AB7D9F40}"/>
-              </a:ext>
-            </a:extLst>
-          </p:cNvPr>
-          <p:cNvPicPr>
-            <a:picLocks noChangeAspect="1"/>
-          </p:cNvPicPr>
-          <p:nvPr/>
-        </p:nvPicPr>
-        <p:blipFill>
-          <a:blip r:embed="rId2"/>
-          <a:stretch>
-            <a:fillRect/>
-          </a:stretch>
-        </p:blipFill>
-        <p:spPr>
-          <a:xfrm>
-            <a:off x="2514226" y="1642311"/>
-            <a:ext cx="7163547" cy="4528576"/>
-          </a:xfrm>
-          <a:prstGeom prst="rect">
-            <a:avLst/>
-          </a:prstGeom>
-        </p:spPr>
-      </p:pic>
-      <p:sp>
-        <p:nvSpPr>
-          <p:cNvPr id="9" name="Title 1">
-            <a:extLst>
-              <a:ext uri="{FF2B5EF4-FFF2-40B4-BE49-F238E27FC236}">
-                <a16:creationId xmlns:a16="http://schemas.microsoft.com/office/drawing/2014/main" id="{BCC51F52-4CFD-8D49-866C-EAC1BFB118A5}"/>
-              </a:ext>
-            </a:extLst>
-          </p:cNvPr>
-          <p:cNvSpPr>
-            <a:spLocks noGrp="1"/>
-          </p:cNvSpPr>
-          <p:nvPr>
-            <p:ph type="title"/>
-          </p:nvPr>
-        </p:nvSpPr>
-        <p:spPr>
-          <a:xfrm>
-            <a:off x="643467" y="321735"/>
-            <a:ext cx="10905066" cy="634806"/>
-          </a:xfrm>
-        </p:spPr>
-        <p:txBody>
-          <a:bodyPr>
-            <a:normAutofit/>
-          </a:bodyPr>
-          <a:lstStyle/>
-          <a:p>
-            <a:pPr algn="ctr"/>
-            <a:r>
-              <a:rPr lang="en-US" sz="3600" b="1" cap="none" dirty="0">
-                <a:latin typeface="Calibri" panose="020F0502020204030204" pitchFamily="34" charset="0"/>
-                <a:cs typeface="Calibri" panose="020F0502020204030204" pitchFamily="34" charset="0"/>
-              </a:rPr>
-              <a:t>Attrition based on Multiple Variables</a:t>
-            </a:r>
-          </a:p>
-        </p:txBody>
-      </p:sp>
-    </p:spTree>
-    <p:extLst>
-      <p:ext uri="{BB962C8B-B14F-4D97-AF65-F5344CB8AC3E}">
-        <p14:creationId xmlns:p14="http://schemas.microsoft.com/office/powerpoint/2010/main" val="95992096"/>
-      </p:ext>
-    </p:extLst>
-  </p:cSld>
-  <p:clrMapOvr>
-    <a:masterClrMapping/>
-  </p:clrMapOvr>
-</p:sld>
-</file>
-
-<file path=ppt/slides/slide14.xml><?xml version="1.0" encoding="utf-8"?>
 <p:sld xmlns:a="http://schemas.openxmlformats.org/drawingml/2006/main" xmlns:r="http://schemas.openxmlformats.org/officeDocument/2006/relationships" xmlns:p="http://schemas.openxmlformats.org/presentationml/2006/main">
   <p:cSld>
     <p:spTree>
@@ -7408,7 +7308,7 @@
 </p:sld>
 </file>
 
-<file path=ppt/slides/slide15.xml><?xml version="1.0" encoding="utf-8"?>
+<file path=ppt/slides/slide14.xml><?xml version="1.0" encoding="utf-8"?>
 <p:sld xmlns:a="http://schemas.openxmlformats.org/drawingml/2006/main" xmlns:r="http://schemas.openxmlformats.org/officeDocument/2006/relationships" xmlns:p="http://schemas.openxmlformats.org/presentationml/2006/main">
   <p:cSld>
     <p:spTree>
@@ -8431,6 +8331,324 @@
 </p:sld>
 </file>
 
+<file path=ppt/slides/slide15.xml><?xml version="1.0" encoding="utf-8"?>
+<p:sld xmlns:a="http://schemas.openxmlformats.org/drawingml/2006/main" xmlns:r="http://schemas.openxmlformats.org/officeDocument/2006/relationships" xmlns:p="http://schemas.openxmlformats.org/presentationml/2006/main">
+  <p:cSld>
+    <p:spTree>
+      <p:nvGrpSpPr>
+        <p:cNvPr id="1" name=""/>
+        <p:cNvGrpSpPr/>
+        <p:nvPr/>
+      </p:nvGrpSpPr>
+      <p:grpSpPr>
+        <a:xfrm>
+          <a:off x="0" y="0"/>
+          <a:ext cx="0" cy="0"/>
+          <a:chOff x="0" y="0"/>
+          <a:chExt cx="0" cy="0"/>
+        </a:xfrm>
+      </p:grpSpPr>
+      <p:sp>
+        <p:nvSpPr>
+          <p:cNvPr id="5" name="Right Triangle 4">
+            <a:extLst>
+              <a:ext uri="{FF2B5EF4-FFF2-40B4-BE49-F238E27FC236}">
+                <a16:creationId xmlns:a16="http://schemas.microsoft.com/office/drawing/2014/main" id="{5488A745-4D79-6747-B65A-803B31C1F8B4}"/>
+              </a:ext>
+            </a:extLst>
+          </p:cNvPr>
+          <p:cNvSpPr/>
+          <p:nvPr/>
+        </p:nvSpPr>
+        <p:spPr>
+          <a:xfrm rot="13068536">
+            <a:off x="-809065" y="4275183"/>
+            <a:ext cx="1600200" cy="2061882"/>
+          </a:xfrm>
+          <a:prstGeom prst="rtTriangle">
+            <a:avLst/>
+          </a:prstGeom>
+          <a:solidFill>
+            <a:srgbClr val="44E4C4"/>
+          </a:solidFill>
+          <a:ln>
+            <a:solidFill>
+              <a:srgbClr val="44E4C4"/>
+            </a:solidFill>
+          </a:ln>
+        </p:spPr>
+        <p:style>
+          <a:lnRef idx="2">
+            <a:schemeClr val="accent1">
+              <a:shade val="50000"/>
+            </a:schemeClr>
+          </a:lnRef>
+          <a:fillRef idx="1">
+            <a:schemeClr val="accent1"/>
+          </a:fillRef>
+          <a:effectRef idx="0">
+            <a:schemeClr val="accent1"/>
+          </a:effectRef>
+          <a:fontRef idx="minor">
+            <a:schemeClr val="lt1"/>
+          </a:fontRef>
+        </p:style>
+        <p:txBody>
+          <a:bodyPr rtlCol="0" anchor="ctr"/>
+          <a:lstStyle/>
+          <a:p>
+            <a:pPr algn="ctr"/>
+            <a:endParaRPr lang="en-US"/>
+          </a:p>
+        </p:txBody>
+      </p:sp>
+      <p:sp>
+        <p:nvSpPr>
+          <p:cNvPr id="6" name="Rectangle 5">
+            <a:extLst>
+              <a:ext uri="{FF2B5EF4-FFF2-40B4-BE49-F238E27FC236}">
+                <a16:creationId xmlns:a16="http://schemas.microsoft.com/office/drawing/2014/main" id="{67C63295-B221-9A4E-BA44-2C4B26CF7FDE}"/>
+              </a:ext>
+            </a:extLst>
+          </p:cNvPr>
+          <p:cNvSpPr/>
+          <p:nvPr/>
+        </p:nvSpPr>
+        <p:spPr>
+          <a:xfrm rot="2351297">
+            <a:off x="281204" y="5024303"/>
+            <a:ext cx="880169" cy="978559"/>
+          </a:xfrm>
+          <a:prstGeom prst="rect">
+            <a:avLst/>
+          </a:prstGeom>
+          <a:solidFill>
+            <a:srgbClr val="2E27C7">
+              <a:alpha val="80000"/>
+            </a:srgbClr>
+          </a:solidFill>
+        </p:spPr>
+        <p:style>
+          <a:lnRef idx="2">
+            <a:schemeClr val="accent1">
+              <a:shade val="50000"/>
+            </a:schemeClr>
+          </a:lnRef>
+          <a:fillRef idx="1">
+            <a:schemeClr val="accent1"/>
+          </a:fillRef>
+          <a:effectRef idx="0">
+            <a:schemeClr val="accent1"/>
+          </a:effectRef>
+          <a:fontRef idx="minor">
+            <a:schemeClr val="lt1"/>
+          </a:fontRef>
+        </p:style>
+        <p:txBody>
+          <a:bodyPr rtlCol="0" anchor="ctr"/>
+          <a:lstStyle/>
+          <a:p>
+            <a:pPr algn="ctr"/>
+            <a:endParaRPr lang="en-US"/>
+          </a:p>
+        </p:txBody>
+      </p:sp>
+      <p:sp>
+        <p:nvSpPr>
+          <p:cNvPr id="7" name="Right Triangle 6">
+            <a:extLst>
+              <a:ext uri="{FF2B5EF4-FFF2-40B4-BE49-F238E27FC236}">
+                <a16:creationId xmlns:a16="http://schemas.microsoft.com/office/drawing/2014/main" id="{E9A9D123-E73C-5749-962A-D162E22D504C}"/>
+              </a:ext>
+            </a:extLst>
+          </p:cNvPr>
+          <p:cNvSpPr/>
+          <p:nvPr/>
+        </p:nvSpPr>
+        <p:spPr>
+          <a:xfrm rot="2259401">
+            <a:off x="11399428" y="428828"/>
+            <a:ext cx="1600200" cy="2066544"/>
+          </a:xfrm>
+          <a:prstGeom prst="rtTriangle">
+            <a:avLst/>
+          </a:prstGeom>
+          <a:solidFill>
+            <a:srgbClr val="2E27C7"/>
+          </a:solidFill>
+          <a:ln>
+            <a:solidFill>
+              <a:srgbClr val="2E27C7"/>
+            </a:solidFill>
+          </a:ln>
+        </p:spPr>
+        <p:style>
+          <a:lnRef idx="2">
+            <a:schemeClr val="accent1">
+              <a:shade val="50000"/>
+            </a:schemeClr>
+          </a:lnRef>
+          <a:fillRef idx="1">
+            <a:schemeClr val="accent1"/>
+          </a:fillRef>
+          <a:effectRef idx="0">
+            <a:schemeClr val="accent1"/>
+          </a:effectRef>
+          <a:fontRef idx="minor">
+            <a:schemeClr val="lt1"/>
+          </a:fontRef>
+        </p:style>
+        <p:txBody>
+          <a:bodyPr rtlCol="0" anchor="ctr"/>
+          <a:lstStyle/>
+          <a:p>
+            <a:pPr algn="ctr"/>
+            <a:endParaRPr lang="en-US"/>
+          </a:p>
+        </p:txBody>
+      </p:sp>
+      <p:sp>
+        <p:nvSpPr>
+          <p:cNvPr id="8" name="Rectangle 7">
+            <a:extLst>
+              <a:ext uri="{FF2B5EF4-FFF2-40B4-BE49-F238E27FC236}">
+                <a16:creationId xmlns:a16="http://schemas.microsoft.com/office/drawing/2014/main" id="{523C82C0-70C3-B347-A9AA-B75D37C19777}"/>
+              </a:ext>
+            </a:extLst>
+          </p:cNvPr>
+          <p:cNvSpPr/>
+          <p:nvPr/>
+        </p:nvSpPr>
+        <p:spPr>
+          <a:xfrm rot="13164033">
+            <a:off x="11030256" y="1657834"/>
+            <a:ext cx="880169" cy="978559"/>
+          </a:xfrm>
+          <a:prstGeom prst="rect">
+            <a:avLst/>
+          </a:prstGeom>
+          <a:solidFill>
+            <a:srgbClr val="44E4C4">
+              <a:alpha val="80000"/>
+            </a:srgbClr>
+          </a:solidFill>
+          <a:ln>
+            <a:solidFill>
+              <a:srgbClr val="44E4C4"/>
+            </a:solidFill>
+          </a:ln>
+        </p:spPr>
+        <p:style>
+          <a:lnRef idx="2">
+            <a:schemeClr val="accent1">
+              <a:shade val="50000"/>
+            </a:schemeClr>
+          </a:lnRef>
+          <a:fillRef idx="1">
+            <a:schemeClr val="accent1"/>
+          </a:fillRef>
+          <a:effectRef idx="0">
+            <a:schemeClr val="accent1"/>
+          </a:effectRef>
+          <a:fontRef idx="minor">
+            <a:schemeClr val="lt1"/>
+          </a:fontRef>
+        </p:style>
+        <p:txBody>
+          <a:bodyPr rtlCol="0" anchor="ctr"/>
+          <a:lstStyle/>
+          <a:p>
+            <a:pPr algn="ctr"/>
+            <a:endParaRPr lang="en-US"/>
+          </a:p>
+        </p:txBody>
+      </p:sp>
+      <p:sp>
+        <p:nvSpPr>
+          <p:cNvPr id="9" name="Title 1">
+            <a:extLst>
+              <a:ext uri="{FF2B5EF4-FFF2-40B4-BE49-F238E27FC236}">
+                <a16:creationId xmlns:a16="http://schemas.microsoft.com/office/drawing/2014/main" id="{0102CC5F-E7D1-A54C-93CA-FC20B1FB2E73}"/>
+              </a:ext>
+            </a:extLst>
+          </p:cNvPr>
+          <p:cNvSpPr>
+            <a:spLocks noGrp="1"/>
+          </p:cNvSpPr>
+          <p:nvPr>
+            <p:ph type="title"/>
+          </p:nvPr>
+        </p:nvSpPr>
+        <p:spPr>
+          <a:xfrm>
+            <a:off x="643467" y="321735"/>
+            <a:ext cx="10905066" cy="634806"/>
+          </a:xfrm>
+        </p:spPr>
+        <p:txBody>
+          <a:bodyPr>
+            <a:normAutofit/>
+          </a:bodyPr>
+          <a:lstStyle/>
+          <a:p>
+            <a:pPr algn="ctr"/>
+            <a:r>
+              <a:rPr lang="en-US" sz="3600" b="1" dirty="0">
+                <a:latin typeface="Calibri" panose="020F0502020204030204" pitchFamily="34" charset="0"/>
+                <a:cs typeface="Calibri" panose="020F0502020204030204" pitchFamily="34" charset="0"/>
+              </a:rPr>
+              <a:t>Statistical Values for Multiple Train/Test Sets</a:t>
+            </a:r>
+            <a:endParaRPr lang="en-US" sz="3600" b="1" cap="none" dirty="0">
+              <a:latin typeface="Calibri" panose="020F0502020204030204" pitchFamily="34" charset="0"/>
+              <a:cs typeface="Calibri" panose="020F0502020204030204" pitchFamily="34" charset="0"/>
+            </a:endParaRPr>
+          </a:p>
+        </p:txBody>
+      </p:sp>
+      <p:pic>
+        <p:nvPicPr>
+          <p:cNvPr id="3" name="Picture 2">
+            <a:extLst>
+              <a:ext uri="{FF2B5EF4-FFF2-40B4-BE49-F238E27FC236}">
+                <a16:creationId xmlns:a16="http://schemas.microsoft.com/office/drawing/2014/main" id="{4ABDB5C7-80BA-4345-8A29-F80181326C43}"/>
+              </a:ext>
+            </a:extLst>
+          </p:cNvPr>
+          <p:cNvPicPr>
+            <a:picLocks noChangeAspect="1"/>
+          </p:cNvPicPr>
+          <p:nvPr/>
+        </p:nvPicPr>
+        <p:blipFill>
+          <a:blip r:embed="rId2"/>
+          <a:stretch>
+            <a:fillRect/>
+          </a:stretch>
+        </p:blipFill>
+        <p:spPr>
+          <a:xfrm>
+            <a:off x="2458058" y="1489695"/>
+            <a:ext cx="7275884" cy="5217502"/>
+          </a:xfrm>
+          <a:prstGeom prst="rect">
+            <a:avLst/>
+          </a:prstGeom>
+        </p:spPr>
+      </p:pic>
+    </p:spTree>
+    <p:extLst>
+      <p:ext uri="{BB962C8B-B14F-4D97-AF65-F5344CB8AC3E}">
+        <p14:creationId xmlns:p14="http://schemas.microsoft.com/office/powerpoint/2010/main" val="2812659350"/>
+      </p:ext>
+    </p:extLst>
+  </p:cSld>
+  <p:clrMapOvr>
+    <a:masterClrMapping/>
+  </p:clrMapOvr>
+</p:sld>
+</file>
+
 <file path=ppt/slides/slide16.xml><?xml version="1.0" encoding="utf-8"?>
 <p:sld xmlns:a="http://schemas.openxmlformats.org/drawingml/2006/main" xmlns:r="http://schemas.openxmlformats.org/officeDocument/2006/relationships" xmlns:p="http://schemas.openxmlformats.org/presentationml/2006/main">
   <p:cSld>
@@ -8750,6 +8968,384 @@
 </file>
 
 <file path=ppt/slides/slide17.xml><?xml version="1.0" encoding="utf-8"?>
+<p:sld xmlns:a="http://schemas.openxmlformats.org/drawingml/2006/main" xmlns:r="http://schemas.openxmlformats.org/officeDocument/2006/relationships" xmlns:p="http://schemas.openxmlformats.org/presentationml/2006/main">
+  <p:cSld>
+    <p:spTree>
+      <p:nvGrpSpPr>
+        <p:cNvPr id="1" name=""/>
+        <p:cNvGrpSpPr/>
+        <p:nvPr/>
+      </p:nvGrpSpPr>
+      <p:grpSpPr>
+        <a:xfrm>
+          <a:off x="0" y="0"/>
+          <a:ext cx="0" cy="0"/>
+          <a:chOff x="0" y="0"/>
+          <a:chExt cx="0" cy="0"/>
+        </a:xfrm>
+      </p:grpSpPr>
+      <p:sp>
+        <p:nvSpPr>
+          <p:cNvPr id="5" name="Right Triangle 4">
+            <a:extLst>
+              <a:ext uri="{FF2B5EF4-FFF2-40B4-BE49-F238E27FC236}">
+                <a16:creationId xmlns:a16="http://schemas.microsoft.com/office/drawing/2014/main" id="{5488A745-4D79-6747-B65A-803B31C1F8B4}"/>
+              </a:ext>
+            </a:extLst>
+          </p:cNvPr>
+          <p:cNvSpPr/>
+          <p:nvPr/>
+        </p:nvSpPr>
+        <p:spPr>
+          <a:xfrm rot="13068536">
+            <a:off x="-809065" y="4275183"/>
+            <a:ext cx="1600200" cy="2061882"/>
+          </a:xfrm>
+          <a:prstGeom prst="rtTriangle">
+            <a:avLst/>
+          </a:prstGeom>
+          <a:solidFill>
+            <a:srgbClr val="44E4C4"/>
+          </a:solidFill>
+          <a:ln>
+            <a:solidFill>
+              <a:srgbClr val="44E4C4"/>
+            </a:solidFill>
+          </a:ln>
+        </p:spPr>
+        <p:style>
+          <a:lnRef idx="2">
+            <a:schemeClr val="accent1">
+              <a:shade val="50000"/>
+            </a:schemeClr>
+          </a:lnRef>
+          <a:fillRef idx="1">
+            <a:schemeClr val="accent1"/>
+          </a:fillRef>
+          <a:effectRef idx="0">
+            <a:schemeClr val="accent1"/>
+          </a:effectRef>
+          <a:fontRef idx="minor">
+            <a:schemeClr val="lt1"/>
+          </a:fontRef>
+        </p:style>
+        <p:txBody>
+          <a:bodyPr rtlCol="0" anchor="ctr"/>
+          <a:lstStyle/>
+          <a:p>
+            <a:pPr algn="ctr"/>
+            <a:endParaRPr lang="en-US"/>
+          </a:p>
+        </p:txBody>
+      </p:sp>
+      <p:sp>
+        <p:nvSpPr>
+          <p:cNvPr id="6" name="Rectangle 5">
+            <a:extLst>
+              <a:ext uri="{FF2B5EF4-FFF2-40B4-BE49-F238E27FC236}">
+                <a16:creationId xmlns:a16="http://schemas.microsoft.com/office/drawing/2014/main" id="{67C63295-B221-9A4E-BA44-2C4B26CF7FDE}"/>
+              </a:ext>
+            </a:extLst>
+          </p:cNvPr>
+          <p:cNvSpPr/>
+          <p:nvPr/>
+        </p:nvSpPr>
+        <p:spPr>
+          <a:xfrm rot="2351297">
+            <a:off x="281204" y="5024303"/>
+            <a:ext cx="880169" cy="978559"/>
+          </a:xfrm>
+          <a:prstGeom prst="rect">
+            <a:avLst/>
+          </a:prstGeom>
+          <a:solidFill>
+            <a:srgbClr val="2E27C7">
+              <a:alpha val="80000"/>
+            </a:srgbClr>
+          </a:solidFill>
+        </p:spPr>
+        <p:style>
+          <a:lnRef idx="2">
+            <a:schemeClr val="accent1">
+              <a:shade val="50000"/>
+            </a:schemeClr>
+          </a:lnRef>
+          <a:fillRef idx="1">
+            <a:schemeClr val="accent1"/>
+          </a:fillRef>
+          <a:effectRef idx="0">
+            <a:schemeClr val="accent1"/>
+          </a:effectRef>
+          <a:fontRef idx="minor">
+            <a:schemeClr val="lt1"/>
+          </a:fontRef>
+        </p:style>
+        <p:txBody>
+          <a:bodyPr rtlCol="0" anchor="ctr"/>
+          <a:lstStyle/>
+          <a:p>
+            <a:pPr algn="ctr"/>
+            <a:endParaRPr lang="en-US"/>
+          </a:p>
+        </p:txBody>
+      </p:sp>
+      <p:sp>
+        <p:nvSpPr>
+          <p:cNvPr id="7" name="Right Triangle 6">
+            <a:extLst>
+              <a:ext uri="{FF2B5EF4-FFF2-40B4-BE49-F238E27FC236}">
+                <a16:creationId xmlns:a16="http://schemas.microsoft.com/office/drawing/2014/main" id="{E9A9D123-E73C-5749-962A-D162E22D504C}"/>
+              </a:ext>
+            </a:extLst>
+          </p:cNvPr>
+          <p:cNvSpPr/>
+          <p:nvPr/>
+        </p:nvSpPr>
+        <p:spPr>
+          <a:xfrm rot="2259401">
+            <a:off x="11399428" y="428828"/>
+            <a:ext cx="1600200" cy="2066544"/>
+          </a:xfrm>
+          <a:prstGeom prst="rtTriangle">
+            <a:avLst/>
+          </a:prstGeom>
+          <a:solidFill>
+            <a:srgbClr val="2E27C7"/>
+          </a:solidFill>
+          <a:ln>
+            <a:solidFill>
+              <a:srgbClr val="2E27C7"/>
+            </a:solidFill>
+          </a:ln>
+        </p:spPr>
+        <p:style>
+          <a:lnRef idx="2">
+            <a:schemeClr val="accent1">
+              <a:shade val="50000"/>
+            </a:schemeClr>
+          </a:lnRef>
+          <a:fillRef idx="1">
+            <a:schemeClr val="accent1"/>
+          </a:fillRef>
+          <a:effectRef idx="0">
+            <a:schemeClr val="accent1"/>
+          </a:effectRef>
+          <a:fontRef idx="minor">
+            <a:schemeClr val="lt1"/>
+          </a:fontRef>
+        </p:style>
+        <p:txBody>
+          <a:bodyPr rtlCol="0" anchor="ctr"/>
+          <a:lstStyle/>
+          <a:p>
+            <a:pPr algn="ctr"/>
+            <a:endParaRPr lang="en-US"/>
+          </a:p>
+        </p:txBody>
+      </p:sp>
+      <p:sp>
+        <p:nvSpPr>
+          <p:cNvPr id="8" name="Rectangle 7">
+            <a:extLst>
+              <a:ext uri="{FF2B5EF4-FFF2-40B4-BE49-F238E27FC236}">
+                <a16:creationId xmlns:a16="http://schemas.microsoft.com/office/drawing/2014/main" id="{523C82C0-70C3-B347-A9AA-B75D37C19777}"/>
+              </a:ext>
+            </a:extLst>
+          </p:cNvPr>
+          <p:cNvSpPr/>
+          <p:nvPr/>
+        </p:nvSpPr>
+        <p:spPr>
+          <a:xfrm rot="13164033">
+            <a:off x="11030256" y="1657834"/>
+            <a:ext cx="880169" cy="978559"/>
+          </a:xfrm>
+          <a:prstGeom prst="rect">
+            <a:avLst/>
+          </a:prstGeom>
+          <a:solidFill>
+            <a:srgbClr val="44E4C4">
+              <a:alpha val="80000"/>
+            </a:srgbClr>
+          </a:solidFill>
+          <a:ln>
+            <a:solidFill>
+              <a:srgbClr val="44E4C4"/>
+            </a:solidFill>
+          </a:ln>
+        </p:spPr>
+        <p:style>
+          <a:lnRef idx="2">
+            <a:schemeClr val="accent1">
+              <a:shade val="50000"/>
+            </a:schemeClr>
+          </a:lnRef>
+          <a:fillRef idx="1">
+            <a:schemeClr val="accent1"/>
+          </a:fillRef>
+          <a:effectRef idx="0">
+            <a:schemeClr val="accent1"/>
+          </a:effectRef>
+          <a:fontRef idx="minor">
+            <a:schemeClr val="lt1"/>
+          </a:fontRef>
+        </p:style>
+        <p:txBody>
+          <a:bodyPr rtlCol="0" anchor="ctr"/>
+          <a:lstStyle/>
+          <a:p>
+            <a:pPr algn="ctr"/>
+            <a:endParaRPr lang="en-US"/>
+          </a:p>
+        </p:txBody>
+      </p:sp>
+      <p:sp>
+        <p:nvSpPr>
+          <p:cNvPr id="9" name="Title 1">
+            <a:extLst>
+              <a:ext uri="{FF2B5EF4-FFF2-40B4-BE49-F238E27FC236}">
+                <a16:creationId xmlns:a16="http://schemas.microsoft.com/office/drawing/2014/main" id="{0102CC5F-E7D1-A54C-93CA-FC20B1FB2E73}"/>
+              </a:ext>
+            </a:extLst>
+          </p:cNvPr>
+          <p:cNvSpPr>
+            <a:spLocks noGrp="1"/>
+          </p:cNvSpPr>
+          <p:nvPr>
+            <p:ph type="title"/>
+          </p:nvPr>
+        </p:nvSpPr>
+        <p:spPr>
+          <a:xfrm>
+            <a:off x="643467" y="321735"/>
+            <a:ext cx="10905066" cy="634806"/>
+          </a:xfrm>
+        </p:spPr>
+        <p:txBody>
+          <a:bodyPr>
+            <a:normAutofit/>
+          </a:bodyPr>
+          <a:lstStyle/>
+          <a:p>
+            <a:pPr algn="ctr"/>
+            <a:r>
+              <a:rPr lang="en-US" sz="3600" b="1" dirty="0">
+                <a:latin typeface="Calibri" panose="020F0502020204030204" pitchFamily="34" charset="0"/>
+                <a:cs typeface="Calibri" panose="020F0502020204030204" pitchFamily="34" charset="0"/>
+              </a:rPr>
+              <a:t>Top 3 Factors for Turnover</a:t>
+            </a:r>
+            <a:endParaRPr lang="en-US" sz="3600" b="1" cap="none" dirty="0">
+              <a:latin typeface="Calibri" panose="020F0502020204030204" pitchFamily="34" charset="0"/>
+              <a:cs typeface="Calibri" panose="020F0502020204030204" pitchFamily="34" charset="0"/>
+            </a:endParaRPr>
+          </a:p>
+        </p:txBody>
+      </p:sp>
+      <p:pic>
+        <p:nvPicPr>
+          <p:cNvPr id="10" name="Picture 9">
+            <a:extLst>
+              <a:ext uri="{FF2B5EF4-FFF2-40B4-BE49-F238E27FC236}">
+                <a16:creationId xmlns:a16="http://schemas.microsoft.com/office/drawing/2014/main" id="{A2B514E4-898A-4549-B1CB-EBBB9B0E081A}"/>
+              </a:ext>
+            </a:extLst>
+          </p:cNvPr>
+          <p:cNvPicPr>
+            <a:picLocks noChangeAspect="1"/>
+          </p:cNvPicPr>
+          <p:nvPr/>
+        </p:nvPicPr>
+        <p:blipFill>
+          <a:blip r:embed="rId2"/>
+          <a:stretch>
+            <a:fillRect/>
+          </a:stretch>
+        </p:blipFill>
+        <p:spPr>
+          <a:xfrm>
+            <a:off x="1944467" y="1080291"/>
+            <a:ext cx="3606393" cy="2588503"/>
+          </a:xfrm>
+          <a:prstGeom prst="rect">
+            <a:avLst/>
+          </a:prstGeom>
+        </p:spPr>
+      </p:pic>
+      <p:pic>
+        <p:nvPicPr>
+          <p:cNvPr id="12" name="Picture 11">
+            <a:extLst>
+              <a:ext uri="{FF2B5EF4-FFF2-40B4-BE49-F238E27FC236}">
+                <a16:creationId xmlns:a16="http://schemas.microsoft.com/office/drawing/2014/main" id="{3CDDE65B-C5F4-4DF6-BCD6-98B5930C7C93}"/>
+              </a:ext>
+            </a:extLst>
+          </p:cNvPr>
+          <p:cNvPicPr>
+            <a:picLocks noChangeAspect="1"/>
+          </p:cNvPicPr>
+          <p:nvPr/>
+        </p:nvPicPr>
+        <p:blipFill>
+          <a:blip r:embed="rId3"/>
+          <a:stretch>
+            <a:fillRect/>
+          </a:stretch>
+        </p:blipFill>
+        <p:spPr>
+          <a:xfrm>
+            <a:off x="6095999" y="1093108"/>
+            <a:ext cx="3598305" cy="2575686"/>
+          </a:xfrm>
+          <a:prstGeom prst="rect">
+            <a:avLst/>
+          </a:prstGeom>
+        </p:spPr>
+      </p:pic>
+      <p:pic>
+        <p:nvPicPr>
+          <p:cNvPr id="2" name="Picture 1">
+            <a:extLst>
+              <a:ext uri="{FF2B5EF4-FFF2-40B4-BE49-F238E27FC236}">
+                <a16:creationId xmlns:a16="http://schemas.microsoft.com/office/drawing/2014/main" id="{55304A3E-F6A5-4CF9-B573-010E7C30C547}"/>
+              </a:ext>
+            </a:extLst>
+          </p:cNvPr>
+          <p:cNvPicPr>
+            <a:picLocks noChangeAspect="1"/>
+          </p:cNvPicPr>
+          <p:nvPr/>
+        </p:nvPicPr>
+        <p:blipFill>
+          <a:blip r:embed="rId4"/>
+          <a:stretch>
+            <a:fillRect/>
+          </a:stretch>
+        </p:blipFill>
+        <p:spPr>
+          <a:xfrm>
+            <a:off x="3770982" y="3816908"/>
+            <a:ext cx="4083479" cy="2954422"/>
+          </a:xfrm>
+          <a:prstGeom prst="rect">
+            <a:avLst/>
+          </a:prstGeom>
+        </p:spPr>
+      </p:pic>
+    </p:spTree>
+    <p:extLst>
+      <p:ext uri="{BB962C8B-B14F-4D97-AF65-F5344CB8AC3E}">
+        <p14:creationId xmlns:p14="http://schemas.microsoft.com/office/powerpoint/2010/main" val="2148364705"/>
+      </p:ext>
+    </p:extLst>
+  </p:cSld>
+  <p:clrMapOvr>
+    <a:masterClrMapping/>
+  </p:clrMapOvr>
+</p:sld>
+</file>
+
+<file path=ppt/slides/slide18.xml><?xml version="1.0" encoding="utf-8"?>
 <p:sld xmlns:a="http://schemas.openxmlformats.org/drawingml/2006/main" xmlns:r="http://schemas.openxmlformats.org/officeDocument/2006/relationships" xmlns:p="http://schemas.openxmlformats.org/presentationml/2006/main">
   <p:cSld>
     <p:spTree>
@@ -10190,7 +10786,7 @@
 </p:sld>
 </file>
 
-<file path=ppt/slides/slide18.xml><?xml version="1.0" encoding="utf-8"?>
+<file path=ppt/slides/slide19.xml><?xml version="1.0" encoding="utf-8"?>
 <p:sld xmlns:a="http://schemas.openxmlformats.org/drawingml/2006/main" xmlns:r="http://schemas.openxmlformats.org/officeDocument/2006/relationships" xmlns:p="http://schemas.openxmlformats.org/presentationml/2006/main">
   <p:cSld>
     <p:spTree>
@@ -10499,294 +11095,6 @@
     <p:extLst>
       <p:ext uri="{BB962C8B-B14F-4D97-AF65-F5344CB8AC3E}">
         <p14:creationId xmlns:p14="http://schemas.microsoft.com/office/powerpoint/2010/main" val="1075486083"/>
-      </p:ext>
-    </p:extLst>
-  </p:cSld>
-  <p:clrMapOvr>
-    <a:masterClrMapping/>
-  </p:clrMapOvr>
-</p:sld>
-</file>
-
-<file path=ppt/slides/slide19.xml><?xml version="1.0" encoding="utf-8"?>
-<p:sld xmlns:a="http://schemas.openxmlformats.org/drawingml/2006/main" xmlns:r="http://schemas.openxmlformats.org/officeDocument/2006/relationships" xmlns:p="http://schemas.openxmlformats.org/presentationml/2006/main">
-  <p:cSld>
-    <p:spTree>
-      <p:nvGrpSpPr>
-        <p:cNvPr id="1" name=""/>
-        <p:cNvGrpSpPr/>
-        <p:nvPr/>
-      </p:nvGrpSpPr>
-      <p:grpSpPr>
-        <a:xfrm>
-          <a:off x="0" y="0"/>
-          <a:ext cx="0" cy="0"/>
-          <a:chOff x="0" y="0"/>
-          <a:chExt cx="0" cy="0"/>
-        </a:xfrm>
-      </p:grpSpPr>
-      <p:sp>
-        <p:nvSpPr>
-          <p:cNvPr id="5" name="Right Triangle 4">
-            <a:extLst>
-              <a:ext uri="{FF2B5EF4-FFF2-40B4-BE49-F238E27FC236}">
-                <a16:creationId xmlns:a16="http://schemas.microsoft.com/office/drawing/2014/main" id="{5488A745-4D79-6747-B65A-803B31C1F8B4}"/>
-              </a:ext>
-            </a:extLst>
-          </p:cNvPr>
-          <p:cNvSpPr/>
-          <p:nvPr/>
-        </p:nvSpPr>
-        <p:spPr>
-          <a:xfrm rot="13068536">
-            <a:off x="-809065" y="4275183"/>
-            <a:ext cx="1600200" cy="2061882"/>
-          </a:xfrm>
-          <a:prstGeom prst="rtTriangle">
-            <a:avLst/>
-          </a:prstGeom>
-          <a:solidFill>
-            <a:srgbClr val="44E4C4"/>
-          </a:solidFill>
-          <a:ln>
-            <a:solidFill>
-              <a:srgbClr val="44E4C4"/>
-            </a:solidFill>
-          </a:ln>
-        </p:spPr>
-        <p:style>
-          <a:lnRef idx="2">
-            <a:schemeClr val="accent1">
-              <a:shade val="50000"/>
-            </a:schemeClr>
-          </a:lnRef>
-          <a:fillRef idx="1">
-            <a:schemeClr val="accent1"/>
-          </a:fillRef>
-          <a:effectRef idx="0">
-            <a:schemeClr val="accent1"/>
-          </a:effectRef>
-          <a:fontRef idx="minor">
-            <a:schemeClr val="lt1"/>
-          </a:fontRef>
-        </p:style>
-        <p:txBody>
-          <a:bodyPr rtlCol="0" anchor="ctr"/>
-          <a:lstStyle/>
-          <a:p>
-            <a:pPr algn="ctr"/>
-            <a:endParaRPr lang="en-US"/>
-          </a:p>
-        </p:txBody>
-      </p:sp>
-      <p:sp>
-        <p:nvSpPr>
-          <p:cNvPr id="6" name="Rectangle 5">
-            <a:extLst>
-              <a:ext uri="{FF2B5EF4-FFF2-40B4-BE49-F238E27FC236}">
-                <a16:creationId xmlns:a16="http://schemas.microsoft.com/office/drawing/2014/main" id="{67C63295-B221-9A4E-BA44-2C4B26CF7FDE}"/>
-              </a:ext>
-            </a:extLst>
-          </p:cNvPr>
-          <p:cNvSpPr/>
-          <p:nvPr/>
-        </p:nvSpPr>
-        <p:spPr>
-          <a:xfrm rot="2351297">
-            <a:off x="281204" y="5024303"/>
-            <a:ext cx="880169" cy="978559"/>
-          </a:xfrm>
-          <a:prstGeom prst="rect">
-            <a:avLst/>
-          </a:prstGeom>
-          <a:solidFill>
-            <a:srgbClr val="2E27C7">
-              <a:alpha val="80000"/>
-            </a:srgbClr>
-          </a:solidFill>
-        </p:spPr>
-        <p:style>
-          <a:lnRef idx="2">
-            <a:schemeClr val="accent1">
-              <a:shade val="50000"/>
-            </a:schemeClr>
-          </a:lnRef>
-          <a:fillRef idx="1">
-            <a:schemeClr val="accent1"/>
-          </a:fillRef>
-          <a:effectRef idx="0">
-            <a:schemeClr val="accent1"/>
-          </a:effectRef>
-          <a:fontRef idx="minor">
-            <a:schemeClr val="lt1"/>
-          </a:fontRef>
-        </p:style>
-        <p:txBody>
-          <a:bodyPr rtlCol="0" anchor="ctr"/>
-          <a:lstStyle/>
-          <a:p>
-            <a:pPr algn="ctr"/>
-            <a:endParaRPr lang="en-US"/>
-          </a:p>
-        </p:txBody>
-      </p:sp>
-      <p:sp>
-        <p:nvSpPr>
-          <p:cNvPr id="7" name="Right Triangle 6">
-            <a:extLst>
-              <a:ext uri="{FF2B5EF4-FFF2-40B4-BE49-F238E27FC236}">
-                <a16:creationId xmlns:a16="http://schemas.microsoft.com/office/drawing/2014/main" id="{E9A9D123-E73C-5749-962A-D162E22D504C}"/>
-              </a:ext>
-            </a:extLst>
-          </p:cNvPr>
-          <p:cNvSpPr/>
-          <p:nvPr/>
-        </p:nvSpPr>
-        <p:spPr>
-          <a:xfrm rot="2259401">
-            <a:off x="11399428" y="428828"/>
-            <a:ext cx="1600200" cy="2066544"/>
-          </a:xfrm>
-          <a:prstGeom prst="rtTriangle">
-            <a:avLst/>
-          </a:prstGeom>
-          <a:solidFill>
-            <a:srgbClr val="2E27C7"/>
-          </a:solidFill>
-          <a:ln>
-            <a:solidFill>
-              <a:srgbClr val="2E27C7"/>
-            </a:solidFill>
-          </a:ln>
-        </p:spPr>
-        <p:style>
-          <a:lnRef idx="2">
-            <a:schemeClr val="accent1">
-              <a:shade val="50000"/>
-            </a:schemeClr>
-          </a:lnRef>
-          <a:fillRef idx="1">
-            <a:schemeClr val="accent1"/>
-          </a:fillRef>
-          <a:effectRef idx="0">
-            <a:schemeClr val="accent1"/>
-          </a:effectRef>
-          <a:fontRef idx="minor">
-            <a:schemeClr val="lt1"/>
-          </a:fontRef>
-        </p:style>
-        <p:txBody>
-          <a:bodyPr rtlCol="0" anchor="ctr"/>
-          <a:lstStyle/>
-          <a:p>
-            <a:pPr algn="ctr"/>
-            <a:endParaRPr lang="en-US"/>
-          </a:p>
-        </p:txBody>
-      </p:sp>
-      <p:sp>
-        <p:nvSpPr>
-          <p:cNvPr id="8" name="Rectangle 7">
-            <a:extLst>
-              <a:ext uri="{FF2B5EF4-FFF2-40B4-BE49-F238E27FC236}">
-                <a16:creationId xmlns:a16="http://schemas.microsoft.com/office/drawing/2014/main" id="{523C82C0-70C3-B347-A9AA-B75D37C19777}"/>
-              </a:ext>
-            </a:extLst>
-          </p:cNvPr>
-          <p:cNvSpPr/>
-          <p:nvPr/>
-        </p:nvSpPr>
-        <p:spPr>
-          <a:xfrm rot="13164033">
-            <a:off x="11030256" y="1657834"/>
-            <a:ext cx="880169" cy="978559"/>
-          </a:xfrm>
-          <a:prstGeom prst="rect">
-            <a:avLst/>
-          </a:prstGeom>
-          <a:solidFill>
-            <a:srgbClr val="44E4C4">
-              <a:alpha val="80000"/>
-            </a:srgbClr>
-          </a:solidFill>
-          <a:ln>
-            <a:solidFill>
-              <a:srgbClr val="44E4C4"/>
-            </a:solidFill>
-          </a:ln>
-        </p:spPr>
-        <p:style>
-          <a:lnRef idx="2">
-            <a:schemeClr val="accent1">
-              <a:shade val="50000"/>
-            </a:schemeClr>
-          </a:lnRef>
-          <a:fillRef idx="1">
-            <a:schemeClr val="accent1"/>
-          </a:fillRef>
-          <a:effectRef idx="0">
-            <a:schemeClr val="accent1"/>
-          </a:effectRef>
-          <a:fontRef idx="minor">
-            <a:schemeClr val="lt1"/>
-          </a:fontRef>
-        </p:style>
-        <p:txBody>
-          <a:bodyPr rtlCol="0" anchor="ctr"/>
-          <a:lstStyle/>
-          <a:p>
-            <a:pPr algn="ctr"/>
-            <a:endParaRPr lang="en-US"/>
-          </a:p>
-        </p:txBody>
-      </p:sp>
-      <p:sp>
-        <p:nvSpPr>
-          <p:cNvPr id="9" name="Title 1">
-            <a:extLst>
-              <a:ext uri="{FF2B5EF4-FFF2-40B4-BE49-F238E27FC236}">
-                <a16:creationId xmlns:a16="http://schemas.microsoft.com/office/drawing/2014/main" id="{DF4B9AD8-E4FC-FA40-8BCA-CF0480A9D206}"/>
-              </a:ext>
-            </a:extLst>
-          </p:cNvPr>
-          <p:cNvSpPr>
-            <a:spLocks noGrp="1"/>
-          </p:cNvSpPr>
-          <p:nvPr>
-            <p:ph type="title"/>
-          </p:nvPr>
-        </p:nvSpPr>
-        <p:spPr>
-          <a:xfrm>
-            <a:off x="643467" y="321735"/>
-            <a:ext cx="10905066" cy="634806"/>
-          </a:xfrm>
-        </p:spPr>
-        <p:txBody>
-          <a:bodyPr>
-            <a:normAutofit/>
-          </a:bodyPr>
-          <a:lstStyle/>
-          <a:p>
-            <a:pPr algn="ctr"/>
-            <a:r>
-              <a:rPr lang="en-US" sz="3600" b="1" dirty="0">
-                <a:latin typeface="Calibri" panose="020F0502020204030204" pitchFamily="34" charset="0"/>
-                <a:cs typeface="Calibri" panose="020F0502020204030204" pitchFamily="34" charset="0"/>
-              </a:rPr>
-              <a:t>Summary</a:t>
-            </a:r>
-            <a:endParaRPr lang="en-US" sz="3600" b="1" cap="none" dirty="0">
-              <a:latin typeface="Calibri" panose="020F0502020204030204" pitchFamily="34" charset="0"/>
-              <a:cs typeface="Calibri" panose="020F0502020204030204" pitchFamily="34" charset="0"/>
-            </a:endParaRPr>
-          </a:p>
-        </p:txBody>
-      </p:sp>
-    </p:spTree>
-    <p:extLst>
-      <p:ext uri="{BB962C8B-B14F-4D97-AF65-F5344CB8AC3E}">
-        <p14:creationId xmlns:p14="http://schemas.microsoft.com/office/powerpoint/2010/main" val="2642334168"/>
       </p:ext>
     </p:extLst>
   </p:cSld>
@@ -11688,7 +11996,7 @@
                 <a:latin typeface="Calibri" panose="020F0502020204030204" pitchFamily="34" charset="0"/>
                 <a:cs typeface="Calibri" panose="020F0502020204030204" pitchFamily="34" charset="0"/>
               </a:rPr>
-              <a:t>Contact Information</a:t>
+              <a:t>Summary</a:t>
             </a:r>
             <a:endParaRPr lang="en-US" sz="3600" b="1" cap="none" dirty="0">
               <a:latin typeface="Calibri" panose="020F0502020204030204" pitchFamily="34" charset="0"/>
@@ -11697,10 +12005,1167 @@
           </a:p>
         </p:txBody>
       </p:sp>
+      <p:sp>
+        <p:nvSpPr>
+          <p:cNvPr id="10" name="Content Placeholder 3">
+            <a:extLst>
+              <a:ext uri="{FF2B5EF4-FFF2-40B4-BE49-F238E27FC236}">
+                <a16:creationId xmlns:a16="http://schemas.microsoft.com/office/drawing/2014/main" id="{711207F1-4A36-4478-AAE1-4383ACC20005}"/>
+              </a:ext>
+            </a:extLst>
+          </p:cNvPr>
+          <p:cNvSpPr>
+            <a:spLocks noGrp="1"/>
+          </p:cNvSpPr>
+          <p:nvPr>
+            <p:ph idx="1"/>
+          </p:nvPr>
+        </p:nvSpPr>
+        <p:spPr>
+          <a:xfrm>
+            <a:off x="1379787" y="1670241"/>
+            <a:ext cx="9486901" cy="4324272"/>
+          </a:xfrm>
+        </p:spPr>
+        <p:txBody>
+          <a:bodyPr/>
+          <a:lstStyle/>
+          <a:p>
+            <a:r>
+              <a:rPr lang="en-US" dirty="0">
+                <a:latin typeface="Calibri" panose="020F0502020204030204" pitchFamily="34" charset="0"/>
+                <a:cs typeface="Calibri" panose="020F0502020204030204" pitchFamily="34" charset="0"/>
+              </a:rPr>
+              <a:t>Top 3 factors that contribute to employee turnover are Age, Monthly Income, and Job Role.</a:t>
+            </a:r>
+          </a:p>
+          <a:p>
+            <a:pPr marL="0" indent="0">
+              <a:buNone/>
+            </a:pPr>
+            <a:endParaRPr lang="en-US" dirty="0">
+              <a:latin typeface="Calibri" panose="020F0502020204030204" pitchFamily="34" charset="0"/>
+              <a:cs typeface="Calibri" panose="020F0502020204030204" pitchFamily="34" charset="0"/>
+            </a:endParaRPr>
+          </a:p>
+          <a:p>
+            <a:r>
+              <a:rPr lang="en-US" dirty="0">
+                <a:latin typeface="Calibri" panose="020F0502020204030204" pitchFamily="34" charset="0"/>
+                <a:cs typeface="Calibri" panose="020F0502020204030204" pitchFamily="34" charset="0"/>
+              </a:rPr>
+              <a:t>Sales Representative have the highest turnover.</a:t>
+            </a:r>
+          </a:p>
+          <a:p>
+            <a:pPr marL="0" indent="0">
+              <a:buNone/>
+            </a:pPr>
+            <a:endParaRPr lang="en-US" dirty="0">
+              <a:latin typeface="Calibri" panose="020F0502020204030204" pitchFamily="34" charset="0"/>
+              <a:cs typeface="Calibri" panose="020F0502020204030204" pitchFamily="34" charset="0"/>
+            </a:endParaRPr>
+          </a:p>
+          <a:p>
+            <a:r>
+              <a:rPr lang="en-US" dirty="0">
+                <a:latin typeface="Calibri" panose="020F0502020204030204" pitchFamily="34" charset="0"/>
+                <a:cs typeface="Calibri" panose="020F0502020204030204" pitchFamily="34" charset="0"/>
+              </a:rPr>
+              <a:t>Manufacturing Director, Research Director and Managers are the oldest, have most income and have the least amount of turnover.</a:t>
+            </a:r>
+          </a:p>
+          <a:p>
+            <a:endParaRPr lang="en-US" dirty="0">
+              <a:latin typeface="Calibri" panose="020F0502020204030204" pitchFamily="34" charset="0"/>
+              <a:cs typeface="Calibri" panose="020F0502020204030204" pitchFamily="34" charset="0"/>
+            </a:endParaRPr>
+          </a:p>
+          <a:p>
+            <a:pPr marL="457200" lvl="1" indent="0">
+              <a:buNone/>
+            </a:pPr>
+            <a:endParaRPr lang="en-US" sz="2800" dirty="0">
+              <a:latin typeface="Calibri" panose="020F0502020204030204" pitchFamily="34" charset="0"/>
+              <a:cs typeface="Calibri" panose="020F0502020204030204" pitchFamily="34" charset="0"/>
+            </a:endParaRPr>
+          </a:p>
+          <a:p>
+            <a:endParaRPr lang="en-US" dirty="0">
+              <a:latin typeface="Calibri" panose="020F0502020204030204" pitchFamily="34" charset="0"/>
+              <a:cs typeface="Calibri" panose="020F0502020204030204" pitchFamily="34" charset="0"/>
+            </a:endParaRPr>
+          </a:p>
+          <a:p>
+            <a:pPr marL="457200" lvl="1" indent="0">
+              <a:buNone/>
+            </a:pPr>
+            <a:endParaRPr lang="en-US" sz="2400" dirty="0">
+              <a:latin typeface="Calibri" panose="020F0502020204030204" pitchFamily="34" charset="0"/>
+              <a:cs typeface="Calibri" panose="020F0502020204030204" pitchFamily="34" charset="0"/>
+            </a:endParaRPr>
+          </a:p>
+        </p:txBody>
+      </p:sp>
     </p:spTree>
     <p:extLst>
       <p:ext uri="{BB962C8B-B14F-4D97-AF65-F5344CB8AC3E}">
-        <p14:creationId xmlns:p14="http://schemas.microsoft.com/office/powerpoint/2010/main" val="658250400"/>
+        <p14:creationId xmlns:p14="http://schemas.microsoft.com/office/powerpoint/2010/main" val="2642334168"/>
+      </p:ext>
+    </p:extLst>
+  </p:cSld>
+  <p:clrMapOvr>
+    <a:masterClrMapping/>
+  </p:clrMapOvr>
+  <p:timing>
+    <p:tnLst>
+      <p:par>
+        <p:cTn id="1" dur="indefinite" restart="never" nodeType="tmRoot">
+          <p:childTnLst>
+            <p:seq concurrent="1" nextAc="seek">
+              <p:cTn id="2" dur="indefinite" nodeType="mainSeq">
+                <p:childTnLst>
+                  <p:par>
+                    <p:cTn id="3" fill="hold">
+                      <p:stCondLst>
+                        <p:cond delay="indefinite"/>
+                      </p:stCondLst>
+                      <p:childTnLst>
+                        <p:par>
+                          <p:cTn id="4" fill="hold">
+                            <p:stCondLst>
+                              <p:cond delay="0"/>
+                            </p:stCondLst>
+                            <p:childTnLst>
+                              <p:par>
+                                <p:cTn id="5" presetID="10" presetClass="entr" presetSubtype="0" fill="hold" nodeType="clickEffect">
+                                  <p:stCondLst>
+                                    <p:cond delay="0"/>
+                                  </p:stCondLst>
+                                  <p:childTnLst>
+                                    <p:set>
+                                      <p:cBhvr>
+                                        <p:cTn id="6" dur="1" fill="hold">
+                                          <p:stCondLst>
+                                            <p:cond delay="0"/>
+                                          </p:stCondLst>
+                                        </p:cTn>
+                                        <p:tgtEl>
+                                          <p:spTgt spid="10">
+                                            <p:txEl>
+                                              <p:pRg st="2" end="2"/>
+                                            </p:txEl>
+                                          </p:spTgt>
+                                        </p:tgtEl>
+                                        <p:attrNameLst>
+                                          <p:attrName>style.visibility</p:attrName>
+                                        </p:attrNameLst>
+                                      </p:cBhvr>
+                                      <p:to>
+                                        <p:strVal val="visible"/>
+                                      </p:to>
+                                    </p:set>
+                                    <p:animEffect transition="in" filter="fade">
+                                      <p:cBhvr>
+                                        <p:cTn id="7" dur="500"/>
+                                        <p:tgtEl>
+                                          <p:spTgt spid="10">
+                                            <p:txEl>
+                                              <p:pRg st="2" end="2"/>
+                                            </p:txEl>
+                                          </p:spTgt>
+                                        </p:tgtEl>
+                                      </p:cBhvr>
+                                    </p:animEffect>
+                                  </p:childTnLst>
+                                </p:cTn>
+                              </p:par>
+                            </p:childTnLst>
+                          </p:cTn>
+                        </p:par>
+                      </p:childTnLst>
+                    </p:cTn>
+                  </p:par>
+                  <p:par>
+                    <p:cTn id="8" fill="hold">
+                      <p:stCondLst>
+                        <p:cond delay="indefinite"/>
+                      </p:stCondLst>
+                      <p:childTnLst>
+                        <p:par>
+                          <p:cTn id="9" fill="hold">
+                            <p:stCondLst>
+                              <p:cond delay="0"/>
+                            </p:stCondLst>
+                            <p:childTnLst>
+                              <p:par>
+                                <p:cTn id="10" presetID="10" presetClass="entr" presetSubtype="0" fill="hold" nodeType="clickEffect">
+                                  <p:stCondLst>
+                                    <p:cond delay="0"/>
+                                  </p:stCondLst>
+                                  <p:childTnLst>
+                                    <p:set>
+                                      <p:cBhvr>
+                                        <p:cTn id="11" dur="1" fill="hold">
+                                          <p:stCondLst>
+                                            <p:cond delay="0"/>
+                                          </p:stCondLst>
+                                        </p:cTn>
+                                        <p:tgtEl>
+                                          <p:spTgt spid="10">
+                                            <p:txEl>
+                                              <p:pRg st="4" end="4"/>
+                                            </p:txEl>
+                                          </p:spTgt>
+                                        </p:tgtEl>
+                                        <p:attrNameLst>
+                                          <p:attrName>style.visibility</p:attrName>
+                                        </p:attrNameLst>
+                                      </p:cBhvr>
+                                      <p:to>
+                                        <p:strVal val="visible"/>
+                                      </p:to>
+                                    </p:set>
+                                    <p:animEffect transition="in" filter="fade">
+                                      <p:cBhvr>
+                                        <p:cTn id="12" dur="500"/>
+                                        <p:tgtEl>
+                                          <p:spTgt spid="10">
+                                            <p:txEl>
+                                              <p:pRg st="4" end="4"/>
+                                            </p:txEl>
+                                          </p:spTgt>
+                                        </p:tgtEl>
+                                      </p:cBhvr>
+                                    </p:animEffect>
+                                  </p:childTnLst>
+                                </p:cTn>
+                              </p:par>
+                            </p:childTnLst>
+                          </p:cTn>
+                        </p:par>
+                      </p:childTnLst>
+                    </p:cTn>
+                  </p:par>
+                </p:childTnLst>
+              </p:cTn>
+              <p:prevCondLst>
+                <p:cond evt="onPrev" delay="0">
+                  <p:tgtEl>
+                    <p:sldTgt/>
+                  </p:tgtEl>
+                </p:cond>
+              </p:prevCondLst>
+              <p:nextCondLst>
+                <p:cond evt="onNext" delay="0">
+                  <p:tgtEl>
+                    <p:sldTgt/>
+                  </p:tgtEl>
+                </p:cond>
+              </p:nextCondLst>
+            </p:seq>
+          </p:childTnLst>
+        </p:cTn>
+      </p:par>
+    </p:tnLst>
+  </p:timing>
+</p:sld>
+</file>
+
+<file path=ppt/slides/slide21.xml><?xml version="1.0" encoding="utf-8"?>
+<p:sld xmlns:a="http://schemas.openxmlformats.org/drawingml/2006/main" xmlns:r="http://schemas.openxmlformats.org/officeDocument/2006/relationships" xmlns:p="http://schemas.openxmlformats.org/presentationml/2006/main">
+  <p:cSld>
+    <p:spTree>
+      <p:nvGrpSpPr>
+        <p:cNvPr id="1" name=""/>
+        <p:cNvGrpSpPr/>
+        <p:nvPr/>
+      </p:nvGrpSpPr>
+      <p:grpSpPr>
+        <a:xfrm>
+          <a:off x="0" y="0"/>
+          <a:ext cx="0" cy="0"/>
+          <a:chOff x="0" y="0"/>
+          <a:chExt cx="0" cy="0"/>
+        </a:xfrm>
+      </p:grpSpPr>
+      <p:sp>
+        <p:nvSpPr>
+          <p:cNvPr id="5" name="Right Triangle 4">
+            <a:extLst>
+              <a:ext uri="{FF2B5EF4-FFF2-40B4-BE49-F238E27FC236}">
+                <a16:creationId xmlns:a16="http://schemas.microsoft.com/office/drawing/2014/main" id="{5488A745-4D79-6747-B65A-803B31C1F8B4}"/>
+              </a:ext>
+            </a:extLst>
+          </p:cNvPr>
+          <p:cNvSpPr/>
+          <p:nvPr/>
+        </p:nvSpPr>
+        <p:spPr>
+          <a:xfrm rot="13068536">
+            <a:off x="-809065" y="4275183"/>
+            <a:ext cx="1600200" cy="2061882"/>
+          </a:xfrm>
+          <a:prstGeom prst="rtTriangle">
+            <a:avLst/>
+          </a:prstGeom>
+          <a:solidFill>
+            <a:srgbClr val="44E4C4"/>
+          </a:solidFill>
+          <a:ln>
+            <a:solidFill>
+              <a:srgbClr val="44E4C4"/>
+            </a:solidFill>
+          </a:ln>
+        </p:spPr>
+        <p:style>
+          <a:lnRef idx="2">
+            <a:schemeClr val="accent1">
+              <a:shade val="50000"/>
+            </a:schemeClr>
+          </a:lnRef>
+          <a:fillRef idx="1">
+            <a:schemeClr val="accent1"/>
+          </a:fillRef>
+          <a:effectRef idx="0">
+            <a:schemeClr val="accent1"/>
+          </a:effectRef>
+          <a:fontRef idx="minor">
+            <a:schemeClr val="lt1"/>
+          </a:fontRef>
+        </p:style>
+        <p:txBody>
+          <a:bodyPr rtlCol="0" anchor="ctr"/>
+          <a:lstStyle/>
+          <a:p>
+            <a:pPr algn="ctr"/>
+            <a:endParaRPr lang="en-US"/>
+          </a:p>
+        </p:txBody>
+      </p:sp>
+      <p:sp>
+        <p:nvSpPr>
+          <p:cNvPr id="6" name="Rectangle 5">
+            <a:extLst>
+              <a:ext uri="{FF2B5EF4-FFF2-40B4-BE49-F238E27FC236}">
+                <a16:creationId xmlns:a16="http://schemas.microsoft.com/office/drawing/2014/main" id="{67C63295-B221-9A4E-BA44-2C4B26CF7FDE}"/>
+              </a:ext>
+            </a:extLst>
+          </p:cNvPr>
+          <p:cNvSpPr/>
+          <p:nvPr/>
+        </p:nvSpPr>
+        <p:spPr>
+          <a:xfrm rot="2351297">
+            <a:off x="281204" y="5024303"/>
+            <a:ext cx="880169" cy="978559"/>
+          </a:xfrm>
+          <a:prstGeom prst="rect">
+            <a:avLst/>
+          </a:prstGeom>
+          <a:solidFill>
+            <a:srgbClr val="2E27C7">
+              <a:alpha val="80000"/>
+            </a:srgbClr>
+          </a:solidFill>
+        </p:spPr>
+        <p:style>
+          <a:lnRef idx="2">
+            <a:schemeClr val="accent1">
+              <a:shade val="50000"/>
+            </a:schemeClr>
+          </a:lnRef>
+          <a:fillRef idx="1">
+            <a:schemeClr val="accent1"/>
+          </a:fillRef>
+          <a:effectRef idx="0">
+            <a:schemeClr val="accent1"/>
+          </a:effectRef>
+          <a:fontRef idx="minor">
+            <a:schemeClr val="lt1"/>
+          </a:fontRef>
+        </p:style>
+        <p:txBody>
+          <a:bodyPr rtlCol="0" anchor="ctr"/>
+          <a:lstStyle/>
+          <a:p>
+            <a:pPr algn="ctr"/>
+            <a:endParaRPr lang="en-US"/>
+          </a:p>
+        </p:txBody>
+      </p:sp>
+      <p:sp>
+        <p:nvSpPr>
+          <p:cNvPr id="7" name="Right Triangle 6">
+            <a:extLst>
+              <a:ext uri="{FF2B5EF4-FFF2-40B4-BE49-F238E27FC236}">
+                <a16:creationId xmlns:a16="http://schemas.microsoft.com/office/drawing/2014/main" id="{E9A9D123-E73C-5749-962A-D162E22D504C}"/>
+              </a:ext>
+            </a:extLst>
+          </p:cNvPr>
+          <p:cNvSpPr/>
+          <p:nvPr/>
+        </p:nvSpPr>
+        <p:spPr>
+          <a:xfrm rot="2259401">
+            <a:off x="11399428" y="428828"/>
+            <a:ext cx="1600200" cy="2066544"/>
+          </a:xfrm>
+          <a:prstGeom prst="rtTriangle">
+            <a:avLst/>
+          </a:prstGeom>
+          <a:solidFill>
+            <a:srgbClr val="2E27C7"/>
+          </a:solidFill>
+          <a:ln>
+            <a:solidFill>
+              <a:srgbClr val="2E27C7"/>
+            </a:solidFill>
+          </a:ln>
+        </p:spPr>
+        <p:style>
+          <a:lnRef idx="2">
+            <a:schemeClr val="accent1">
+              <a:shade val="50000"/>
+            </a:schemeClr>
+          </a:lnRef>
+          <a:fillRef idx="1">
+            <a:schemeClr val="accent1"/>
+          </a:fillRef>
+          <a:effectRef idx="0">
+            <a:schemeClr val="accent1"/>
+          </a:effectRef>
+          <a:fontRef idx="minor">
+            <a:schemeClr val="lt1"/>
+          </a:fontRef>
+        </p:style>
+        <p:txBody>
+          <a:bodyPr rtlCol="0" anchor="ctr"/>
+          <a:lstStyle/>
+          <a:p>
+            <a:pPr algn="ctr"/>
+            <a:endParaRPr lang="en-US"/>
+          </a:p>
+        </p:txBody>
+      </p:sp>
+      <p:sp>
+        <p:nvSpPr>
+          <p:cNvPr id="8" name="Rectangle 7">
+            <a:extLst>
+              <a:ext uri="{FF2B5EF4-FFF2-40B4-BE49-F238E27FC236}">
+                <a16:creationId xmlns:a16="http://schemas.microsoft.com/office/drawing/2014/main" id="{523C82C0-70C3-B347-A9AA-B75D37C19777}"/>
+              </a:ext>
+            </a:extLst>
+          </p:cNvPr>
+          <p:cNvSpPr/>
+          <p:nvPr/>
+        </p:nvSpPr>
+        <p:spPr>
+          <a:xfrm rot="13164033">
+            <a:off x="11030256" y="1657834"/>
+            <a:ext cx="880169" cy="978559"/>
+          </a:xfrm>
+          <a:prstGeom prst="rect">
+            <a:avLst/>
+          </a:prstGeom>
+          <a:solidFill>
+            <a:srgbClr val="44E4C4">
+              <a:alpha val="80000"/>
+            </a:srgbClr>
+          </a:solidFill>
+          <a:ln>
+            <a:solidFill>
+              <a:srgbClr val="44E4C4"/>
+            </a:solidFill>
+          </a:ln>
+        </p:spPr>
+        <p:style>
+          <a:lnRef idx="2">
+            <a:schemeClr val="accent1">
+              <a:shade val="50000"/>
+            </a:schemeClr>
+          </a:lnRef>
+          <a:fillRef idx="1">
+            <a:schemeClr val="accent1"/>
+          </a:fillRef>
+          <a:effectRef idx="0">
+            <a:schemeClr val="accent1"/>
+          </a:effectRef>
+          <a:fontRef idx="minor">
+            <a:schemeClr val="lt1"/>
+          </a:fontRef>
+        </p:style>
+        <p:txBody>
+          <a:bodyPr rtlCol="0" anchor="ctr"/>
+          <a:lstStyle/>
+          <a:p>
+            <a:pPr algn="ctr"/>
+            <a:endParaRPr lang="en-US"/>
+          </a:p>
+        </p:txBody>
+      </p:sp>
+      <p:sp>
+        <p:nvSpPr>
+          <p:cNvPr id="9" name="Title 1">
+            <a:extLst>
+              <a:ext uri="{FF2B5EF4-FFF2-40B4-BE49-F238E27FC236}">
+                <a16:creationId xmlns:a16="http://schemas.microsoft.com/office/drawing/2014/main" id="{DF4B9AD8-E4FC-FA40-8BCA-CF0480A9D206}"/>
+              </a:ext>
+            </a:extLst>
+          </p:cNvPr>
+          <p:cNvSpPr>
+            <a:spLocks noGrp="1"/>
+          </p:cNvSpPr>
+          <p:nvPr>
+            <p:ph type="title"/>
+          </p:nvPr>
+        </p:nvSpPr>
+        <p:spPr>
+          <a:xfrm>
+            <a:off x="643467" y="321735"/>
+            <a:ext cx="10905066" cy="634806"/>
+          </a:xfrm>
+        </p:spPr>
+        <p:txBody>
+          <a:bodyPr>
+            <a:normAutofit/>
+          </a:bodyPr>
+          <a:lstStyle/>
+          <a:p>
+            <a:pPr algn="ctr"/>
+            <a:r>
+              <a:rPr lang="en-US" sz="3600" b="1" dirty="0">
+                <a:latin typeface="Calibri" panose="020F0502020204030204" pitchFamily="34" charset="0"/>
+                <a:cs typeface="Calibri" panose="020F0502020204030204" pitchFamily="34" charset="0"/>
+              </a:rPr>
+              <a:t>Summary</a:t>
+            </a:r>
+            <a:r>
+              <a:rPr lang="en-US" sz="1800" b="1" dirty="0">
+                <a:latin typeface="Calibri" panose="020F0502020204030204" pitchFamily="34" charset="0"/>
+                <a:cs typeface="Calibri" panose="020F0502020204030204" pitchFamily="34" charset="0"/>
+              </a:rPr>
+              <a:t>(Contd.)</a:t>
+            </a:r>
+            <a:endParaRPr lang="en-US" sz="1800" b="1" cap="none" dirty="0">
+              <a:latin typeface="Calibri" panose="020F0502020204030204" pitchFamily="34" charset="0"/>
+              <a:cs typeface="Calibri" panose="020F0502020204030204" pitchFamily="34" charset="0"/>
+            </a:endParaRPr>
+          </a:p>
+        </p:txBody>
+      </p:sp>
+      <p:sp>
+        <p:nvSpPr>
+          <p:cNvPr id="10" name="Content Placeholder 3">
+            <a:extLst>
+              <a:ext uri="{FF2B5EF4-FFF2-40B4-BE49-F238E27FC236}">
+                <a16:creationId xmlns:a16="http://schemas.microsoft.com/office/drawing/2014/main" id="{711207F1-4A36-4478-AAE1-4383ACC20005}"/>
+              </a:ext>
+            </a:extLst>
+          </p:cNvPr>
+          <p:cNvSpPr>
+            <a:spLocks noGrp="1"/>
+          </p:cNvSpPr>
+          <p:nvPr>
+            <p:ph idx="1"/>
+          </p:nvPr>
+        </p:nvSpPr>
+        <p:spPr>
+          <a:xfrm>
+            <a:off x="1379787" y="1670241"/>
+            <a:ext cx="9486901" cy="4324272"/>
+          </a:xfrm>
+        </p:spPr>
+        <p:txBody>
+          <a:bodyPr/>
+          <a:lstStyle/>
+          <a:p>
+            <a:r>
+              <a:rPr lang="en-US" dirty="0">
+                <a:latin typeface="Calibri" panose="020F0502020204030204" pitchFamily="34" charset="0"/>
+                <a:cs typeface="Calibri" panose="020F0502020204030204" pitchFamily="34" charset="0"/>
+              </a:rPr>
+              <a:t>We built a model to predict attrition that had an 87% Accuracy, 90% Sensitivity and 75% Specificity.</a:t>
+            </a:r>
+          </a:p>
+          <a:p>
+            <a:pPr marL="0" indent="0">
+              <a:buNone/>
+            </a:pPr>
+            <a:endParaRPr lang="en-US" dirty="0">
+              <a:latin typeface="Calibri" panose="020F0502020204030204" pitchFamily="34" charset="0"/>
+              <a:cs typeface="Calibri" panose="020F0502020204030204" pitchFamily="34" charset="0"/>
+            </a:endParaRPr>
+          </a:p>
+          <a:p>
+            <a:r>
+              <a:rPr lang="en-US">
+                <a:latin typeface="Calibri" panose="020F0502020204030204" pitchFamily="34" charset="0"/>
+                <a:cs typeface="Calibri" panose="020F0502020204030204" pitchFamily="34" charset="0"/>
+              </a:rPr>
+              <a:t>We built a model </a:t>
+            </a:r>
+            <a:r>
+              <a:rPr lang="en-US" dirty="0">
+                <a:latin typeface="Calibri" panose="020F0502020204030204" pitchFamily="34" charset="0"/>
+                <a:cs typeface="Calibri" panose="020F0502020204030204" pitchFamily="34" charset="0"/>
+              </a:rPr>
+              <a:t>to predict salary had an RMSE of 1080 and P-Value of &lt; 2.2e-16</a:t>
+            </a:r>
+          </a:p>
+          <a:p>
+            <a:pPr marL="457200" lvl="1" indent="0">
+              <a:buNone/>
+            </a:pPr>
+            <a:endParaRPr lang="en-US" sz="2800" dirty="0">
+              <a:latin typeface="Calibri" panose="020F0502020204030204" pitchFamily="34" charset="0"/>
+              <a:cs typeface="Calibri" panose="020F0502020204030204" pitchFamily="34" charset="0"/>
+            </a:endParaRPr>
+          </a:p>
+          <a:p>
+            <a:endParaRPr lang="en-US" dirty="0">
+              <a:latin typeface="Calibri" panose="020F0502020204030204" pitchFamily="34" charset="0"/>
+              <a:cs typeface="Calibri" panose="020F0502020204030204" pitchFamily="34" charset="0"/>
+            </a:endParaRPr>
+          </a:p>
+          <a:p>
+            <a:pPr marL="457200" lvl="1" indent="0">
+              <a:buNone/>
+            </a:pPr>
+            <a:endParaRPr lang="en-US" sz="2400" dirty="0">
+              <a:latin typeface="Calibri" panose="020F0502020204030204" pitchFamily="34" charset="0"/>
+              <a:cs typeface="Calibri" panose="020F0502020204030204" pitchFamily="34" charset="0"/>
+            </a:endParaRPr>
+          </a:p>
+        </p:txBody>
+      </p:sp>
+    </p:spTree>
+    <p:extLst>
+      <p:ext uri="{BB962C8B-B14F-4D97-AF65-F5344CB8AC3E}">
+        <p14:creationId xmlns:p14="http://schemas.microsoft.com/office/powerpoint/2010/main" val="2066871153"/>
+      </p:ext>
+    </p:extLst>
+  </p:cSld>
+  <p:clrMapOvr>
+    <a:masterClrMapping/>
+  </p:clrMapOvr>
+  <p:timing>
+    <p:tnLst>
+      <p:par>
+        <p:cTn id="1" dur="indefinite" restart="never" nodeType="tmRoot">
+          <p:childTnLst>
+            <p:seq concurrent="1" nextAc="seek">
+              <p:cTn id="2" dur="indefinite" nodeType="mainSeq">
+                <p:childTnLst>
+                  <p:par>
+                    <p:cTn id="3" fill="hold">
+                      <p:stCondLst>
+                        <p:cond delay="indefinite"/>
+                      </p:stCondLst>
+                      <p:childTnLst>
+                        <p:par>
+                          <p:cTn id="4" fill="hold">
+                            <p:stCondLst>
+                              <p:cond delay="0"/>
+                            </p:stCondLst>
+                            <p:childTnLst>
+                              <p:par>
+                                <p:cTn id="5" presetID="10" presetClass="entr" presetSubtype="0" fill="hold" nodeType="clickEffect">
+                                  <p:stCondLst>
+                                    <p:cond delay="0"/>
+                                  </p:stCondLst>
+                                  <p:childTnLst>
+                                    <p:set>
+                                      <p:cBhvr>
+                                        <p:cTn id="6" dur="1" fill="hold">
+                                          <p:stCondLst>
+                                            <p:cond delay="0"/>
+                                          </p:stCondLst>
+                                        </p:cTn>
+                                        <p:tgtEl>
+                                          <p:spTgt spid="10">
+                                            <p:txEl>
+                                              <p:pRg st="2" end="2"/>
+                                            </p:txEl>
+                                          </p:spTgt>
+                                        </p:tgtEl>
+                                        <p:attrNameLst>
+                                          <p:attrName>style.visibility</p:attrName>
+                                        </p:attrNameLst>
+                                      </p:cBhvr>
+                                      <p:to>
+                                        <p:strVal val="visible"/>
+                                      </p:to>
+                                    </p:set>
+                                    <p:animEffect transition="in" filter="fade">
+                                      <p:cBhvr>
+                                        <p:cTn id="7" dur="500"/>
+                                        <p:tgtEl>
+                                          <p:spTgt spid="10">
+                                            <p:txEl>
+                                              <p:pRg st="2" end="2"/>
+                                            </p:txEl>
+                                          </p:spTgt>
+                                        </p:tgtEl>
+                                      </p:cBhvr>
+                                    </p:animEffect>
+                                  </p:childTnLst>
+                                </p:cTn>
+                              </p:par>
+                            </p:childTnLst>
+                          </p:cTn>
+                        </p:par>
+                      </p:childTnLst>
+                    </p:cTn>
+                  </p:par>
+                </p:childTnLst>
+              </p:cTn>
+              <p:prevCondLst>
+                <p:cond evt="onPrev" delay="0">
+                  <p:tgtEl>
+                    <p:sldTgt/>
+                  </p:tgtEl>
+                </p:cond>
+              </p:prevCondLst>
+              <p:nextCondLst>
+                <p:cond evt="onNext" delay="0">
+                  <p:tgtEl>
+                    <p:sldTgt/>
+                  </p:tgtEl>
+                </p:cond>
+              </p:nextCondLst>
+            </p:seq>
+          </p:childTnLst>
+        </p:cTn>
+      </p:par>
+    </p:tnLst>
+  </p:timing>
+</p:sld>
+</file>
+
+<file path=ppt/slides/slide22.xml><?xml version="1.0" encoding="utf-8"?>
+<p:sld xmlns:a="http://schemas.openxmlformats.org/drawingml/2006/main" xmlns:r="http://schemas.openxmlformats.org/officeDocument/2006/relationships" xmlns:p="http://schemas.openxmlformats.org/presentationml/2006/main">
+  <p:cSld>
+    <p:spTree>
+      <p:nvGrpSpPr>
+        <p:cNvPr id="1" name=""/>
+        <p:cNvGrpSpPr/>
+        <p:nvPr/>
+      </p:nvGrpSpPr>
+      <p:grpSpPr>
+        <a:xfrm>
+          <a:off x="0" y="0"/>
+          <a:ext cx="0" cy="0"/>
+          <a:chOff x="0" y="0"/>
+          <a:chExt cx="0" cy="0"/>
+        </a:xfrm>
+      </p:grpSpPr>
+      <p:sp>
+        <p:nvSpPr>
+          <p:cNvPr id="5" name="Right Triangle 4">
+            <a:extLst>
+              <a:ext uri="{FF2B5EF4-FFF2-40B4-BE49-F238E27FC236}">
+                <a16:creationId xmlns:a16="http://schemas.microsoft.com/office/drawing/2014/main" id="{5488A745-4D79-6747-B65A-803B31C1F8B4}"/>
+              </a:ext>
+            </a:extLst>
+          </p:cNvPr>
+          <p:cNvSpPr/>
+          <p:nvPr/>
+        </p:nvSpPr>
+        <p:spPr>
+          <a:xfrm rot="13068536">
+            <a:off x="-809065" y="4275183"/>
+            <a:ext cx="1600200" cy="2061882"/>
+          </a:xfrm>
+          <a:prstGeom prst="rtTriangle">
+            <a:avLst/>
+          </a:prstGeom>
+          <a:solidFill>
+            <a:srgbClr val="44E4C4"/>
+          </a:solidFill>
+          <a:ln>
+            <a:solidFill>
+              <a:srgbClr val="44E4C4"/>
+            </a:solidFill>
+          </a:ln>
+        </p:spPr>
+        <p:style>
+          <a:lnRef idx="2">
+            <a:schemeClr val="accent1">
+              <a:shade val="50000"/>
+            </a:schemeClr>
+          </a:lnRef>
+          <a:fillRef idx="1">
+            <a:schemeClr val="accent1"/>
+          </a:fillRef>
+          <a:effectRef idx="0">
+            <a:schemeClr val="accent1"/>
+          </a:effectRef>
+          <a:fontRef idx="minor">
+            <a:schemeClr val="lt1"/>
+          </a:fontRef>
+        </p:style>
+        <p:txBody>
+          <a:bodyPr rtlCol="0" anchor="ctr"/>
+          <a:lstStyle/>
+          <a:p>
+            <a:pPr algn="ctr"/>
+            <a:endParaRPr lang="en-US"/>
+          </a:p>
+        </p:txBody>
+      </p:sp>
+      <p:sp>
+        <p:nvSpPr>
+          <p:cNvPr id="6" name="Rectangle 5">
+            <a:extLst>
+              <a:ext uri="{FF2B5EF4-FFF2-40B4-BE49-F238E27FC236}">
+                <a16:creationId xmlns:a16="http://schemas.microsoft.com/office/drawing/2014/main" id="{67C63295-B221-9A4E-BA44-2C4B26CF7FDE}"/>
+              </a:ext>
+            </a:extLst>
+          </p:cNvPr>
+          <p:cNvSpPr/>
+          <p:nvPr/>
+        </p:nvSpPr>
+        <p:spPr>
+          <a:xfrm rot="2351297">
+            <a:off x="281204" y="5024303"/>
+            <a:ext cx="880169" cy="978559"/>
+          </a:xfrm>
+          <a:prstGeom prst="rect">
+            <a:avLst/>
+          </a:prstGeom>
+          <a:solidFill>
+            <a:srgbClr val="2E27C7">
+              <a:alpha val="80000"/>
+            </a:srgbClr>
+          </a:solidFill>
+        </p:spPr>
+        <p:style>
+          <a:lnRef idx="2">
+            <a:schemeClr val="accent1">
+              <a:shade val="50000"/>
+            </a:schemeClr>
+          </a:lnRef>
+          <a:fillRef idx="1">
+            <a:schemeClr val="accent1"/>
+          </a:fillRef>
+          <a:effectRef idx="0">
+            <a:schemeClr val="accent1"/>
+          </a:effectRef>
+          <a:fontRef idx="minor">
+            <a:schemeClr val="lt1"/>
+          </a:fontRef>
+        </p:style>
+        <p:txBody>
+          <a:bodyPr rtlCol="0" anchor="ctr"/>
+          <a:lstStyle/>
+          <a:p>
+            <a:pPr algn="ctr"/>
+            <a:endParaRPr lang="en-US"/>
+          </a:p>
+        </p:txBody>
+      </p:sp>
+      <p:sp>
+        <p:nvSpPr>
+          <p:cNvPr id="7" name="Right Triangle 6">
+            <a:extLst>
+              <a:ext uri="{FF2B5EF4-FFF2-40B4-BE49-F238E27FC236}">
+                <a16:creationId xmlns:a16="http://schemas.microsoft.com/office/drawing/2014/main" id="{E9A9D123-E73C-5749-962A-D162E22D504C}"/>
+              </a:ext>
+            </a:extLst>
+          </p:cNvPr>
+          <p:cNvSpPr/>
+          <p:nvPr/>
+        </p:nvSpPr>
+        <p:spPr>
+          <a:xfrm rot="2259401">
+            <a:off x="11399428" y="428828"/>
+            <a:ext cx="1600200" cy="2066544"/>
+          </a:xfrm>
+          <a:prstGeom prst="rtTriangle">
+            <a:avLst/>
+          </a:prstGeom>
+          <a:solidFill>
+            <a:srgbClr val="2E27C7"/>
+          </a:solidFill>
+          <a:ln>
+            <a:solidFill>
+              <a:srgbClr val="2E27C7"/>
+            </a:solidFill>
+          </a:ln>
+        </p:spPr>
+        <p:style>
+          <a:lnRef idx="2">
+            <a:schemeClr val="accent1">
+              <a:shade val="50000"/>
+            </a:schemeClr>
+          </a:lnRef>
+          <a:fillRef idx="1">
+            <a:schemeClr val="accent1"/>
+          </a:fillRef>
+          <a:effectRef idx="0">
+            <a:schemeClr val="accent1"/>
+          </a:effectRef>
+          <a:fontRef idx="minor">
+            <a:schemeClr val="lt1"/>
+          </a:fontRef>
+        </p:style>
+        <p:txBody>
+          <a:bodyPr rtlCol="0" anchor="ctr"/>
+          <a:lstStyle/>
+          <a:p>
+            <a:pPr algn="ctr"/>
+            <a:endParaRPr lang="en-US"/>
+          </a:p>
+        </p:txBody>
+      </p:sp>
+      <p:sp>
+        <p:nvSpPr>
+          <p:cNvPr id="8" name="Rectangle 7">
+            <a:extLst>
+              <a:ext uri="{FF2B5EF4-FFF2-40B4-BE49-F238E27FC236}">
+                <a16:creationId xmlns:a16="http://schemas.microsoft.com/office/drawing/2014/main" id="{523C82C0-70C3-B347-A9AA-B75D37C19777}"/>
+              </a:ext>
+            </a:extLst>
+          </p:cNvPr>
+          <p:cNvSpPr/>
+          <p:nvPr/>
+        </p:nvSpPr>
+        <p:spPr>
+          <a:xfrm rot="13164033">
+            <a:off x="11030256" y="1657834"/>
+            <a:ext cx="880169" cy="978559"/>
+          </a:xfrm>
+          <a:prstGeom prst="rect">
+            <a:avLst/>
+          </a:prstGeom>
+          <a:solidFill>
+            <a:srgbClr val="44E4C4">
+              <a:alpha val="80000"/>
+            </a:srgbClr>
+          </a:solidFill>
+          <a:ln>
+            <a:solidFill>
+              <a:srgbClr val="44E4C4"/>
+            </a:solidFill>
+          </a:ln>
+        </p:spPr>
+        <p:style>
+          <a:lnRef idx="2">
+            <a:schemeClr val="accent1">
+              <a:shade val="50000"/>
+            </a:schemeClr>
+          </a:lnRef>
+          <a:fillRef idx="1">
+            <a:schemeClr val="accent1"/>
+          </a:fillRef>
+          <a:effectRef idx="0">
+            <a:schemeClr val="accent1"/>
+          </a:effectRef>
+          <a:fontRef idx="minor">
+            <a:schemeClr val="lt1"/>
+          </a:fontRef>
+        </p:style>
+        <p:txBody>
+          <a:bodyPr rtlCol="0" anchor="ctr"/>
+          <a:lstStyle/>
+          <a:p>
+            <a:pPr algn="ctr"/>
+            <a:endParaRPr lang="en-US"/>
+          </a:p>
+        </p:txBody>
+      </p:sp>
+      <p:sp>
+        <p:nvSpPr>
+          <p:cNvPr id="9" name="Title 1">
+            <a:extLst>
+              <a:ext uri="{FF2B5EF4-FFF2-40B4-BE49-F238E27FC236}">
+                <a16:creationId xmlns:a16="http://schemas.microsoft.com/office/drawing/2014/main" id="{DF4B9AD8-E4FC-FA40-8BCA-CF0480A9D206}"/>
+              </a:ext>
+            </a:extLst>
+          </p:cNvPr>
+          <p:cNvSpPr>
+            <a:spLocks noGrp="1"/>
+          </p:cNvSpPr>
+          <p:nvPr>
+            <p:ph type="title"/>
+          </p:nvPr>
+        </p:nvSpPr>
+        <p:spPr>
+          <a:xfrm>
+            <a:off x="643467" y="321735"/>
+            <a:ext cx="10905066" cy="634806"/>
+          </a:xfrm>
+        </p:spPr>
+        <p:txBody>
+          <a:bodyPr>
+            <a:normAutofit/>
+          </a:bodyPr>
+          <a:lstStyle/>
+          <a:p>
+            <a:pPr algn="ctr"/>
+            <a:r>
+              <a:rPr lang="en-US" sz="3600" b="1" dirty="0">
+                <a:latin typeface="Calibri" panose="020F0502020204030204" pitchFamily="34" charset="0"/>
+                <a:cs typeface="Calibri" panose="020F0502020204030204" pitchFamily="34" charset="0"/>
+              </a:rPr>
+              <a:t>Thank you!!</a:t>
+            </a:r>
+            <a:endParaRPr lang="en-US" sz="1800" b="1" cap="none" dirty="0">
+              <a:latin typeface="Calibri" panose="020F0502020204030204" pitchFamily="34" charset="0"/>
+              <a:cs typeface="Calibri" panose="020F0502020204030204" pitchFamily="34" charset="0"/>
+            </a:endParaRPr>
+          </a:p>
+        </p:txBody>
+      </p:sp>
+      <p:sp>
+        <p:nvSpPr>
+          <p:cNvPr id="10" name="Content Placeholder 3">
+            <a:extLst>
+              <a:ext uri="{FF2B5EF4-FFF2-40B4-BE49-F238E27FC236}">
+                <a16:creationId xmlns:a16="http://schemas.microsoft.com/office/drawing/2014/main" id="{711207F1-4A36-4478-AAE1-4383ACC20005}"/>
+              </a:ext>
+            </a:extLst>
+          </p:cNvPr>
+          <p:cNvSpPr>
+            <a:spLocks noGrp="1"/>
+          </p:cNvSpPr>
+          <p:nvPr>
+            <p:ph idx="1"/>
+          </p:nvPr>
+        </p:nvSpPr>
+        <p:spPr>
+          <a:xfrm>
+            <a:off x="1379787" y="1670241"/>
+            <a:ext cx="9486901" cy="4324272"/>
+          </a:xfrm>
+        </p:spPr>
+        <p:txBody>
+          <a:bodyPr/>
+          <a:lstStyle/>
+          <a:p>
+            <a:pPr marL="457200" lvl="1" indent="0">
+              <a:buNone/>
+            </a:pPr>
+            <a:endParaRPr lang="en-US" sz="2800" dirty="0">
+              <a:latin typeface="Calibri" panose="020F0502020204030204" pitchFamily="34" charset="0"/>
+              <a:cs typeface="Calibri" panose="020F0502020204030204" pitchFamily="34" charset="0"/>
+            </a:endParaRPr>
+          </a:p>
+          <a:p>
+            <a:pPr marL="0" indent="0" algn="ctr">
+              <a:buNone/>
+            </a:pPr>
+            <a:r>
+              <a:rPr lang="en-US" sz="2400" dirty="0">
+                <a:latin typeface="Calibri" panose="020F0502020204030204" pitchFamily="34" charset="0"/>
+                <a:cs typeface="Calibri" panose="020F0502020204030204" pitchFamily="34" charset="0"/>
+              </a:rPr>
+              <a:t>Name: Kevin Boyd</a:t>
+            </a:r>
+          </a:p>
+          <a:p>
+            <a:pPr marL="0" indent="0" algn="ctr">
+              <a:buNone/>
+            </a:pPr>
+            <a:r>
+              <a:rPr lang="en-US" sz="2400" dirty="0">
+                <a:latin typeface="Calibri" panose="020F0502020204030204" pitchFamily="34" charset="0"/>
+                <a:cs typeface="Calibri" panose="020F0502020204030204" pitchFamily="34" charset="0"/>
+              </a:rPr>
+              <a:t>Email: </a:t>
+            </a:r>
+            <a:r>
+              <a:rPr lang="en-US" sz="2400" dirty="0">
+                <a:latin typeface="Calibri" panose="020F0502020204030204" pitchFamily="34" charset="0"/>
+                <a:cs typeface="Calibri" panose="020F0502020204030204" pitchFamily="34" charset="0"/>
+                <a:hlinkClick r:id="rId2"/>
+              </a:rPr>
+              <a:t>kevinboyd@smu.edu</a:t>
+            </a:r>
+            <a:endParaRPr lang="en-US" sz="2400" dirty="0">
+              <a:latin typeface="Calibri" panose="020F0502020204030204" pitchFamily="34" charset="0"/>
+              <a:cs typeface="Calibri" panose="020F0502020204030204" pitchFamily="34" charset="0"/>
+            </a:endParaRPr>
+          </a:p>
+          <a:p>
+            <a:pPr marL="0" indent="0" algn="ctr">
+              <a:buNone/>
+            </a:pPr>
+            <a:endParaRPr lang="en-US" sz="2400" dirty="0">
+              <a:latin typeface="Calibri" panose="020F0502020204030204" pitchFamily="34" charset="0"/>
+              <a:cs typeface="Calibri" panose="020F0502020204030204" pitchFamily="34" charset="0"/>
+            </a:endParaRPr>
+          </a:p>
+          <a:p>
+            <a:pPr marL="0" indent="0" algn="ctr">
+              <a:buNone/>
+            </a:pPr>
+            <a:endParaRPr lang="en-US" sz="2400" dirty="0">
+              <a:latin typeface="Calibri" panose="020F0502020204030204" pitchFamily="34" charset="0"/>
+              <a:cs typeface="Calibri" panose="020F0502020204030204" pitchFamily="34" charset="0"/>
+            </a:endParaRPr>
+          </a:p>
+          <a:p>
+            <a:pPr marL="0" indent="0" algn="ctr">
+              <a:buNone/>
+            </a:pPr>
+            <a:r>
+              <a:rPr lang="en-US" sz="2400" dirty="0">
+                <a:latin typeface="Calibri" panose="020F0502020204030204" pitchFamily="34" charset="0"/>
+                <a:cs typeface="Calibri" panose="020F0502020204030204" pitchFamily="34" charset="0"/>
+              </a:rPr>
+              <a:t>Name: Shikha Pandey</a:t>
+            </a:r>
+          </a:p>
+          <a:p>
+            <a:pPr marL="0" indent="0" algn="ctr">
+              <a:buNone/>
+            </a:pPr>
+            <a:r>
+              <a:rPr lang="en-US" sz="2400" dirty="0">
+                <a:latin typeface="Calibri" panose="020F0502020204030204" pitchFamily="34" charset="0"/>
+                <a:cs typeface="Calibri" panose="020F0502020204030204" pitchFamily="34" charset="0"/>
+              </a:rPr>
+              <a:t>Email: </a:t>
+            </a:r>
+            <a:r>
+              <a:rPr lang="en-US" sz="2400" dirty="0">
+                <a:latin typeface="Calibri" panose="020F0502020204030204" pitchFamily="34" charset="0"/>
+                <a:cs typeface="Calibri" panose="020F0502020204030204" pitchFamily="34" charset="0"/>
+                <a:hlinkClick r:id="rId3"/>
+              </a:rPr>
+              <a:t>pandeys@smu.edu</a:t>
+            </a:r>
+            <a:endParaRPr lang="en-US" sz="2400" dirty="0">
+              <a:latin typeface="Calibri" panose="020F0502020204030204" pitchFamily="34" charset="0"/>
+              <a:cs typeface="Calibri" panose="020F0502020204030204" pitchFamily="34" charset="0"/>
+            </a:endParaRPr>
+          </a:p>
+          <a:p>
+            <a:pPr marL="0" indent="0">
+              <a:buNone/>
+            </a:pPr>
+            <a:endParaRPr lang="en-US" dirty="0">
+              <a:latin typeface="Calibri" panose="020F0502020204030204" pitchFamily="34" charset="0"/>
+              <a:cs typeface="Calibri" panose="020F0502020204030204" pitchFamily="34" charset="0"/>
+            </a:endParaRPr>
+          </a:p>
+          <a:p>
+            <a:pPr marL="457200" lvl="1" indent="0">
+              <a:buNone/>
+            </a:pPr>
+            <a:endParaRPr lang="en-US" sz="2400" dirty="0">
+              <a:latin typeface="Calibri" panose="020F0502020204030204" pitchFamily="34" charset="0"/>
+              <a:cs typeface="Calibri" panose="020F0502020204030204" pitchFamily="34" charset="0"/>
+            </a:endParaRPr>
+          </a:p>
+        </p:txBody>
+      </p:sp>
+    </p:spTree>
+    <p:extLst>
+      <p:ext uri="{BB962C8B-B14F-4D97-AF65-F5344CB8AC3E}">
+        <p14:creationId xmlns:p14="http://schemas.microsoft.com/office/powerpoint/2010/main" val="987614894"/>
       </p:ext>
     </p:extLst>
   </p:cSld>
@@ -14268,266 +15733,12 @@
           <a:chExt cx="0" cy="0"/>
         </a:xfrm>
       </p:grpSpPr>
-      <p:sp>
-        <p:nvSpPr>
-          <p:cNvPr id="5" name="Right Triangle 4">
+      <p:pic>
+        <p:nvPicPr>
+          <p:cNvPr id="11" name="Picture 10">
             <a:extLst>
               <a:ext uri="{FF2B5EF4-FFF2-40B4-BE49-F238E27FC236}">
-                <a16:creationId xmlns:a16="http://schemas.microsoft.com/office/drawing/2014/main" id="{5488A745-4D79-6747-B65A-803B31C1F8B4}"/>
-              </a:ext>
-            </a:extLst>
-          </p:cNvPr>
-          <p:cNvSpPr/>
-          <p:nvPr/>
-        </p:nvSpPr>
-        <p:spPr>
-          <a:xfrm rot="13068536">
-            <a:off x="-809065" y="4275183"/>
-            <a:ext cx="1600200" cy="2061882"/>
-          </a:xfrm>
-          <a:prstGeom prst="rtTriangle">
-            <a:avLst/>
-          </a:prstGeom>
-          <a:solidFill>
-            <a:srgbClr val="44E4C4"/>
-          </a:solidFill>
-          <a:ln>
-            <a:solidFill>
-              <a:srgbClr val="44E4C4"/>
-            </a:solidFill>
-          </a:ln>
-        </p:spPr>
-        <p:style>
-          <a:lnRef idx="2">
-            <a:schemeClr val="accent1">
-              <a:shade val="50000"/>
-            </a:schemeClr>
-          </a:lnRef>
-          <a:fillRef idx="1">
-            <a:schemeClr val="accent1"/>
-          </a:fillRef>
-          <a:effectRef idx="0">
-            <a:schemeClr val="accent1"/>
-          </a:effectRef>
-          <a:fontRef idx="minor">
-            <a:schemeClr val="lt1"/>
-          </a:fontRef>
-        </p:style>
-        <p:txBody>
-          <a:bodyPr rtlCol="0" anchor="ctr"/>
-          <a:lstStyle/>
-          <a:p>
-            <a:pPr algn="ctr"/>
-            <a:endParaRPr lang="en-US"/>
-          </a:p>
-        </p:txBody>
-      </p:sp>
-      <p:sp>
-        <p:nvSpPr>
-          <p:cNvPr id="6" name="Rectangle 5">
-            <a:extLst>
-              <a:ext uri="{FF2B5EF4-FFF2-40B4-BE49-F238E27FC236}">
-                <a16:creationId xmlns:a16="http://schemas.microsoft.com/office/drawing/2014/main" id="{67C63295-B221-9A4E-BA44-2C4B26CF7FDE}"/>
-              </a:ext>
-            </a:extLst>
-          </p:cNvPr>
-          <p:cNvSpPr/>
-          <p:nvPr/>
-        </p:nvSpPr>
-        <p:spPr>
-          <a:xfrm rot="2351297">
-            <a:off x="281204" y="5024303"/>
-            <a:ext cx="880169" cy="978559"/>
-          </a:xfrm>
-          <a:prstGeom prst="rect">
-            <a:avLst/>
-          </a:prstGeom>
-          <a:solidFill>
-            <a:srgbClr val="2E27C7">
-              <a:alpha val="80000"/>
-            </a:srgbClr>
-          </a:solidFill>
-        </p:spPr>
-        <p:style>
-          <a:lnRef idx="2">
-            <a:schemeClr val="accent1">
-              <a:shade val="50000"/>
-            </a:schemeClr>
-          </a:lnRef>
-          <a:fillRef idx="1">
-            <a:schemeClr val="accent1"/>
-          </a:fillRef>
-          <a:effectRef idx="0">
-            <a:schemeClr val="accent1"/>
-          </a:effectRef>
-          <a:fontRef idx="minor">
-            <a:schemeClr val="lt1"/>
-          </a:fontRef>
-        </p:style>
-        <p:txBody>
-          <a:bodyPr rtlCol="0" anchor="ctr"/>
-          <a:lstStyle/>
-          <a:p>
-            <a:pPr algn="ctr"/>
-            <a:endParaRPr lang="en-US"/>
-          </a:p>
-        </p:txBody>
-      </p:sp>
-      <p:sp>
-        <p:nvSpPr>
-          <p:cNvPr id="7" name="Right Triangle 6">
-            <a:extLst>
-              <a:ext uri="{FF2B5EF4-FFF2-40B4-BE49-F238E27FC236}">
-                <a16:creationId xmlns:a16="http://schemas.microsoft.com/office/drawing/2014/main" id="{E9A9D123-E73C-5749-962A-D162E22D504C}"/>
-              </a:ext>
-            </a:extLst>
-          </p:cNvPr>
-          <p:cNvSpPr/>
-          <p:nvPr/>
-        </p:nvSpPr>
-        <p:spPr>
-          <a:xfrm rot="2259401">
-            <a:off x="11399428" y="428828"/>
-            <a:ext cx="1600200" cy="2066544"/>
-          </a:xfrm>
-          <a:prstGeom prst="rtTriangle">
-            <a:avLst/>
-          </a:prstGeom>
-          <a:solidFill>
-            <a:srgbClr val="2E27C7"/>
-          </a:solidFill>
-          <a:ln>
-            <a:solidFill>
-              <a:srgbClr val="2E27C7"/>
-            </a:solidFill>
-          </a:ln>
-        </p:spPr>
-        <p:style>
-          <a:lnRef idx="2">
-            <a:schemeClr val="accent1">
-              <a:shade val="50000"/>
-            </a:schemeClr>
-          </a:lnRef>
-          <a:fillRef idx="1">
-            <a:schemeClr val="accent1"/>
-          </a:fillRef>
-          <a:effectRef idx="0">
-            <a:schemeClr val="accent1"/>
-          </a:effectRef>
-          <a:fontRef idx="minor">
-            <a:schemeClr val="lt1"/>
-          </a:fontRef>
-        </p:style>
-        <p:txBody>
-          <a:bodyPr rtlCol="0" anchor="ctr"/>
-          <a:lstStyle/>
-          <a:p>
-            <a:pPr algn="ctr"/>
-            <a:endParaRPr lang="en-US"/>
-          </a:p>
-        </p:txBody>
-      </p:sp>
-      <p:sp>
-        <p:nvSpPr>
-          <p:cNvPr id="8" name="Rectangle 7">
-            <a:extLst>
-              <a:ext uri="{FF2B5EF4-FFF2-40B4-BE49-F238E27FC236}">
-                <a16:creationId xmlns:a16="http://schemas.microsoft.com/office/drawing/2014/main" id="{523C82C0-70C3-B347-A9AA-B75D37C19777}"/>
-              </a:ext>
-            </a:extLst>
-          </p:cNvPr>
-          <p:cNvSpPr/>
-          <p:nvPr/>
-        </p:nvSpPr>
-        <p:spPr>
-          <a:xfrm rot="13164033">
-            <a:off x="11030256" y="1657834"/>
-            <a:ext cx="880169" cy="978559"/>
-          </a:xfrm>
-          <a:prstGeom prst="rect">
-            <a:avLst/>
-          </a:prstGeom>
-          <a:solidFill>
-            <a:srgbClr val="44E4C4">
-              <a:alpha val="80000"/>
-            </a:srgbClr>
-          </a:solidFill>
-          <a:ln>
-            <a:solidFill>
-              <a:srgbClr val="44E4C4"/>
-            </a:solidFill>
-          </a:ln>
-        </p:spPr>
-        <p:style>
-          <a:lnRef idx="2">
-            <a:schemeClr val="accent1">
-              <a:shade val="50000"/>
-            </a:schemeClr>
-          </a:lnRef>
-          <a:fillRef idx="1">
-            <a:schemeClr val="accent1"/>
-          </a:fillRef>
-          <a:effectRef idx="0">
-            <a:schemeClr val="accent1"/>
-          </a:effectRef>
-          <a:fontRef idx="minor">
-            <a:schemeClr val="lt1"/>
-          </a:fontRef>
-        </p:style>
-        <p:txBody>
-          <a:bodyPr rtlCol="0" anchor="ctr"/>
-          <a:lstStyle/>
-          <a:p>
-            <a:pPr algn="ctr"/>
-            <a:endParaRPr lang="en-US"/>
-          </a:p>
-        </p:txBody>
-      </p:sp>
-      <p:sp>
-        <p:nvSpPr>
-          <p:cNvPr id="16" name="Title 1">
-            <a:extLst>
-              <a:ext uri="{FF2B5EF4-FFF2-40B4-BE49-F238E27FC236}">
-                <a16:creationId xmlns:a16="http://schemas.microsoft.com/office/drawing/2014/main" id="{2F529C30-57C4-DE42-8CC6-5E655718A816}"/>
-              </a:ext>
-            </a:extLst>
-          </p:cNvPr>
-          <p:cNvSpPr>
-            <a:spLocks noGrp="1"/>
-          </p:cNvSpPr>
-          <p:nvPr>
-            <p:ph type="title"/>
-          </p:nvPr>
-        </p:nvSpPr>
-        <p:spPr>
-          <a:xfrm>
-            <a:off x="643467" y="321735"/>
-            <a:ext cx="10905066" cy="634806"/>
-          </a:xfrm>
-        </p:spPr>
-        <p:txBody>
-          <a:bodyPr>
-            <a:normAutofit/>
-          </a:bodyPr>
-          <a:lstStyle/>
-          <a:p>
-            <a:pPr algn="ctr"/>
-            <a:r>
-              <a:rPr lang="en-US" sz="3600" b="1" cap="none" dirty="0">
-                <a:latin typeface="Calibri" panose="020F0502020204030204" pitchFamily="34" charset="0"/>
-                <a:cs typeface="Calibri" panose="020F0502020204030204" pitchFamily="34" charset="0"/>
-              </a:rPr>
-              <a:t>Attrition based on Job Role and Job Satisfaction</a:t>
-            </a:r>
-          </a:p>
-        </p:txBody>
-      </p:sp>
-      <p:pic>
-        <p:nvPicPr>
-          <p:cNvPr id="17" name="Picture 16">
-            <a:extLst>
-              <a:ext uri="{FF2B5EF4-FFF2-40B4-BE49-F238E27FC236}">
-                <a16:creationId xmlns:a16="http://schemas.microsoft.com/office/drawing/2014/main" id="{A1F69826-2388-A34C-BA65-A5D02C5B373D}"/>
+                <a16:creationId xmlns:a16="http://schemas.microsoft.com/office/drawing/2014/main" id="{E2C0D4C9-E479-48F1-A4D2-35AB3BA25D8D}"/>
               </a:ext>
             </a:extLst>
           </p:cNvPr>
@@ -14544,14 +15755,268 @@
         </p:blipFill>
         <p:spPr>
           <a:xfrm>
-            <a:off x="2310917" y="1396420"/>
-            <a:ext cx="7570165" cy="5461580"/>
+            <a:off x="2026840" y="1290061"/>
+            <a:ext cx="8138320" cy="5422143"/>
           </a:xfrm>
           <a:prstGeom prst="rect">
             <a:avLst/>
           </a:prstGeom>
         </p:spPr>
       </p:pic>
+      <p:sp>
+        <p:nvSpPr>
+          <p:cNvPr id="5" name="Right Triangle 4">
+            <a:extLst>
+              <a:ext uri="{FF2B5EF4-FFF2-40B4-BE49-F238E27FC236}">
+                <a16:creationId xmlns:a16="http://schemas.microsoft.com/office/drawing/2014/main" id="{5488A745-4D79-6747-B65A-803B31C1F8B4}"/>
+              </a:ext>
+            </a:extLst>
+          </p:cNvPr>
+          <p:cNvSpPr/>
+          <p:nvPr/>
+        </p:nvSpPr>
+        <p:spPr>
+          <a:xfrm rot="13068536">
+            <a:off x="-809065" y="4275183"/>
+            <a:ext cx="1600200" cy="2061882"/>
+          </a:xfrm>
+          <a:prstGeom prst="rtTriangle">
+            <a:avLst/>
+          </a:prstGeom>
+          <a:solidFill>
+            <a:srgbClr val="44E4C4"/>
+          </a:solidFill>
+          <a:ln>
+            <a:solidFill>
+              <a:srgbClr val="44E4C4"/>
+            </a:solidFill>
+          </a:ln>
+        </p:spPr>
+        <p:style>
+          <a:lnRef idx="2">
+            <a:schemeClr val="accent1">
+              <a:shade val="50000"/>
+            </a:schemeClr>
+          </a:lnRef>
+          <a:fillRef idx="1">
+            <a:schemeClr val="accent1"/>
+          </a:fillRef>
+          <a:effectRef idx="0">
+            <a:schemeClr val="accent1"/>
+          </a:effectRef>
+          <a:fontRef idx="minor">
+            <a:schemeClr val="lt1"/>
+          </a:fontRef>
+        </p:style>
+        <p:txBody>
+          <a:bodyPr rtlCol="0" anchor="ctr"/>
+          <a:lstStyle/>
+          <a:p>
+            <a:pPr algn="ctr"/>
+            <a:endParaRPr lang="en-US"/>
+          </a:p>
+        </p:txBody>
+      </p:sp>
+      <p:sp>
+        <p:nvSpPr>
+          <p:cNvPr id="6" name="Rectangle 5">
+            <a:extLst>
+              <a:ext uri="{FF2B5EF4-FFF2-40B4-BE49-F238E27FC236}">
+                <a16:creationId xmlns:a16="http://schemas.microsoft.com/office/drawing/2014/main" id="{67C63295-B221-9A4E-BA44-2C4B26CF7FDE}"/>
+              </a:ext>
+            </a:extLst>
+          </p:cNvPr>
+          <p:cNvSpPr/>
+          <p:nvPr/>
+        </p:nvSpPr>
+        <p:spPr>
+          <a:xfrm rot="2351297">
+            <a:off x="281204" y="5024303"/>
+            <a:ext cx="880169" cy="978559"/>
+          </a:xfrm>
+          <a:prstGeom prst="rect">
+            <a:avLst/>
+          </a:prstGeom>
+          <a:solidFill>
+            <a:srgbClr val="2E27C7">
+              <a:alpha val="80000"/>
+            </a:srgbClr>
+          </a:solidFill>
+        </p:spPr>
+        <p:style>
+          <a:lnRef idx="2">
+            <a:schemeClr val="accent1">
+              <a:shade val="50000"/>
+            </a:schemeClr>
+          </a:lnRef>
+          <a:fillRef idx="1">
+            <a:schemeClr val="accent1"/>
+          </a:fillRef>
+          <a:effectRef idx="0">
+            <a:schemeClr val="accent1"/>
+          </a:effectRef>
+          <a:fontRef idx="minor">
+            <a:schemeClr val="lt1"/>
+          </a:fontRef>
+        </p:style>
+        <p:txBody>
+          <a:bodyPr rtlCol="0" anchor="ctr"/>
+          <a:lstStyle/>
+          <a:p>
+            <a:pPr algn="ctr"/>
+            <a:endParaRPr lang="en-US"/>
+          </a:p>
+        </p:txBody>
+      </p:sp>
+      <p:sp>
+        <p:nvSpPr>
+          <p:cNvPr id="7" name="Right Triangle 6">
+            <a:extLst>
+              <a:ext uri="{FF2B5EF4-FFF2-40B4-BE49-F238E27FC236}">
+                <a16:creationId xmlns:a16="http://schemas.microsoft.com/office/drawing/2014/main" id="{E9A9D123-E73C-5749-962A-D162E22D504C}"/>
+              </a:ext>
+            </a:extLst>
+          </p:cNvPr>
+          <p:cNvSpPr/>
+          <p:nvPr/>
+        </p:nvSpPr>
+        <p:spPr>
+          <a:xfrm rot="2259401">
+            <a:off x="11399428" y="428828"/>
+            <a:ext cx="1600200" cy="2066544"/>
+          </a:xfrm>
+          <a:prstGeom prst="rtTriangle">
+            <a:avLst/>
+          </a:prstGeom>
+          <a:solidFill>
+            <a:srgbClr val="2E27C7"/>
+          </a:solidFill>
+          <a:ln>
+            <a:solidFill>
+              <a:srgbClr val="2E27C7"/>
+            </a:solidFill>
+          </a:ln>
+        </p:spPr>
+        <p:style>
+          <a:lnRef idx="2">
+            <a:schemeClr val="accent1">
+              <a:shade val="50000"/>
+            </a:schemeClr>
+          </a:lnRef>
+          <a:fillRef idx="1">
+            <a:schemeClr val="accent1"/>
+          </a:fillRef>
+          <a:effectRef idx="0">
+            <a:schemeClr val="accent1"/>
+          </a:effectRef>
+          <a:fontRef idx="minor">
+            <a:schemeClr val="lt1"/>
+          </a:fontRef>
+        </p:style>
+        <p:txBody>
+          <a:bodyPr rtlCol="0" anchor="ctr"/>
+          <a:lstStyle/>
+          <a:p>
+            <a:pPr algn="ctr"/>
+            <a:endParaRPr lang="en-US"/>
+          </a:p>
+        </p:txBody>
+      </p:sp>
+      <p:sp>
+        <p:nvSpPr>
+          <p:cNvPr id="8" name="Rectangle 7">
+            <a:extLst>
+              <a:ext uri="{FF2B5EF4-FFF2-40B4-BE49-F238E27FC236}">
+                <a16:creationId xmlns:a16="http://schemas.microsoft.com/office/drawing/2014/main" id="{523C82C0-70C3-B347-A9AA-B75D37C19777}"/>
+              </a:ext>
+            </a:extLst>
+          </p:cNvPr>
+          <p:cNvSpPr/>
+          <p:nvPr/>
+        </p:nvSpPr>
+        <p:spPr>
+          <a:xfrm rot="13164033">
+            <a:off x="11030256" y="1657834"/>
+            <a:ext cx="880169" cy="978559"/>
+          </a:xfrm>
+          <a:prstGeom prst="rect">
+            <a:avLst/>
+          </a:prstGeom>
+          <a:solidFill>
+            <a:srgbClr val="44E4C4">
+              <a:alpha val="80000"/>
+            </a:srgbClr>
+          </a:solidFill>
+          <a:ln>
+            <a:solidFill>
+              <a:srgbClr val="44E4C4"/>
+            </a:solidFill>
+          </a:ln>
+        </p:spPr>
+        <p:style>
+          <a:lnRef idx="2">
+            <a:schemeClr val="accent1">
+              <a:shade val="50000"/>
+            </a:schemeClr>
+          </a:lnRef>
+          <a:fillRef idx="1">
+            <a:schemeClr val="accent1"/>
+          </a:fillRef>
+          <a:effectRef idx="0">
+            <a:schemeClr val="accent1"/>
+          </a:effectRef>
+          <a:fontRef idx="minor">
+            <a:schemeClr val="lt1"/>
+          </a:fontRef>
+        </p:style>
+        <p:txBody>
+          <a:bodyPr rtlCol="0" anchor="ctr"/>
+          <a:lstStyle/>
+          <a:p>
+            <a:pPr algn="ctr"/>
+            <a:endParaRPr lang="en-US"/>
+          </a:p>
+        </p:txBody>
+      </p:sp>
+      <p:sp>
+        <p:nvSpPr>
+          <p:cNvPr id="16" name="Title 1">
+            <a:extLst>
+              <a:ext uri="{FF2B5EF4-FFF2-40B4-BE49-F238E27FC236}">
+                <a16:creationId xmlns:a16="http://schemas.microsoft.com/office/drawing/2014/main" id="{2F529C30-57C4-DE42-8CC6-5E655718A816}"/>
+              </a:ext>
+            </a:extLst>
+          </p:cNvPr>
+          <p:cNvSpPr>
+            <a:spLocks noGrp="1"/>
+          </p:cNvSpPr>
+          <p:nvPr>
+            <p:ph type="title"/>
+          </p:nvPr>
+        </p:nvSpPr>
+        <p:spPr>
+          <a:xfrm>
+            <a:off x="643467" y="321735"/>
+            <a:ext cx="10905066" cy="634806"/>
+          </a:xfrm>
+        </p:spPr>
+        <p:txBody>
+          <a:bodyPr>
+            <a:normAutofit/>
+          </a:bodyPr>
+          <a:lstStyle/>
+          <a:p>
+            <a:pPr algn="ctr"/>
+            <a:r>
+              <a:rPr lang="en-US" sz="3600" b="1" cap="none" dirty="0">
+                <a:latin typeface="Calibri" panose="020F0502020204030204" pitchFamily="34" charset="0"/>
+                <a:cs typeface="Calibri" panose="020F0502020204030204" pitchFamily="34" charset="0"/>
+              </a:rPr>
+              <a:t>Attrition based on Job Role and Job Satisfaction</a:t>
+            </a:r>
+          </a:p>
+        </p:txBody>
+      </p:sp>
       <p:sp>
         <p:nvSpPr>
           <p:cNvPr id="2" name="Frame 1">
@@ -14566,8 +16031,8 @@
         </p:nvSpPr>
         <p:spPr>
           <a:xfrm>
-            <a:off x="6963507" y="1641231"/>
-            <a:ext cx="2110155" cy="1664677"/>
+            <a:off x="7019365" y="1620312"/>
+            <a:ext cx="2299447" cy="1566641"/>
           </a:xfrm>
           <a:prstGeom prst="frame">
             <a:avLst>
@@ -14626,8 +16091,8 @@
         </p:nvSpPr>
         <p:spPr>
           <a:xfrm>
-            <a:off x="6940061" y="4856278"/>
-            <a:ext cx="2133601" cy="1849322"/>
+            <a:off x="2143228" y="4666129"/>
+            <a:ext cx="7175584" cy="1828800"/>
           </a:xfrm>
           <a:prstGeom prst="frame">
             <a:avLst>
@@ -14640,126 +16105,6 @@
           <a:ln>
             <a:solidFill>
               <a:srgbClr val="C00000"/>
-            </a:solidFill>
-          </a:ln>
-        </p:spPr>
-        <p:style>
-          <a:lnRef idx="2">
-            <a:schemeClr val="accent1">
-              <a:shade val="50000"/>
-            </a:schemeClr>
-          </a:lnRef>
-          <a:fillRef idx="1">
-            <a:schemeClr val="accent1"/>
-          </a:fillRef>
-          <a:effectRef idx="0">
-            <a:schemeClr val="accent1"/>
-          </a:effectRef>
-          <a:fontRef idx="minor">
-            <a:schemeClr val="lt1"/>
-          </a:fontRef>
-        </p:style>
-        <p:txBody>
-          <a:bodyPr rtlCol="0" anchor="ctr"/>
-          <a:lstStyle/>
-          <a:p>
-            <a:pPr algn="ctr"/>
-            <a:endParaRPr lang="en-US">
-              <a:solidFill>
-                <a:schemeClr val="tx1"/>
-              </a:solidFill>
-            </a:endParaRPr>
-          </a:p>
-        </p:txBody>
-      </p:sp>
-      <p:sp>
-        <p:nvSpPr>
-          <p:cNvPr id="9" name="Frame 8">
-            <a:extLst>
-              <a:ext uri="{FF2B5EF4-FFF2-40B4-BE49-F238E27FC236}">
-                <a16:creationId xmlns:a16="http://schemas.microsoft.com/office/drawing/2014/main" id="{34F14F9C-B97D-4A30-803F-EA9600784317}"/>
-              </a:ext>
-            </a:extLst>
-          </p:cNvPr>
-          <p:cNvSpPr/>
-          <p:nvPr/>
-        </p:nvSpPr>
-        <p:spPr>
-          <a:xfrm>
-            <a:off x="4970585" y="1641231"/>
-            <a:ext cx="2110155" cy="1664677"/>
-          </a:xfrm>
-          <a:prstGeom prst="frame">
-            <a:avLst>
-              <a:gd name="adj1" fmla="val 3320"/>
-            </a:avLst>
-          </a:prstGeom>
-          <a:solidFill>
-            <a:srgbClr val="92D050"/>
-          </a:solidFill>
-          <a:ln>
-            <a:solidFill>
-              <a:srgbClr val="00B050"/>
-            </a:solidFill>
-          </a:ln>
-        </p:spPr>
-        <p:style>
-          <a:lnRef idx="2">
-            <a:schemeClr val="accent1">
-              <a:shade val="50000"/>
-            </a:schemeClr>
-          </a:lnRef>
-          <a:fillRef idx="1">
-            <a:schemeClr val="accent1"/>
-          </a:fillRef>
-          <a:effectRef idx="0">
-            <a:schemeClr val="accent1"/>
-          </a:effectRef>
-          <a:fontRef idx="minor">
-            <a:schemeClr val="lt1"/>
-          </a:fontRef>
-        </p:style>
-        <p:txBody>
-          <a:bodyPr rtlCol="0" anchor="ctr"/>
-          <a:lstStyle/>
-          <a:p>
-            <a:pPr algn="ctr"/>
-            <a:endParaRPr lang="en-US">
-              <a:solidFill>
-                <a:schemeClr val="tx1"/>
-              </a:solidFill>
-            </a:endParaRPr>
-          </a:p>
-        </p:txBody>
-      </p:sp>
-      <p:sp>
-        <p:nvSpPr>
-          <p:cNvPr id="10" name="Frame 9">
-            <a:extLst>
-              <a:ext uri="{FF2B5EF4-FFF2-40B4-BE49-F238E27FC236}">
-                <a16:creationId xmlns:a16="http://schemas.microsoft.com/office/drawing/2014/main" id="{3796E97E-BE5B-4E51-B4E3-9702DE2EC894}"/>
-              </a:ext>
-            </a:extLst>
-          </p:cNvPr>
-          <p:cNvSpPr/>
-          <p:nvPr/>
-        </p:nvSpPr>
-        <p:spPr>
-          <a:xfrm>
-            <a:off x="2473569" y="4856278"/>
-            <a:ext cx="4607171" cy="1849322"/>
-          </a:xfrm>
-          <a:prstGeom prst="frame">
-            <a:avLst>
-              <a:gd name="adj1" fmla="val 2936"/>
-            </a:avLst>
-          </a:prstGeom>
-          <a:solidFill>
-            <a:srgbClr val="92D050"/>
-          </a:solidFill>
-          <a:ln>
-            <a:solidFill>
-              <a:srgbClr val="00B050"/>
             </a:solidFill>
           </a:ln>
         </p:spPr>
@@ -14898,182 +16243,6 @@
                       </p:childTnLst>
                     </p:cTn>
                   </p:par>
-                  <p:par>
-                    <p:cTn id="11" fill="hold">
-                      <p:stCondLst>
-                        <p:cond delay="indefinite"/>
-                      </p:stCondLst>
-                      <p:childTnLst>
-                        <p:par>
-                          <p:cTn id="12" fill="hold">
-                            <p:stCondLst>
-                              <p:cond delay="0"/>
-                            </p:stCondLst>
-                            <p:childTnLst>
-                              <p:par>
-                                <p:cTn id="13" presetID="10" presetClass="exit" presetSubtype="0" fill="hold" grpId="1" nodeType="clickEffect">
-                                  <p:stCondLst>
-                                    <p:cond delay="0"/>
-                                  </p:stCondLst>
-                                  <p:childTnLst>
-                                    <p:animEffect transition="out" filter="fade">
-                                      <p:cBhvr>
-                                        <p:cTn id="14" dur="500"/>
-                                        <p:tgtEl>
-                                          <p:spTgt spid="4"/>
-                                        </p:tgtEl>
-                                      </p:cBhvr>
-                                    </p:animEffect>
-                                    <p:set>
-                                      <p:cBhvr>
-                                        <p:cTn id="15" dur="1" fill="hold">
-                                          <p:stCondLst>
-                                            <p:cond delay="499"/>
-                                          </p:stCondLst>
-                                        </p:cTn>
-                                        <p:tgtEl>
-                                          <p:spTgt spid="4"/>
-                                        </p:tgtEl>
-                                        <p:attrNameLst>
-                                          <p:attrName>style.visibility</p:attrName>
-                                        </p:attrNameLst>
-                                      </p:cBhvr>
-                                      <p:to>
-                                        <p:strVal val="hidden"/>
-                                      </p:to>
-                                    </p:set>
-                                  </p:childTnLst>
-                                </p:cTn>
-                              </p:par>
-                              <p:par>
-                                <p:cTn id="16" presetID="10" presetClass="exit" presetSubtype="0" fill="hold" grpId="1" nodeType="withEffect">
-                                  <p:stCondLst>
-                                    <p:cond delay="0"/>
-                                  </p:stCondLst>
-                                  <p:childTnLst>
-                                    <p:animEffect transition="out" filter="fade">
-                                      <p:cBhvr>
-                                        <p:cTn id="17" dur="500"/>
-                                        <p:tgtEl>
-                                          <p:spTgt spid="2"/>
-                                        </p:tgtEl>
-                                      </p:cBhvr>
-                                    </p:animEffect>
-                                    <p:set>
-                                      <p:cBhvr>
-                                        <p:cTn id="18" dur="1" fill="hold">
-                                          <p:stCondLst>
-                                            <p:cond delay="499"/>
-                                          </p:stCondLst>
-                                        </p:cTn>
-                                        <p:tgtEl>
-                                          <p:spTgt spid="2"/>
-                                        </p:tgtEl>
-                                        <p:attrNameLst>
-                                          <p:attrName>style.visibility</p:attrName>
-                                        </p:attrNameLst>
-                                      </p:cBhvr>
-                                      <p:to>
-                                        <p:strVal val="hidden"/>
-                                      </p:to>
-                                    </p:set>
-                                  </p:childTnLst>
-                                </p:cTn>
-                              </p:par>
-                            </p:childTnLst>
-                          </p:cTn>
-                        </p:par>
-                      </p:childTnLst>
-                    </p:cTn>
-                  </p:par>
-                  <p:par>
-                    <p:cTn id="19" fill="hold">
-                      <p:stCondLst>
-                        <p:cond delay="indefinite"/>
-                      </p:stCondLst>
-                      <p:childTnLst>
-                        <p:par>
-                          <p:cTn id="20" fill="hold">
-                            <p:stCondLst>
-                              <p:cond delay="0"/>
-                            </p:stCondLst>
-                            <p:childTnLst>
-                              <p:par>
-                                <p:cTn id="21" presetID="10" presetClass="entr" presetSubtype="0" fill="hold" grpId="0" nodeType="clickEffect">
-                                  <p:stCondLst>
-                                    <p:cond delay="0"/>
-                                  </p:stCondLst>
-                                  <p:childTnLst>
-                                    <p:set>
-                                      <p:cBhvr>
-                                        <p:cTn id="22" dur="1" fill="hold">
-                                          <p:stCondLst>
-                                            <p:cond delay="0"/>
-                                          </p:stCondLst>
-                                        </p:cTn>
-                                        <p:tgtEl>
-                                          <p:spTgt spid="9"/>
-                                        </p:tgtEl>
-                                        <p:attrNameLst>
-                                          <p:attrName>style.visibility</p:attrName>
-                                        </p:attrNameLst>
-                                      </p:cBhvr>
-                                      <p:to>
-                                        <p:strVal val="visible"/>
-                                      </p:to>
-                                    </p:set>
-                                    <p:animEffect transition="in" filter="fade">
-                                      <p:cBhvr>
-                                        <p:cTn id="23" dur="500"/>
-                                        <p:tgtEl>
-                                          <p:spTgt spid="9"/>
-                                        </p:tgtEl>
-                                      </p:cBhvr>
-                                    </p:animEffect>
-                                  </p:childTnLst>
-                                </p:cTn>
-                              </p:par>
-                              <p:par>
-                                <p:cTn id="24" presetID="10" presetClass="entr" presetSubtype="0" fill="hold" grpId="0" nodeType="withEffect">
-                                  <p:stCondLst>
-                                    <p:cond delay="0"/>
-                                  </p:stCondLst>
-                                  <p:childTnLst>
-                                    <p:set>
-                                      <p:cBhvr>
-                                        <p:cTn id="25" dur="1" fill="hold">
-                                          <p:stCondLst>
-                                            <p:cond delay="0"/>
-                                          </p:stCondLst>
-                                        </p:cTn>
-                                        <p:tgtEl>
-                                          <p:spTgt spid="10"/>
-                                        </p:tgtEl>
-                                        <p:attrNameLst>
-                                          <p:attrName>style.visibility</p:attrName>
-                                        </p:attrNameLst>
-                                      </p:cBhvr>
-                                      <p:to>
-                                        <p:strVal val="visible"/>
-                                      </p:to>
-                                    </p:set>
-                                    <p:animEffect transition="in" filter="fade">
-                                      <p:cBhvr>
-                                        <p:cTn id="26" dur="500"/>
-                                        <p:tgtEl>
-                                          <p:spTgt spid="10"/>
-                                        </p:tgtEl>
-                                      </p:cBhvr>
-                                    </p:animEffect>
-                                  </p:childTnLst>
-                                </p:cTn>
-                              </p:par>
-                            </p:childTnLst>
-                          </p:cTn>
-                        </p:par>
-                      </p:childTnLst>
-                    </p:cTn>
-                  </p:par>
                 </p:childTnLst>
               </p:cTn>
               <p:prevCondLst>
@@ -15097,11 +16266,7 @@
     </p:tnLst>
     <p:bldLst>
       <p:bldP spid="2" grpId="0" animBg="1"/>
-      <p:bldP spid="2" grpId="1" animBg="1"/>
       <p:bldP spid="4" grpId="0" animBg="1"/>
-      <p:bldP spid="4" grpId="1" animBg="1"/>
-      <p:bldP spid="9" grpId="0" animBg="1"/>
-      <p:bldP spid="10" grpId="0" animBg="1"/>
     </p:bldLst>
   </p:timing>
 </p:sld>

</xml_diff>

<commit_message>
update rmd and ppt
</commit_message>
<xml_diff>
--- a/DDS_Project_2_Presentation.pptx
+++ b/DDS_Project_2_Presentation.pptx
@@ -136,7 +136,7 @@
 <file path=ppt/revisionInfo.xml><?xml version="1.0" encoding="utf-8"?>
 <p1510:revInfo xmlns:a="http://schemas.openxmlformats.org/drawingml/2006/main" xmlns:r="http://schemas.openxmlformats.org/officeDocument/2006/relationships" xmlns:p1510="http://schemas.microsoft.com/office/powerpoint/2015/10/main">
   <p1510:revLst>
-    <p1510:client id="{F72F3FB8-19C0-4758-9009-50FF7556B545}" v="678" dt="2021-12-11T04:16:25.889"/>
+    <p1510:client id="{F72F3FB8-19C0-4758-9009-50FF7556B545}" v="679" dt="2021-12-11T04:21:55.248"/>
   </p1510:revLst>
 </p1510:revInfo>
 </file>
@@ -146,7 +146,7 @@
   <pc:docChgLst>
     <pc:chgData name="Pandey, Shikha" userId="62b2c247-44c0-476d-a294-f01c5623c9dc" providerId="ADAL" clId="{F72F3FB8-19C0-4758-9009-50FF7556B545}"/>
     <pc:docChg chg="undo redo custSel addSld delSld modSld sldOrd">
-      <pc:chgData name="Pandey, Shikha" userId="62b2c247-44c0-476d-a294-f01c5623c9dc" providerId="ADAL" clId="{F72F3FB8-19C0-4758-9009-50FF7556B545}" dt="2021-12-11T04:16:25.889" v="2592" actId="20577"/>
+      <pc:chgData name="Pandey, Shikha" userId="62b2c247-44c0-476d-a294-f01c5623c9dc" providerId="ADAL" clId="{F72F3FB8-19C0-4758-9009-50FF7556B545}" dt="2021-12-11T04:21:55.248" v="2593" actId="20577"/>
       <pc:docMkLst>
         <pc:docMk/>
       </pc:docMkLst>
@@ -2077,7 +2077,7 @@
         </pc:picChg>
       </pc:sldChg>
       <pc:sldChg chg="addSp delSp modSp add mod modAnim">
-        <pc:chgData name="Pandey, Shikha" userId="62b2c247-44c0-476d-a294-f01c5623c9dc" providerId="ADAL" clId="{F72F3FB8-19C0-4758-9009-50FF7556B545}" dt="2021-12-11T04:16:25.889" v="2592" actId="20577"/>
+        <pc:chgData name="Pandey, Shikha" userId="62b2c247-44c0-476d-a294-f01c5623c9dc" providerId="ADAL" clId="{F72F3FB8-19C0-4758-9009-50FF7556B545}" dt="2021-12-11T04:21:55.248" v="2593" actId="20577"/>
         <pc:sldMkLst>
           <pc:docMk/>
           <pc:sldMk cId="2066871153" sldId="308"/>
@@ -2099,7 +2099,7 @@
           </ac:spMkLst>
         </pc:spChg>
         <pc:spChg chg="mod">
-          <ac:chgData name="Pandey, Shikha" userId="62b2c247-44c0-476d-a294-f01c5623c9dc" providerId="ADAL" clId="{F72F3FB8-19C0-4758-9009-50FF7556B545}" dt="2021-12-11T04:16:25.889" v="2592" actId="20577"/>
+          <ac:chgData name="Pandey, Shikha" userId="62b2c247-44c0-476d-a294-f01c5623c9dc" providerId="ADAL" clId="{F72F3FB8-19C0-4758-9009-50FF7556B545}" dt="2021-12-11T04:21:55.248" v="2593" actId="20577"/>
           <ac:spMkLst>
             <pc:docMk/>
             <pc:sldMk cId="2066871153" sldId="308"/>
@@ -12610,8 +12610,19 @@
                 <a:latin typeface="Calibri" panose="020F0502020204030204" pitchFamily="34" charset="0"/>
                 <a:cs typeface="Calibri" panose="020F0502020204030204" pitchFamily="34" charset="0"/>
               </a:rPr>
-              <a:t>to predict salary had an RMSE of 1080 and P-Value of &lt; 2.2e-16</a:t>
+              <a:t>to predict salary had an RMSE of 1080 and P-Value of </a:t>
             </a:r>
+            <a:r>
+              <a:rPr lang="en-US">
+                <a:latin typeface="Calibri" panose="020F0502020204030204" pitchFamily="34" charset="0"/>
+                <a:cs typeface="Calibri" panose="020F0502020204030204" pitchFamily="34" charset="0"/>
+              </a:rPr>
+              <a:t>&lt; 2.2e-16.</a:t>
+            </a:r>
+            <a:endParaRPr lang="en-US" dirty="0">
+              <a:latin typeface="Calibri" panose="020F0502020204030204" pitchFamily="34" charset="0"/>
+              <a:cs typeface="Calibri" panose="020F0502020204030204" pitchFamily="34" charset="0"/>
+            </a:endParaRPr>
           </a:p>
           <a:p>
             <a:pPr marL="457200" lvl="1" indent="0">

</xml_diff>

<commit_message>
Update frtio lay logo
</commit_message>
<xml_diff>
--- a/DDS_Project_2_Presentation.pptx
+++ b/DDS_Project_2_Presentation.pptx
@@ -2306,7 +2306,7 @@
           <a:p>
             <a:fld id="{23FEA57E-7C1A-457B-A4CD-5DCEB057B502}" type="datetime1">
               <a:rPr lang="en-US" smtClean="0"/>
-              <a:t>12/10/2021</a:t>
+              <a:t>12/11/21</a:t>
             </a:fld>
             <a:endParaRPr lang="en-US" dirty="0"/>
           </a:p>
@@ -2480,7 +2480,7 @@
           <a:p>
             <a:fld id="{11789749-A4CD-447F-8298-2B7988C91CEA}" type="datetime1">
               <a:rPr lang="en-US" smtClean="0"/>
-              <a:t>12/10/2021</a:t>
+              <a:t>12/11/21</a:t>
             </a:fld>
             <a:endParaRPr lang="en-US"/>
           </a:p>
@@ -2664,7 +2664,7 @@
           <a:p>
             <a:fld id="{BA0444D3-C0BA-4587-A56C-581AB9F841BE}" type="datetime1">
               <a:rPr lang="en-US" smtClean="0"/>
-              <a:t>12/10/2021</a:t>
+              <a:t>12/11/21</a:t>
             </a:fld>
             <a:endParaRPr lang="en-US"/>
           </a:p>
@@ -2837,7 +2837,7 @@
           <a:p>
             <a:fld id="{201AF2CE-4F37-411C-A3EE-BBBE223265BF}" type="datetime1">
               <a:rPr lang="en-US" smtClean="0"/>
-              <a:t>12/10/2021</a:t>
+              <a:t>12/11/21</a:t>
             </a:fld>
             <a:endParaRPr lang="en-US"/>
           </a:p>
@@ -3086,7 +3086,7 @@
           <a:p>
             <a:fld id="{C96083D4-708C-4BB5-B4FD-30CE9FA12FD5}" type="datetime1">
               <a:rPr lang="en-US" smtClean="0"/>
-              <a:t>12/10/2021</a:t>
+              <a:t>12/11/21</a:t>
             </a:fld>
             <a:endParaRPr lang="en-US"/>
           </a:p>
@@ -3322,7 +3322,7 @@
           <a:p>
             <a:fld id="{D0D239B2-65BC-4C2A-A62B-3EABFE9590E4}" type="datetime1">
               <a:rPr lang="en-US" smtClean="0"/>
-              <a:t>12/10/2021</a:t>
+              <a:t>12/11/21</a:t>
             </a:fld>
             <a:endParaRPr lang="en-US"/>
           </a:p>
@@ -3692,7 +3692,7 @@
           <a:p>
             <a:fld id="{85E05F5A-E4A3-476F-A89E-C2B73F2431E4}" type="datetime1">
               <a:rPr lang="en-US" smtClean="0"/>
-              <a:t>12/10/2021</a:t>
+              <a:t>12/11/21</a:t>
             </a:fld>
             <a:endParaRPr lang="en-US"/>
           </a:p>
@@ -3813,7 +3813,7 @@
           <a:p>
             <a:fld id="{E3761515-4A26-4F31-9F61-5A10B1FABBFC}" type="datetime1">
               <a:rPr lang="en-US" smtClean="0"/>
-              <a:t>12/10/2021</a:t>
+              <a:t>12/11/21</a:t>
             </a:fld>
             <a:endParaRPr lang="en-US"/>
           </a:p>
@@ -3911,7 +3911,7 @@
           <a:p>
             <a:fld id="{4A75DC65-7D1F-4BAB-9695-F7E734143E14}" type="datetime1">
               <a:rPr lang="en-US" smtClean="0"/>
-              <a:t>12/10/2021</a:t>
+              <a:t>12/11/21</a:t>
             </a:fld>
             <a:endParaRPr lang="en-US"/>
           </a:p>
@@ -4191,7 +4191,7 @@
           <a:p>
             <a:fld id="{7E624077-BD55-4036-8E92-6558FDF3B653}" type="datetime1">
               <a:rPr lang="en-US" smtClean="0"/>
-              <a:t>12/10/2021</a:t>
+              <a:t>12/11/21</a:t>
             </a:fld>
             <a:endParaRPr lang="en-US"/>
           </a:p>
@@ -4451,7 +4451,7 @@
           <a:p>
             <a:fld id="{804225F2-7107-4609-BCC2-77C63064A5E8}" type="datetime1">
               <a:rPr lang="en-US" smtClean="0"/>
-              <a:t>12/10/2021</a:t>
+              <a:t>12/11/21</a:t>
             </a:fld>
             <a:endParaRPr lang="en-US"/>
           </a:p>
@@ -4667,7 +4667,7 @@
           <a:p>
             <a:fld id="{D3FE42E8-8B57-452D-A122-4DCE9AC771EF}" type="datetime1">
               <a:rPr lang="en-US" smtClean="0"/>
-              <a:t>12/10/2021</a:t>
+              <a:t>12/11/21</a:t>
             </a:fld>
             <a:endParaRPr lang="en-US"/>
           </a:p>
@@ -5064,6 +5064,17 @@
 <file path=ppt/slides/slide1.xml><?xml version="1.0" encoding="utf-8"?>
 <p:sld xmlns:a="http://schemas.openxmlformats.org/drawingml/2006/main" xmlns:r="http://schemas.openxmlformats.org/officeDocument/2006/relationships" xmlns:p="http://schemas.openxmlformats.org/presentationml/2006/main">
   <p:cSld>
+    <p:bg>
+      <p:bgPr>
+        <a:solidFill>
+          <a:schemeClr val="bg1">
+            <a:tint val="95000"/>
+            <a:satMod val="170000"/>
+          </a:schemeClr>
+        </a:solidFill>
+        <a:effectLst/>
+      </p:bgPr>
+    </p:bg>
     <p:spTree>
       <p:nvGrpSpPr>
         <p:cNvPr id="1" name=""/>
@@ -5078,74 +5089,91 @@
           <a:chExt cx="0" cy="0"/>
         </a:xfrm>
       </p:grpSpPr>
-      <p:pic>
-        <p:nvPicPr>
-          <p:cNvPr id="4" name="Picture 3" descr="Digital financial graph">
+      <p:sp>
+        <p:nvSpPr>
+          <p:cNvPr id="2" name="Title 1">
             <a:extLst>
               <a:ext uri="{FF2B5EF4-FFF2-40B4-BE49-F238E27FC236}">
-                <a16:creationId xmlns:a16="http://schemas.microsoft.com/office/drawing/2014/main" id="{744A3A76-5E31-4CB8-B7CA-3A49A5C8B7A5}"/>
+                <a16:creationId xmlns:a16="http://schemas.microsoft.com/office/drawing/2014/main" id="{73D37183-0856-4915-B9D2-E2787D0BA4B6}"/>
               </a:ext>
             </a:extLst>
           </p:cNvPr>
-          <p:cNvPicPr>
-            <a:picLocks noChangeAspect="1"/>
-          </p:cNvPicPr>
-          <p:nvPr/>
-        </p:nvPicPr>
-        <p:blipFill rotWithShape="1">
-          <a:blip r:embed="rId2"/>
-          <a:srcRect l="36697" t="9091" r="10227" b="-1"/>
-          <a:stretch/>
-        </p:blipFill>
+          <p:cNvSpPr>
+            <a:spLocks noGrp="1"/>
+          </p:cNvSpPr>
+          <p:nvPr>
+            <p:ph type="ctrTitle"/>
+          </p:nvPr>
+        </p:nvSpPr>
         <p:spPr>
           <a:xfrm>
-            <a:off x="20" y="584909"/>
-            <a:ext cx="5718616" cy="5509675"/>
-          </a:xfrm>
-          <a:custGeom>
-            <a:avLst/>
-            <a:gdLst/>
-            <a:ahLst/>
-            <a:cxnLst/>
-            <a:rect l="l" t="t" r="r" b="b"/>
-            <a:pathLst>
-              <a:path w="5718636" h="5509675">
-                <a:moveTo>
-                  <a:pt x="0" y="0"/>
-                </a:moveTo>
-                <a:lnTo>
-                  <a:pt x="2672821" y="0"/>
-                </a:lnTo>
-                <a:lnTo>
-                  <a:pt x="2673116" y="639"/>
-                </a:lnTo>
-                <a:lnTo>
-                  <a:pt x="3175662" y="639"/>
-                </a:lnTo>
-                <a:lnTo>
-                  <a:pt x="5718636" y="5509675"/>
-                </a:lnTo>
-                <a:lnTo>
-                  <a:pt x="502842" y="5509675"/>
-                </a:lnTo>
-                <a:lnTo>
-                  <a:pt x="502842" y="5509036"/>
-                </a:lnTo>
-                <a:lnTo>
-                  <a:pt x="0" y="5509036"/>
-                </a:lnTo>
-                <a:close/>
-              </a:path>
-            </a:pathLst>
-          </a:custGeom>
-        </p:spPr>
-      </p:pic>
-      <p:sp>
-        <p:nvSpPr>
-          <p:cNvPr id="33" name="Freeform: Shape 8">
+            <a:off x="6230271" y="3149443"/>
+            <a:ext cx="5242259" cy="1922251"/>
+          </a:xfrm>
+        </p:spPr>
+        <p:txBody>
+          <a:bodyPr anchor="t">
+            <a:normAutofit/>
+          </a:bodyPr>
+          <a:lstStyle/>
+          <a:p>
+            <a:pPr algn="l"/>
+            <a:r>
+              <a:rPr lang="en-US" sz="4800" b="1" cap="none" dirty="0"/>
+              <a:t>Project 2: Attrition Case Study</a:t>
+            </a:r>
+          </a:p>
+        </p:txBody>
+      </p:sp>
+      <p:sp>
+        <p:nvSpPr>
+          <p:cNvPr id="3" name="Subtitle 2">
             <a:extLst>
               <a:ext uri="{FF2B5EF4-FFF2-40B4-BE49-F238E27FC236}">
-                <a16:creationId xmlns:a16="http://schemas.microsoft.com/office/drawing/2014/main" id="{17CDB40A-75BB-4498-A20B-59C3984A3A94}"/>
+                <a16:creationId xmlns:a16="http://schemas.microsoft.com/office/drawing/2014/main" id="{9F4E3209-0930-4C8F-8474-9666A52C03A2}"/>
+              </a:ext>
+            </a:extLst>
+          </p:cNvPr>
+          <p:cNvSpPr>
+            <a:spLocks noGrp="1"/>
+          </p:cNvSpPr>
+          <p:nvPr>
+            <p:ph type="subTitle" idx="1"/>
+          </p:nvPr>
+        </p:nvSpPr>
+        <p:spPr>
+          <a:xfrm>
+            <a:off x="6310924" y="5071694"/>
+            <a:ext cx="5161606" cy="972180"/>
+          </a:xfrm>
+        </p:spPr>
+        <p:txBody>
+          <a:bodyPr anchor="b">
+            <a:normAutofit/>
+          </a:bodyPr>
+          <a:lstStyle/>
+          <a:p>
+            <a:pPr algn="l"/>
+            <a:r>
+              <a:rPr lang="en-US" sz="2000" dirty="0"/>
+              <a:t>Presented by: </a:t>
+            </a:r>
+          </a:p>
+          <a:p>
+            <a:pPr algn="l"/>
+            <a:r>
+              <a:rPr lang="en-US" sz="2000" dirty="0"/>
+              <a:t>Kevin Boyd and Shikha Pandey</a:t>
+            </a:r>
+          </a:p>
+        </p:txBody>
+      </p:sp>
+      <p:sp>
+        <p:nvSpPr>
+          <p:cNvPr id="38" name="Freeform: Shape 37">
+            <a:extLst>
+              <a:ext uri="{FF2B5EF4-FFF2-40B4-BE49-F238E27FC236}">
+                <a16:creationId xmlns:a16="http://schemas.microsoft.com/office/drawing/2014/main" id="{60B21A5C-062F-46C2-8389-53D40F46AA26}"/>
               </a:ext>
               <a:ext uri="{C183D7F6-B498-43B3-948B-1728B52AA6E4}">
                 <adec:decorative xmlns:adec="http://schemas.microsoft.com/office/drawing/2017/decorative" val="1"/>
@@ -5164,21 +5192,35 @@
           </p:nvPr>
         </p:nvSpPr>
         <p:spPr>
-          <a:xfrm flipH="1">
-            <a:off x="3842619" y="585526"/>
-            <a:ext cx="8349381" cy="5509038"/>
+          <a:xfrm>
+            <a:off x="1" y="483466"/>
+            <a:ext cx="5549037" cy="6374535"/>
           </a:xfrm>
           <a:custGeom>
             <a:avLst/>
             <a:gdLst>
-              <a:gd name="connsiteX0" fmla="*/ 0 w 8349381"/>
-              <a:gd name="connsiteY0" fmla="*/ 0 h 5509038"/>
-              <a:gd name="connsiteX1" fmla="*/ 8349381 w 8349381"/>
-              <a:gd name="connsiteY1" fmla="*/ 0 h 5509038"/>
-              <a:gd name="connsiteX2" fmla="*/ 5806407 w 8349381"/>
-              <a:gd name="connsiteY2" fmla="*/ 5509038 h 5509038"/>
-              <a:gd name="connsiteX3" fmla="*/ 0 w 8349381"/>
-              <a:gd name="connsiteY3" fmla="*/ 5509038 h 5509038"/>
+              <a:gd name="connsiteX0" fmla="*/ 2203019 w 5549037"/>
+              <a:gd name="connsiteY0" fmla="*/ 0 h 6374535"/>
+              <a:gd name="connsiteX1" fmla="*/ 5549037 w 5549037"/>
+              <a:gd name="connsiteY1" fmla="*/ 3346018 h 6374535"/>
+              <a:gd name="connsiteX2" fmla="*/ 3797930 w 5549037"/>
+              <a:gd name="connsiteY2" fmla="*/ 6288190 h 6374535"/>
+              <a:gd name="connsiteX3" fmla="*/ 3618689 w 5549037"/>
+              <a:gd name="connsiteY3" fmla="*/ 6374535 h 6374535"/>
+              <a:gd name="connsiteX4" fmla="*/ 779546 w 5549037"/>
+              <a:gd name="connsiteY4" fmla="*/ 6374535 h 6374535"/>
+              <a:gd name="connsiteX5" fmla="*/ 537516 w 5549037"/>
+              <a:gd name="connsiteY5" fmla="*/ 6248727 h 6374535"/>
+              <a:gd name="connsiteX6" fmla="*/ 74641 w 5549037"/>
+              <a:gd name="connsiteY6" fmla="*/ 5927968 h 6374535"/>
+              <a:gd name="connsiteX7" fmla="*/ 0 w 5549037"/>
+              <a:gd name="connsiteY7" fmla="*/ 5860130 h 6374535"/>
+              <a:gd name="connsiteX8" fmla="*/ 0 w 5549037"/>
+              <a:gd name="connsiteY8" fmla="*/ 831906 h 6374535"/>
+              <a:gd name="connsiteX9" fmla="*/ 74641 w 5549037"/>
+              <a:gd name="connsiteY9" fmla="*/ 764068 h 6374535"/>
+              <a:gd name="connsiteX10" fmla="*/ 2203019 w 5549037"/>
+              <a:gd name="connsiteY10" fmla="*/ 0 h 6374535"/>
             </a:gdLst>
             <a:ahLst/>
             <a:cxnLst>
@@ -5194,28 +5236,80 @@
               <a:cxn ang="0">
                 <a:pos x="connsiteX3" y="connsiteY3"/>
               </a:cxn>
+              <a:cxn ang="0">
+                <a:pos x="connsiteX4" y="connsiteY4"/>
+              </a:cxn>
+              <a:cxn ang="0">
+                <a:pos x="connsiteX5" y="connsiteY5"/>
+              </a:cxn>
+              <a:cxn ang="0">
+                <a:pos x="connsiteX6" y="connsiteY6"/>
+              </a:cxn>
+              <a:cxn ang="0">
+                <a:pos x="connsiteX7" y="connsiteY7"/>
+              </a:cxn>
+              <a:cxn ang="0">
+                <a:pos x="connsiteX8" y="connsiteY8"/>
+              </a:cxn>
+              <a:cxn ang="0">
+                <a:pos x="connsiteX9" y="connsiteY9"/>
+              </a:cxn>
+              <a:cxn ang="0">
+                <a:pos x="connsiteX10" y="connsiteY10"/>
+              </a:cxn>
             </a:cxnLst>
             <a:rect l="l" t="t" r="r" b="b"/>
             <a:pathLst>
-              <a:path w="8349381" h="5509038">
+              <a:path w="5549037" h="6374535">
                 <a:moveTo>
-                  <a:pt x="0" y="0"/>
+                  <a:pt x="2203019" y="0"/>
                 </a:moveTo>
+                <a:cubicBezTo>
+                  <a:pt x="4050974" y="0"/>
+                  <a:pt x="5549037" y="1498063"/>
+                  <a:pt x="5549037" y="3346018"/>
+                </a:cubicBezTo>
+                <a:cubicBezTo>
+                  <a:pt x="5549037" y="4616487"/>
+                  <a:pt x="4840968" y="5721578"/>
+                  <a:pt x="3797930" y="6288190"/>
+                </a:cubicBezTo>
                 <a:lnTo>
-                  <a:pt x="8349381" y="0"/>
+                  <a:pt x="3618689" y="6374535"/>
                 </a:lnTo>
                 <a:lnTo>
-                  <a:pt x="5806407" y="5509038"/>
+                  <a:pt x="779546" y="6374535"/>
                 </a:lnTo>
                 <a:lnTo>
-                  <a:pt x="0" y="5509038"/>
+                  <a:pt x="537516" y="6248727"/>
                 </a:lnTo>
+                <a:cubicBezTo>
+                  <a:pt x="374031" y="6154721"/>
+                  <a:pt x="219238" y="6047301"/>
+                  <a:pt x="74641" y="5927968"/>
+                </a:cubicBezTo>
+                <a:lnTo>
+                  <a:pt x="0" y="5860130"/>
+                </a:lnTo>
+                <a:lnTo>
+                  <a:pt x="0" y="831906"/>
+                </a:lnTo>
+                <a:lnTo>
+                  <a:pt x="74641" y="764068"/>
+                </a:lnTo>
+                <a:cubicBezTo>
+                  <a:pt x="653030" y="286739"/>
+                  <a:pt x="1394539" y="0"/>
+                  <a:pt x="2203019" y="0"/>
+                </a:cubicBezTo>
                 <a:close/>
               </a:path>
             </a:pathLst>
           </a:custGeom>
           <a:solidFill>
-            <a:srgbClr val="262626"/>
+            <a:srgbClr val="FFFFFF">
+              <a:alpha val="80000"/>
+            </a:srgbClr>
           </a:solidFill>
           <a:ln>
             <a:noFill/>
@@ -5238,118 +5332,374 @@
           </a:fontRef>
         </p:style>
         <p:txBody>
-          <a:bodyPr wrap="square" rtlCol="0" anchor="ctr">
-            <a:noAutofit/>
-          </a:bodyPr>
+          <a:bodyPr rtlCol="0" anchor="ctr"/>
           <a:lstStyle/>
           <a:p>
-            <a:pPr algn="ctr"/>
-            <a:endParaRPr lang="en-US">
+            <a:pPr marL="0" marR="0" lvl="0" indent="0" algn="ctr" defTabSz="914400" rtl="0" eaLnBrk="1" fontAlgn="auto" latinLnBrk="0" hangingPunct="1">
+              <a:lnSpc>
+                <a:spcPct val="100000"/>
+              </a:lnSpc>
+              <a:spcBef>
+                <a:spcPts val="0"/>
+              </a:spcBef>
+              <a:spcAft>
+                <a:spcPts val="0"/>
+              </a:spcAft>
+              <a:buClrTx/>
+              <a:buSzTx/>
+              <a:buFontTx/>
+              <a:buNone/>
+              <a:tabLst/>
+              <a:defRPr/>
+            </a:pPr>
+            <a:endParaRPr kumimoji="0" lang="en-US" sz="1800" b="0" i="0" u="none" strike="noStrike" kern="1200" cap="none" spc="0" normalizeH="0" baseline="0" noProof="0">
+              <a:ln>
+                <a:noFill/>
+              </a:ln>
               <a:solidFill>
-                <a:schemeClr val="bg1">
-                  <a:lumMod val="95000"/>
-                </a:schemeClr>
+                <a:prstClr val="white"/>
               </a:solidFill>
+              <a:effectLst/>
+              <a:uLnTx/>
+              <a:uFillTx/>
+              <a:latin typeface="Calibri" panose="020F0502020204030204"/>
+              <a:ea typeface="+mn-ea"/>
+              <a:cs typeface="+mn-cs"/>
             </a:endParaRPr>
           </a:p>
         </p:txBody>
       </p:sp>
-      <p:sp>
-        <p:nvSpPr>
-          <p:cNvPr id="3" name="Subtitle 2">
+      <p:pic>
+        <p:nvPicPr>
+          <p:cNvPr id="4" name="Picture 3" descr="Digital financial graph">
             <a:extLst>
               <a:ext uri="{FF2B5EF4-FFF2-40B4-BE49-F238E27FC236}">
-                <a16:creationId xmlns:a16="http://schemas.microsoft.com/office/drawing/2014/main" id="{9F4E3209-0930-4C8F-8474-9666A52C03A2}"/>
+                <a16:creationId xmlns:a16="http://schemas.microsoft.com/office/drawing/2014/main" id="{744A3A76-5E31-4CB8-B7CA-3A49A5C8B7A5}"/>
+              </a:ext>
+            </a:extLst>
+          </p:cNvPr>
+          <p:cNvPicPr>
+            <a:picLocks noChangeAspect="1"/>
+          </p:cNvPicPr>
+          <p:nvPr/>
+        </p:nvPicPr>
+        <p:blipFill rotWithShape="1">
+          <a:blip r:embed="rId2"/>
+          <a:srcRect l="38848" r="12379" b="1"/>
+          <a:stretch/>
+        </p:blipFill>
+        <p:spPr>
+          <a:xfrm>
+            <a:off x="1" y="647373"/>
+            <a:ext cx="5385130" cy="6210629"/>
+          </a:xfrm>
+          <a:custGeom>
+            <a:avLst/>
+            <a:gdLst/>
+            <a:ahLst/>
+            <a:cxnLst/>
+            <a:rect l="l" t="t" r="r" b="b"/>
+            <a:pathLst>
+              <a:path w="5385130" h="6210629">
+                <a:moveTo>
+                  <a:pt x="2203018" y="0"/>
+                </a:moveTo>
+                <a:cubicBezTo>
+                  <a:pt x="3960450" y="0"/>
+                  <a:pt x="5385130" y="1424680"/>
+                  <a:pt x="5385130" y="3182112"/>
+                </a:cubicBezTo>
+                <a:cubicBezTo>
+                  <a:pt x="5385130" y="4500186"/>
+                  <a:pt x="4583748" y="5631087"/>
+                  <a:pt x="3441640" y="6114158"/>
+                </a:cubicBezTo>
+                <a:lnTo>
+                  <a:pt x="3178061" y="6210629"/>
+                </a:lnTo>
+                <a:lnTo>
+                  <a:pt x="1233206" y="6210629"/>
+                </a:lnTo>
+                <a:lnTo>
+                  <a:pt x="1108901" y="6171135"/>
+                </a:lnTo>
+                <a:cubicBezTo>
+                  <a:pt x="767738" y="6046219"/>
+                  <a:pt x="453928" y="5864559"/>
+                  <a:pt x="178899" y="5637585"/>
+                </a:cubicBezTo>
+                <a:lnTo>
+                  <a:pt x="0" y="5474990"/>
+                </a:lnTo>
+                <a:lnTo>
+                  <a:pt x="0" y="889234"/>
+                </a:lnTo>
+                <a:lnTo>
+                  <a:pt x="178899" y="726640"/>
+                </a:lnTo>
+                <a:cubicBezTo>
+                  <a:pt x="728956" y="272693"/>
+                  <a:pt x="1434142" y="0"/>
+                  <a:pt x="2203018" y="0"/>
+                </a:cubicBezTo>
+                <a:close/>
+              </a:path>
+            </a:pathLst>
+          </a:custGeom>
+        </p:spPr>
+      </p:pic>
+      <p:sp>
+        <p:nvSpPr>
+          <p:cNvPr id="40" name="Freeform: Shape 39">
+            <a:extLst>
+              <a:ext uri="{FF2B5EF4-FFF2-40B4-BE49-F238E27FC236}">
+                <a16:creationId xmlns:a16="http://schemas.microsoft.com/office/drawing/2014/main" id="{8A177BCC-4208-4795-8572-4D623BA1E2A0}"/>
+              </a:ext>
+              <a:ext uri="{C183D7F6-B498-43B3-948B-1728B52AA6E4}">
+                <adec:decorative xmlns:adec="http://schemas.microsoft.com/office/drawing/2017/decorative" val="1"/>
               </a:ext>
             </a:extLst>
           </p:cNvPr>
           <p:cNvSpPr>
-            <a:spLocks noGrp="1"/>
+            <a:spLocks noGrp="1" noRot="1" noChangeAspect="1" noMove="1" noResize="1" noEditPoints="1" noAdjustHandles="1" noChangeArrowheads="1" noChangeShapeType="1" noTextEdit="1"/>
           </p:cNvSpPr>
           <p:nvPr>
-            <p:ph type="subTitle" idx="1"/>
+            <p:extLst>
+              <p:ext uri="{386F3935-93C4-4BCD-93E2-E3B085C9AB24}">
+                <p16:designElem xmlns:p16="http://schemas.microsoft.com/office/powerpoint/2015/main" val="1"/>
+              </p:ext>
+            </p:extLst>
           </p:nvPr>
         </p:nvSpPr>
         <p:spPr>
           <a:xfrm>
-            <a:off x="5986272" y="3651047"/>
-            <a:ext cx="5370576" cy="911117"/>
-          </a:xfrm>
-        </p:spPr>
-        <p:txBody>
-          <a:bodyPr>
-            <a:normAutofit/>
-          </a:bodyPr>
+            <a:off x="5233763" y="1"/>
+            <a:ext cx="4480560" cy="2513993"/>
+          </a:xfrm>
+          <a:custGeom>
+            <a:avLst/>
+            <a:gdLst>
+              <a:gd name="connsiteX0" fmla="*/ 18382 w 4480560"/>
+              <a:gd name="connsiteY0" fmla="*/ 0 h 2513993"/>
+              <a:gd name="connsiteX1" fmla="*/ 4462178 w 4480560"/>
+              <a:gd name="connsiteY1" fmla="*/ 0 h 2513993"/>
+              <a:gd name="connsiteX2" fmla="*/ 4468994 w 4480560"/>
+              <a:gd name="connsiteY2" fmla="*/ 44657 h 2513993"/>
+              <a:gd name="connsiteX3" fmla="*/ 4480560 w 4480560"/>
+              <a:gd name="connsiteY3" fmla="*/ 273713 h 2513993"/>
+              <a:gd name="connsiteX4" fmla="*/ 2240280 w 4480560"/>
+              <a:gd name="connsiteY4" fmla="*/ 2513993 h 2513993"/>
+              <a:gd name="connsiteX5" fmla="*/ 0 w 4480560"/>
+              <a:gd name="connsiteY5" fmla="*/ 273713 h 2513993"/>
+              <a:gd name="connsiteX6" fmla="*/ 11567 w 4480560"/>
+              <a:gd name="connsiteY6" fmla="*/ 44657 h 2513993"/>
+            </a:gdLst>
+            <a:ahLst/>
+            <a:cxnLst>
+              <a:cxn ang="0">
+                <a:pos x="connsiteX0" y="connsiteY0"/>
+              </a:cxn>
+              <a:cxn ang="0">
+                <a:pos x="connsiteX1" y="connsiteY1"/>
+              </a:cxn>
+              <a:cxn ang="0">
+                <a:pos x="connsiteX2" y="connsiteY2"/>
+              </a:cxn>
+              <a:cxn ang="0">
+                <a:pos x="connsiteX3" y="connsiteY3"/>
+              </a:cxn>
+              <a:cxn ang="0">
+                <a:pos x="connsiteX4" y="connsiteY4"/>
+              </a:cxn>
+              <a:cxn ang="0">
+                <a:pos x="connsiteX5" y="connsiteY5"/>
+              </a:cxn>
+              <a:cxn ang="0">
+                <a:pos x="connsiteX6" y="connsiteY6"/>
+              </a:cxn>
+            </a:cxnLst>
+            <a:rect l="l" t="t" r="r" b="b"/>
+            <a:pathLst>
+              <a:path w="4480560" h="2513993">
+                <a:moveTo>
+                  <a:pt x="18382" y="0"/>
+                </a:moveTo>
+                <a:lnTo>
+                  <a:pt x="4462178" y="0"/>
+                </a:lnTo>
+                <a:lnTo>
+                  <a:pt x="4468994" y="44657"/>
+                </a:lnTo>
+                <a:cubicBezTo>
+                  <a:pt x="4476642" y="119969"/>
+                  <a:pt x="4480560" y="196384"/>
+                  <a:pt x="4480560" y="273713"/>
+                </a:cubicBezTo>
+                <a:cubicBezTo>
+                  <a:pt x="4480560" y="1510985"/>
+                  <a:pt x="3477552" y="2513993"/>
+                  <a:pt x="2240280" y="2513993"/>
+                </a:cubicBezTo>
+                <a:cubicBezTo>
+                  <a:pt x="1003008" y="2513993"/>
+                  <a:pt x="0" y="1510985"/>
+                  <a:pt x="0" y="273713"/>
+                </a:cubicBezTo>
+                <a:cubicBezTo>
+                  <a:pt x="0" y="196384"/>
+                  <a:pt x="3918" y="119969"/>
+                  <a:pt x="11567" y="44657"/>
+                </a:cubicBezTo>
+                <a:close/>
+              </a:path>
+            </a:pathLst>
+          </a:custGeom>
+          <a:solidFill>
+            <a:srgbClr val="FFFFFF">
+              <a:alpha val="80000"/>
+            </a:srgbClr>
+          </a:solidFill>
+          <a:ln>
+            <a:noFill/>
+          </a:ln>
+        </p:spPr>
+        <p:style>
+          <a:lnRef idx="2">
+            <a:schemeClr val="accent1">
+              <a:shade val="50000"/>
+            </a:schemeClr>
+          </a:lnRef>
+          <a:fillRef idx="1">
+            <a:schemeClr val="accent1"/>
+          </a:fillRef>
+          <a:effectRef idx="0">
+            <a:schemeClr val="accent1"/>
+          </a:effectRef>
+          <a:fontRef idx="minor">
+            <a:schemeClr val="lt1"/>
+          </a:fontRef>
+        </p:style>
+        <p:txBody>
+          <a:bodyPr rtlCol="0" anchor="ctr"/>
           <a:lstStyle/>
           <a:p>
-            <a:pPr algn="l"/>
-            <a:r>
-              <a:rPr lang="en-US" sz="2000" dirty="0">
+            <a:pPr marL="0" marR="0" lvl="0" indent="0" algn="ctr" defTabSz="914400" rtl="0" eaLnBrk="1" fontAlgn="auto" latinLnBrk="0" hangingPunct="1">
+              <a:lnSpc>
+                <a:spcPct val="100000"/>
+              </a:lnSpc>
+              <a:spcBef>
+                <a:spcPts val="0"/>
+              </a:spcBef>
+              <a:spcAft>
+                <a:spcPts val="0"/>
+              </a:spcAft>
+              <a:buClrTx/>
+              <a:buSzTx/>
+              <a:buFontTx/>
+              <a:buNone/>
+              <a:tabLst/>
+              <a:defRPr/>
+            </a:pPr>
+            <a:endParaRPr kumimoji="0" lang="en-US" sz="1800" b="0" i="0" u="none" strike="noStrike" kern="1200" cap="none" spc="0" normalizeH="0" baseline="0" noProof="0">
+              <a:ln>
+                <a:noFill/>
+              </a:ln>
+              <a:solidFill>
+                <a:prstClr val="white"/>
+              </a:solidFill>
+              <a:effectLst/>
+              <a:uLnTx/>
+              <a:uFillTx/>
+              <a:latin typeface="Calibri" panose="020F0502020204030204"/>
+              <a:ea typeface="+mn-ea"/>
+              <a:cs typeface="+mn-cs"/>
+            </a:endParaRPr>
+          </a:p>
+        </p:txBody>
+      </p:sp>
+      <p:pic>
+        <p:nvPicPr>
+          <p:cNvPr id="6" name="Picture 2" descr="Home | FritoLay">
+            <a:extLst>
+              <a:ext uri="{FF2B5EF4-FFF2-40B4-BE49-F238E27FC236}">
+                <a16:creationId xmlns:a16="http://schemas.microsoft.com/office/drawing/2014/main" id="{03A1FB7C-F1DF-AF49-84E0-C4F3FB4D1A35}"/>
+              </a:ext>
+            </a:extLst>
+          </p:cNvPr>
+          <p:cNvPicPr>
+            <a:picLocks noChangeAspect="1" noChangeArrowheads="1"/>
+          </p:cNvPicPr>
+          <p:nvPr/>
+        </p:nvPicPr>
+        <p:blipFill rotWithShape="1">
+          <a:blip r:embed="rId3">
+            <a:extLst>
+              <a:ext uri="{28A0092B-C50C-407E-A947-70E740481C1C}">
+                <a14:useLocalDpi xmlns:a14="http://schemas.microsoft.com/office/drawing/2010/main" val="0"/>
+              </a:ext>
+            </a:extLst>
+          </a:blip>
+          <a:srcRect l="2425" r="4811" b="3"/>
+          <a:stretch/>
+        </p:blipFill>
+        <p:spPr bwMode="auto">
+          <a:xfrm>
+            <a:off x="5398355" y="1"/>
+            <a:ext cx="4151376" cy="2349401"/>
+          </a:xfrm>
+          <a:custGeom>
+            <a:avLst/>
+            <a:gdLst/>
+            <a:ahLst/>
+            <a:cxnLst/>
+            <a:rect l="l" t="t" r="r" b="b"/>
+            <a:pathLst>
+              <a:path w="4151376" h="2349401">
+                <a:moveTo>
+                  <a:pt x="20101" y="0"/>
+                </a:moveTo>
+                <a:lnTo>
+                  <a:pt x="4131276" y="0"/>
+                </a:lnTo>
+                <a:lnTo>
+                  <a:pt x="4140659" y="61486"/>
+                </a:lnTo>
+                <a:cubicBezTo>
+                  <a:pt x="4147746" y="131265"/>
+                  <a:pt x="4151376" y="202065"/>
+                  <a:pt x="4151376" y="273713"/>
+                </a:cubicBezTo>
+                <a:cubicBezTo>
+                  <a:pt x="4151376" y="1420084"/>
+                  <a:pt x="3222059" y="2349401"/>
+                  <a:pt x="2075688" y="2349401"/>
+                </a:cubicBezTo>
+                <a:cubicBezTo>
+                  <a:pt x="929317" y="2349401"/>
+                  <a:pt x="0" y="1420084"/>
+                  <a:pt x="0" y="273713"/>
+                </a:cubicBezTo>
+                <a:cubicBezTo>
+                  <a:pt x="0" y="202065"/>
+                  <a:pt x="3630" y="131265"/>
+                  <a:pt x="10717" y="61486"/>
+                </a:cubicBezTo>
+                <a:close/>
+              </a:path>
+            </a:pathLst>
+          </a:custGeom>
+          <a:noFill/>
+          <a:extLst>
+            <a:ext uri="{909E8E84-426E-40DD-AFC4-6F175D3DCCD1}">
+              <a14:hiddenFill xmlns:a14="http://schemas.microsoft.com/office/drawing/2010/main">
                 <a:solidFill>
                   <a:srgbClr val="FFFFFF"/>
                 </a:solidFill>
-              </a:rPr>
-              <a:t>Presented by: </a:t>
-            </a:r>
-          </a:p>
-          <a:p>
-            <a:pPr algn="l"/>
-            <a:r>
-              <a:rPr lang="en-US" sz="2000" dirty="0">
-                <a:solidFill>
-                  <a:srgbClr val="FFFFFF"/>
-                </a:solidFill>
-              </a:rPr>
-              <a:t>Kevin Boyd and Shikha Pandey</a:t>
-            </a:r>
-          </a:p>
-        </p:txBody>
-      </p:sp>
-      <p:sp>
-        <p:nvSpPr>
-          <p:cNvPr id="2" name="Title 1">
-            <a:extLst>
-              <a:ext uri="{FF2B5EF4-FFF2-40B4-BE49-F238E27FC236}">
-                <a16:creationId xmlns:a16="http://schemas.microsoft.com/office/drawing/2014/main" id="{73D37183-0856-4915-B9D2-E2787D0BA4B6}"/>
-              </a:ext>
-            </a:extLst>
-          </p:cNvPr>
-          <p:cNvSpPr>
-            <a:spLocks noGrp="1"/>
-          </p:cNvSpPr>
-          <p:nvPr>
-            <p:ph type="ctrTitle"/>
-          </p:nvPr>
-        </p:nvSpPr>
-        <p:spPr>
-          <a:xfrm>
-            <a:off x="5673747" y="1408814"/>
-            <a:ext cx="5683102" cy="2235277"/>
-          </a:xfrm>
-        </p:spPr>
-        <p:txBody>
-          <a:bodyPr>
-            <a:normAutofit/>
-          </a:bodyPr>
-          <a:lstStyle/>
-          <a:p>
-            <a:pPr algn="l"/>
-            <a:r>
-              <a:rPr lang="en-US" sz="5400" b="1" cap="none">
-                <a:solidFill>
-                  <a:srgbClr val="FFFFFF"/>
-                </a:solidFill>
-              </a:rPr>
-              <a:t>Project 2: Attrition Case Study</a:t>
-            </a:r>
-            <a:endParaRPr lang="en-US" sz="5400" b="1" cap="none" dirty="0">
-              <a:solidFill>
-                <a:srgbClr val="FFFFFF"/>
-              </a:solidFill>
-            </a:endParaRPr>
-          </a:p>
-        </p:txBody>
-      </p:sp>
+              </a14:hiddenFill>
+            </a:ext>
+          </a:extLst>
+        </p:spPr>
+      </p:pic>
     </p:spTree>
     <p:extLst>
       <p:ext uri="{BB962C8B-B14F-4D97-AF65-F5344CB8AC3E}">
@@ -5358,7 +5708,7 @@
     </p:extLst>
   </p:cSld>
   <p:clrMapOvr>
-    <a:masterClrMapping/>
+    <a:overrideClrMapping bg1="dk1" tx1="lt1" bg2="dk2" tx2="lt2" accent1="accent1" accent2="accent2" accent3="accent3" accent4="accent4" accent5="accent5" accent6="accent6" hlink="hlink" folHlink="folHlink"/>
   </p:clrMapOvr>
 </p:sld>
 </file>
@@ -5784,6 +6134,53 @@
           </a:p>
         </p:txBody>
       </p:sp>
+      <p:pic>
+        <p:nvPicPr>
+          <p:cNvPr id="12" name="Picture 2" descr="Home | FritoLay">
+            <a:extLst>
+              <a:ext uri="{FF2B5EF4-FFF2-40B4-BE49-F238E27FC236}">
+                <a16:creationId xmlns:a16="http://schemas.microsoft.com/office/drawing/2014/main" id="{F6794587-E2CB-8941-A386-ED15BD7ADE32}"/>
+              </a:ext>
+            </a:extLst>
+          </p:cNvPr>
+          <p:cNvPicPr>
+            <a:picLocks noChangeAspect="1" noChangeArrowheads="1"/>
+          </p:cNvPicPr>
+          <p:nvPr/>
+        </p:nvPicPr>
+        <p:blipFill>
+          <a:blip r:embed="rId3">
+            <a:extLst>
+              <a:ext uri="{28A0092B-C50C-407E-A947-70E740481C1C}">
+                <a14:useLocalDpi xmlns:a14="http://schemas.microsoft.com/office/drawing/2010/main" val="0"/>
+              </a:ext>
+            </a:extLst>
+          </a:blip>
+          <a:srcRect/>
+          <a:stretch>
+            <a:fillRect/>
+          </a:stretch>
+        </p:blipFill>
+        <p:spPr bwMode="auto">
+          <a:xfrm>
+            <a:off x="10778771" y="6104958"/>
+            <a:ext cx="1383137" cy="726147"/>
+          </a:xfrm>
+          <a:prstGeom prst="rect">
+            <a:avLst/>
+          </a:prstGeom>
+          <a:noFill/>
+          <a:extLst>
+            <a:ext uri="{909E8E84-426E-40DD-AFC4-6F175D3DCCD1}">
+              <a14:hiddenFill xmlns:a14="http://schemas.microsoft.com/office/drawing/2010/main">
+                <a:solidFill>
+                  <a:srgbClr val="FFFFFF"/>
+                </a:solidFill>
+              </a14:hiddenFill>
+            </a:ext>
+          </a:extLst>
+        </p:spPr>
+      </p:pic>
     </p:spTree>
     <p:extLst>
       <p:ext uri="{BB962C8B-B14F-4D97-AF65-F5344CB8AC3E}">
@@ -6322,6 +6719,53 @@
           </a:p>
         </p:txBody>
       </p:sp>
+      <p:pic>
+        <p:nvPicPr>
+          <p:cNvPr id="12" name="Picture 2" descr="Home | FritoLay">
+            <a:extLst>
+              <a:ext uri="{FF2B5EF4-FFF2-40B4-BE49-F238E27FC236}">
+                <a16:creationId xmlns:a16="http://schemas.microsoft.com/office/drawing/2014/main" id="{9EB7D186-F60D-CC46-8FDD-BD250283CBB1}"/>
+              </a:ext>
+            </a:extLst>
+          </p:cNvPr>
+          <p:cNvPicPr>
+            <a:picLocks noChangeAspect="1" noChangeArrowheads="1"/>
+          </p:cNvPicPr>
+          <p:nvPr/>
+        </p:nvPicPr>
+        <p:blipFill>
+          <a:blip r:embed="rId4">
+            <a:extLst>
+              <a:ext uri="{28A0092B-C50C-407E-A947-70E740481C1C}">
+                <a14:useLocalDpi xmlns:a14="http://schemas.microsoft.com/office/drawing/2010/main" val="0"/>
+              </a:ext>
+            </a:extLst>
+          </a:blip>
+          <a:srcRect/>
+          <a:stretch>
+            <a:fillRect/>
+          </a:stretch>
+        </p:blipFill>
+        <p:spPr bwMode="auto">
+          <a:xfrm>
+            <a:off x="10778771" y="6104958"/>
+            <a:ext cx="1383137" cy="726147"/>
+          </a:xfrm>
+          <a:prstGeom prst="rect">
+            <a:avLst/>
+          </a:prstGeom>
+          <a:noFill/>
+          <a:extLst>
+            <a:ext uri="{909E8E84-426E-40DD-AFC4-6F175D3DCCD1}">
+              <a14:hiddenFill xmlns:a14="http://schemas.microsoft.com/office/drawing/2010/main">
+                <a:solidFill>
+                  <a:srgbClr val="FFFFFF"/>
+                </a:solidFill>
+              </a14:hiddenFill>
+            </a:ext>
+          </a:extLst>
+        </p:spPr>
+      </p:pic>
     </p:spTree>
     <p:extLst>
       <p:ext uri="{BB962C8B-B14F-4D97-AF65-F5344CB8AC3E}">
@@ -6827,6 +7271,53 @@
           </a:p>
         </p:txBody>
       </p:sp>
+      <p:pic>
+        <p:nvPicPr>
+          <p:cNvPr id="12" name="Picture 2" descr="Home | FritoLay">
+            <a:extLst>
+              <a:ext uri="{FF2B5EF4-FFF2-40B4-BE49-F238E27FC236}">
+                <a16:creationId xmlns:a16="http://schemas.microsoft.com/office/drawing/2014/main" id="{7F1655C9-DC6C-6D40-9B48-E3FC37423FD9}"/>
+              </a:ext>
+            </a:extLst>
+          </p:cNvPr>
+          <p:cNvPicPr>
+            <a:picLocks noChangeAspect="1" noChangeArrowheads="1"/>
+          </p:cNvPicPr>
+          <p:nvPr/>
+        </p:nvPicPr>
+        <p:blipFill>
+          <a:blip r:embed="rId3">
+            <a:extLst>
+              <a:ext uri="{28A0092B-C50C-407E-A947-70E740481C1C}">
+                <a14:useLocalDpi xmlns:a14="http://schemas.microsoft.com/office/drawing/2010/main" val="0"/>
+              </a:ext>
+            </a:extLst>
+          </a:blip>
+          <a:srcRect/>
+          <a:stretch>
+            <a:fillRect/>
+          </a:stretch>
+        </p:blipFill>
+        <p:spPr bwMode="auto">
+          <a:xfrm>
+            <a:off x="10778771" y="6104958"/>
+            <a:ext cx="1383137" cy="726147"/>
+          </a:xfrm>
+          <a:prstGeom prst="rect">
+            <a:avLst/>
+          </a:prstGeom>
+          <a:noFill/>
+          <a:extLst>
+            <a:ext uri="{909E8E84-426E-40DD-AFC4-6F175D3DCCD1}">
+              <a14:hiddenFill xmlns:a14="http://schemas.microsoft.com/office/drawing/2010/main">
+                <a:solidFill>
+                  <a:srgbClr val="FFFFFF"/>
+                </a:solidFill>
+              </a14:hiddenFill>
+            </a:ext>
+          </a:extLst>
+        </p:spPr>
+      </p:pic>
     </p:spTree>
     <p:extLst>
       <p:ext uri="{BB962C8B-B14F-4D97-AF65-F5344CB8AC3E}">
@@ -7293,6 +7784,53 @@
           <a:prstGeom prst="rect">
             <a:avLst/>
           </a:prstGeom>
+        </p:spPr>
+      </p:pic>
+      <p:pic>
+        <p:nvPicPr>
+          <p:cNvPr id="11" name="Picture 2" descr="Home | FritoLay">
+            <a:extLst>
+              <a:ext uri="{FF2B5EF4-FFF2-40B4-BE49-F238E27FC236}">
+                <a16:creationId xmlns:a16="http://schemas.microsoft.com/office/drawing/2014/main" id="{8D560293-C09D-404E-A66B-D598F9049A02}"/>
+              </a:ext>
+            </a:extLst>
+          </p:cNvPr>
+          <p:cNvPicPr>
+            <a:picLocks noChangeAspect="1" noChangeArrowheads="1"/>
+          </p:cNvPicPr>
+          <p:nvPr/>
+        </p:nvPicPr>
+        <p:blipFill>
+          <a:blip r:embed="rId3">
+            <a:extLst>
+              <a:ext uri="{28A0092B-C50C-407E-A947-70E740481C1C}">
+                <a14:useLocalDpi xmlns:a14="http://schemas.microsoft.com/office/drawing/2010/main" val="0"/>
+              </a:ext>
+            </a:extLst>
+          </a:blip>
+          <a:srcRect/>
+          <a:stretch>
+            <a:fillRect/>
+          </a:stretch>
+        </p:blipFill>
+        <p:spPr bwMode="auto">
+          <a:xfrm>
+            <a:off x="10778771" y="6104958"/>
+            <a:ext cx="1383137" cy="726147"/>
+          </a:xfrm>
+          <a:prstGeom prst="rect">
+            <a:avLst/>
+          </a:prstGeom>
+          <a:noFill/>
+          <a:extLst>
+            <a:ext uri="{909E8E84-426E-40DD-AFC4-6F175D3DCCD1}">
+              <a14:hiddenFill xmlns:a14="http://schemas.microsoft.com/office/drawing/2010/main">
+                <a:solidFill>
+                  <a:srgbClr val="FFFFFF"/>
+                </a:solidFill>
+              </a14:hiddenFill>
+            </a:ext>
+          </a:extLst>
         </p:spPr>
       </p:pic>
     </p:spTree>
@@ -8197,6 +8735,53 @@
           </a:p>
         </p:txBody>
       </p:sp>
+      <p:pic>
+        <p:nvPicPr>
+          <p:cNvPr id="14" name="Picture 2" descr="Home | FritoLay">
+            <a:extLst>
+              <a:ext uri="{FF2B5EF4-FFF2-40B4-BE49-F238E27FC236}">
+                <a16:creationId xmlns:a16="http://schemas.microsoft.com/office/drawing/2014/main" id="{1330F072-95D8-914D-B6FC-B0150385EC26}"/>
+              </a:ext>
+            </a:extLst>
+          </p:cNvPr>
+          <p:cNvPicPr>
+            <a:picLocks noChangeAspect="1" noChangeArrowheads="1"/>
+          </p:cNvPicPr>
+          <p:nvPr/>
+        </p:nvPicPr>
+        <p:blipFill>
+          <a:blip r:embed="rId2">
+            <a:extLst>
+              <a:ext uri="{28A0092B-C50C-407E-A947-70E740481C1C}">
+                <a14:useLocalDpi xmlns:a14="http://schemas.microsoft.com/office/drawing/2010/main" val="0"/>
+              </a:ext>
+            </a:extLst>
+          </a:blip>
+          <a:srcRect/>
+          <a:stretch>
+            <a:fillRect/>
+          </a:stretch>
+        </p:blipFill>
+        <p:spPr bwMode="auto">
+          <a:xfrm>
+            <a:off x="10778771" y="6104958"/>
+            <a:ext cx="1383137" cy="726147"/>
+          </a:xfrm>
+          <a:prstGeom prst="rect">
+            <a:avLst/>
+          </a:prstGeom>
+          <a:noFill/>
+          <a:extLst>
+            <a:ext uri="{909E8E84-426E-40DD-AFC4-6F175D3DCCD1}">
+              <a14:hiddenFill xmlns:a14="http://schemas.microsoft.com/office/drawing/2010/main">
+                <a:solidFill>
+                  <a:srgbClr val="FFFFFF"/>
+                </a:solidFill>
+              </a14:hiddenFill>
+            </a:ext>
+          </a:extLst>
+        </p:spPr>
+      </p:pic>
     </p:spTree>
     <p:extLst>
       <p:ext uri="{BB962C8B-B14F-4D97-AF65-F5344CB8AC3E}">
@@ -8636,6 +9221,53 @@
           </a:prstGeom>
         </p:spPr>
       </p:pic>
+      <p:pic>
+        <p:nvPicPr>
+          <p:cNvPr id="10" name="Picture 2" descr="Home | FritoLay">
+            <a:extLst>
+              <a:ext uri="{FF2B5EF4-FFF2-40B4-BE49-F238E27FC236}">
+                <a16:creationId xmlns:a16="http://schemas.microsoft.com/office/drawing/2014/main" id="{6B83B70A-686C-8A49-BFB2-BFFE4BBCDC08}"/>
+              </a:ext>
+            </a:extLst>
+          </p:cNvPr>
+          <p:cNvPicPr>
+            <a:picLocks noChangeAspect="1" noChangeArrowheads="1"/>
+          </p:cNvPicPr>
+          <p:nvPr/>
+        </p:nvPicPr>
+        <p:blipFill>
+          <a:blip r:embed="rId3">
+            <a:extLst>
+              <a:ext uri="{28A0092B-C50C-407E-A947-70E740481C1C}">
+                <a14:useLocalDpi xmlns:a14="http://schemas.microsoft.com/office/drawing/2010/main" val="0"/>
+              </a:ext>
+            </a:extLst>
+          </a:blip>
+          <a:srcRect/>
+          <a:stretch>
+            <a:fillRect/>
+          </a:stretch>
+        </p:blipFill>
+        <p:spPr bwMode="auto">
+          <a:xfrm>
+            <a:off x="10778771" y="6104958"/>
+            <a:ext cx="1383137" cy="726147"/>
+          </a:xfrm>
+          <a:prstGeom prst="rect">
+            <a:avLst/>
+          </a:prstGeom>
+          <a:noFill/>
+          <a:extLst>
+            <a:ext uri="{909E8E84-426E-40DD-AFC4-6F175D3DCCD1}">
+              <a14:hiddenFill xmlns:a14="http://schemas.microsoft.com/office/drawing/2010/main">
+                <a:solidFill>
+                  <a:srgbClr val="FFFFFF"/>
+                </a:solidFill>
+              </a14:hiddenFill>
+            </a:ext>
+          </a:extLst>
+        </p:spPr>
+      </p:pic>
     </p:spTree>
     <p:extLst>
       <p:ext uri="{BB962C8B-B14F-4D97-AF65-F5344CB8AC3E}">
@@ -8952,6 +9584,53 @@
           <a:prstGeom prst="rect">
             <a:avLst/>
           </a:prstGeom>
+        </p:spPr>
+      </p:pic>
+      <p:pic>
+        <p:nvPicPr>
+          <p:cNvPr id="10" name="Picture 2" descr="Home | FritoLay">
+            <a:extLst>
+              <a:ext uri="{FF2B5EF4-FFF2-40B4-BE49-F238E27FC236}">
+                <a16:creationId xmlns:a16="http://schemas.microsoft.com/office/drawing/2014/main" id="{21B9B82C-7C5C-7345-A49B-01CB1B67CCBB}"/>
+              </a:ext>
+            </a:extLst>
+          </p:cNvPr>
+          <p:cNvPicPr>
+            <a:picLocks noChangeAspect="1" noChangeArrowheads="1"/>
+          </p:cNvPicPr>
+          <p:nvPr/>
+        </p:nvPicPr>
+        <p:blipFill>
+          <a:blip r:embed="rId3">
+            <a:extLst>
+              <a:ext uri="{28A0092B-C50C-407E-A947-70E740481C1C}">
+                <a14:useLocalDpi xmlns:a14="http://schemas.microsoft.com/office/drawing/2010/main" val="0"/>
+              </a:ext>
+            </a:extLst>
+          </a:blip>
+          <a:srcRect/>
+          <a:stretch>
+            <a:fillRect/>
+          </a:stretch>
+        </p:blipFill>
+        <p:spPr bwMode="auto">
+          <a:xfrm>
+            <a:off x="10778771" y="6104958"/>
+            <a:ext cx="1383137" cy="726147"/>
+          </a:xfrm>
+          <a:prstGeom prst="rect">
+            <a:avLst/>
+          </a:prstGeom>
+          <a:noFill/>
+          <a:extLst>
+            <a:ext uri="{909E8E84-426E-40DD-AFC4-6F175D3DCCD1}">
+              <a14:hiddenFill xmlns:a14="http://schemas.microsoft.com/office/drawing/2010/main">
+                <a:solidFill>
+                  <a:srgbClr val="FFFFFF"/>
+                </a:solidFill>
+              </a14:hiddenFill>
+            </a:ext>
+          </a:extLst>
         </p:spPr>
       </p:pic>
     </p:spTree>
@@ -9330,6 +10009,53 @@
           <a:prstGeom prst="rect">
             <a:avLst/>
           </a:prstGeom>
+        </p:spPr>
+      </p:pic>
+      <p:pic>
+        <p:nvPicPr>
+          <p:cNvPr id="11" name="Picture 2" descr="Home | FritoLay">
+            <a:extLst>
+              <a:ext uri="{FF2B5EF4-FFF2-40B4-BE49-F238E27FC236}">
+                <a16:creationId xmlns:a16="http://schemas.microsoft.com/office/drawing/2014/main" id="{D6890BB7-18F3-9E41-92E0-E8F5A5DDFC01}"/>
+              </a:ext>
+            </a:extLst>
+          </p:cNvPr>
+          <p:cNvPicPr>
+            <a:picLocks noChangeAspect="1" noChangeArrowheads="1"/>
+          </p:cNvPicPr>
+          <p:nvPr/>
+        </p:nvPicPr>
+        <p:blipFill>
+          <a:blip r:embed="rId5">
+            <a:extLst>
+              <a:ext uri="{28A0092B-C50C-407E-A947-70E740481C1C}">
+                <a14:useLocalDpi xmlns:a14="http://schemas.microsoft.com/office/drawing/2010/main" val="0"/>
+              </a:ext>
+            </a:extLst>
+          </a:blip>
+          <a:srcRect/>
+          <a:stretch>
+            <a:fillRect/>
+          </a:stretch>
+        </p:blipFill>
+        <p:spPr bwMode="auto">
+          <a:xfrm>
+            <a:off x="10778771" y="6104958"/>
+            <a:ext cx="1383137" cy="726147"/>
+          </a:xfrm>
+          <a:prstGeom prst="rect">
+            <a:avLst/>
+          </a:prstGeom>
+          <a:noFill/>
+          <a:extLst>
+            <a:ext uri="{909E8E84-426E-40DD-AFC4-6F175D3DCCD1}">
+              <a14:hiddenFill xmlns:a14="http://schemas.microsoft.com/office/drawing/2010/main">
+                <a:solidFill>
+                  <a:srgbClr val="FFFFFF"/>
+                </a:solidFill>
+              </a14:hiddenFill>
+            </a:ext>
+          </a:extLst>
         </p:spPr>
       </p:pic>
     </p:spTree>
@@ -10562,6 +11288,53 @@
           </a:p>
         </p:txBody>
       </p:sp>
+      <p:pic>
+        <p:nvPicPr>
+          <p:cNvPr id="14" name="Picture 2" descr="Home | FritoLay">
+            <a:extLst>
+              <a:ext uri="{FF2B5EF4-FFF2-40B4-BE49-F238E27FC236}">
+                <a16:creationId xmlns:a16="http://schemas.microsoft.com/office/drawing/2014/main" id="{7E1FF387-EA70-584B-B442-F66E590D9C1A}"/>
+              </a:ext>
+            </a:extLst>
+          </p:cNvPr>
+          <p:cNvPicPr>
+            <a:picLocks noChangeAspect="1" noChangeArrowheads="1"/>
+          </p:cNvPicPr>
+          <p:nvPr/>
+        </p:nvPicPr>
+        <p:blipFill>
+          <a:blip r:embed="rId2">
+            <a:extLst>
+              <a:ext uri="{28A0092B-C50C-407E-A947-70E740481C1C}">
+                <a14:useLocalDpi xmlns:a14="http://schemas.microsoft.com/office/drawing/2010/main" val="0"/>
+              </a:ext>
+            </a:extLst>
+          </a:blip>
+          <a:srcRect/>
+          <a:stretch>
+            <a:fillRect/>
+          </a:stretch>
+        </p:blipFill>
+        <p:spPr bwMode="auto">
+          <a:xfrm>
+            <a:off x="10778771" y="6104958"/>
+            <a:ext cx="1383137" cy="726147"/>
+          </a:xfrm>
+          <a:prstGeom prst="rect">
+            <a:avLst/>
+          </a:prstGeom>
+          <a:noFill/>
+          <a:extLst>
+            <a:ext uri="{909E8E84-426E-40DD-AFC4-6F175D3DCCD1}">
+              <a14:hiddenFill xmlns:a14="http://schemas.microsoft.com/office/drawing/2010/main">
+                <a:solidFill>
+                  <a:srgbClr val="FFFFFF"/>
+                </a:solidFill>
+              </a14:hiddenFill>
+            </a:ext>
+          </a:extLst>
+        </p:spPr>
+      </p:pic>
     </p:spTree>
     <p:extLst>
       <p:ext uri="{BB962C8B-B14F-4D97-AF65-F5344CB8AC3E}">
@@ -11091,6 +11864,53 @@
           </a:prstGeom>
         </p:spPr>
       </p:pic>
+      <p:pic>
+        <p:nvPicPr>
+          <p:cNvPr id="10" name="Picture 2" descr="Home | FritoLay">
+            <a:extLst>
+              <a:ext uri="{FF2B5EF4-FFF2-40B4-BE49-F238E27FC236}">
+                <a16:creationId xmlns:a16="http://schemas.microsoft.com/office/drawing/2014/main" id="{262D3DCA-6286-B349-8AAD-F55C5404E300}"/>
+              </a:ext>
+            </a:extLst>
+          </p:cNvPr>
+          <p:cNvPicPr>
+            <a:picLocks noChangeAspect="1" noChangeArrowheads="1"/>
+          </p:cNvPicPr>
+          <p:nvPr/>
+        </p:nvPicPr>
+        <p:blipFill>
+          <a:blip r:embed="rId3">
+            <a:extLst>
+              <a:ext uri="{28A0092B-C50C-407E-A947-70E740481C1C}">
+                <a14:useLocalDpi xmlns:a14="http://schemas.microsoft.com/office/drawing/2010/main" val="0"/>
+              </a:ext>
+            </a:extLst>
+          </a:blip>
+          <a:srcRect/>
+          <a:stretch>
+            <a:fillRect/>
+          </a:stretch>
+        </p:blipFill>
+        <p:spPr bwMode="auto">
+          <a:xfrm>
+            <a:off x="10778771" y="6104958"/>
+            <a:ext cx="1383137" cy="726147"/>
+          </a:xfrm>
+          <a:prstGeom prst="rect">
+            <a:avLst/>
+          </a:prstGeom>
+          <a:noFill/>
+          <a:extLst>
+            <a:ext uri="{909E8E84-426E-40DD-AFC4-6F175D3DCCD1}">
+              <a14:hiddenFill xmlns:a14="http://schemas.microsoft.com/office/drawing/2010/main">
+                <a:solidFill>
+                  <a:srgbClr val="FFFFFF"/>
+                </a:solidFill>
+              </a14:hiddenFill>
+            </a:ext>
+          </a:extLst>
+        </p:spPr>
+      </p:pic>
     </p:spTree>
     <p:extLst>
       <p:ext uri="{BB962C8B-B14F-4D97-AF65-F5344CB8AC3E}">
@@ -11429,15 +12249,6 @@
             </a:endParaRPr>
           </a:p>
           <a:p>
-            <a:pPr marL="457200" lvl="1" indent="0">
-              <a:buNone/>
-            </a:pPr>
-            <a:endParaRPr lang="en-US" sz="2400" dirty="0">
-              <a:latin typeface="Calibri" panose="020F0502020204030204" pitchFamily="34" charset="0"/>
-              <a:cs typeface="Calibri" panose="020F0502020204030204" pitchFamily="34" charset="0"/>
-            </a:endParaRPr>
-          </a:p>
-          <a:p>
             <a:r>
               <a:rPr lang="en-US" sz="3200" dirty="0">
                 <a:latin typeface="Calibri" panose="020F0502020204030204" pitchFamily="34" charset="0"/>
@@ -11453,21 +12264,7 @@
                 <a:latin typeface="Calibri" panose="020F0502020204030204" pitchFamily="34" charset="0"/>
                 <a:cs typeface="Calibri" panose="020F0502020204030204" pitchFamily="34" charset="0"/>
               </a:rPr>
-              <a:t>Conduct an analysis for </a:t>
-            </a:r>
-            <a:r>
-              <a:rPr lang="en-US" sz="2400" dirty="0" err="1">
-                <a:latin typeface="Calibri" panose="020F0502020204030204" pitchFamily="34" charset="0"/>
-                <a:cs typeface="Calibri" panose="020F0502020204030204" pitchFamily="34" charset="0"/>
-              </a:rPr>
-              <a:t>DDSAnalytics</a:t>
-            </a:r>
-            <a:r>
-              <a:rPr lang="en-US" sz="2400" dirty="0">
-                <a:latin typeface="Calibri" panose="020F0502020204030204" pitchFamily="34" charset="0"/>
-                <a:cs typeface="Calibri" panose="020F0502020204030204" pitchFamily="34" charset="0"/>
-              </a:rPr>
-              <a:t> on its existing employee data to predict employee turnover to help gain a competitive edge over its competition.</a:t>
+              <a:t>Conduct an analysis for Frito Lay on its existing employee data to predict employee turnover to help gain a competitive edge over its competition.</a:t>
             </a:r>
           </a:p>
           <a:p>
@@ -11479,6 +12276,53 @@
           </a:p>
         </p:txBody>
       </p:sp>
+      <p:pic>
+        <p:nvPicPr>
+          <p:cNvPr id="1026" name="Picture 2" descr="Home | FritoLay">
+            <a:extLst>
+              <a:ext uri="{FF2B5EF4-FFF2-40B4-BE49-F238E27FC236}">
+                <a16:creationId xmlns:a16="http://schemas.microsoft.com/office/drawing/2014/main" id="{DA03A7AE-BDED-774B-B9D7-793DC8640B77}"/>
+              </a:ext>
+            </a:extLst>
+          </p:cNvPr>
+          <p:cNvPicPr>
+            <a:picLocks noChangeAspect="1" noChangeArrowheads="1"/>
+          </p:cNvPicPr>
+          <p:nvPr/>
+        </p:nvPicPr>
+        <p:blipFill>
+          <a:blip r:embed="rId2">
+            <a:extLst>
+              <a:ext uri="{28A0092B-C50C-407E-A947-70E740481C1C}">
+                <a14:useLocalDpi xmlns:a14="http://schemas.microsoft.com/office/drawing/2010/main" val="0"/>
+              </a:ext>
+            </a:extLst>
+          </a:blip>
+          <a:srcRect/>
+          <a:stretch>
+            <a:fillRect/>
+          </a:stretch>
+        </p:blipFill>
+        <p:spPr bwMode="auto">
+          <a:xfrm>
+            <a:off x="10778771" y="6104958"/>
+            <a:ext cx="1383137" cy="726147"/>
+          </a:xfrm>
+          <a:prstGeom prst="rect">
+            <a:avLst/>
+          </a:prstGeom>
+          <a:noFill/>
+          <a:extLst>
+            <a:ext uri="{909E8E84-426E-40DD-AFC4-6F175D3DCCD1}">
+              <a14:hiddenFill xmlns:a14="http://schemas.microsoft.com/office/drawing/2010/main">
+                <a:solidFill>
+                  <a:srgbClr val="FFFFFF"/>
+                </a:solidFill>
+              </a14:hiddenFill>
+            </a:ext>
+          </a:extLst>
+        </p:spPr>
+      </p:pic>
     </p:spTree>
     <p:extLst>
       <p:ext uri="{BB962C8B-B14F-4D97-AF65-F5344CB8AC3E}">
@@ -11629,7 +12473,7 @@
                                         <p:tgtEl>
                                           <p:spTgt spid="11">
                                             <p:txEl>
-                                              <p:pRg st="4" end="4"/>
+                                              <p:pRg st="3" end="3"/>
                                             </p:txEl>
                                           </p:spTgt>
                                         </p:tgtEl>
@@ -11647,7 +12491,7 @@
                                         <p:tgtEl>
                                           <p:spTgt spid="11">
                                             <p:txEl>
-                                              <p:pRg st="4" end="4"/>
+                                              <p:pRg st="3" end="3"/>
                                             </p:txEl>
                                           </p:spTgt>
                                         </p:tgtEl>
@@ -11672,7 +12516,7 @@
                                         <p:tgtEl>
                                           <p:spTgt spid="11">
                                             <p:txEl>
-                                              <p:pRg st="5" end="5"/>
+                                              <p:pRg st="4" end="4"/>
                                             </p:txEl>
                                           </p:spTgt>
                                         </p:tgtEl>
@@ -11690,7 +12534,7 @@
                                         <p:tgtEl>
                                           <p:spTgt spid="11">
                                             <p:txEl>
-                                              <p:pRg st="5" end="5"/>
+                                              <p:pRg st="4" end="4"/>
                                             </p:txEl>
                                           </p:spTgt>
                                         </p:tgtEl>
@@ -12107,6 +12951,53 @@
           </a:p>
         </p:txBody>
       </p:sp>
+      <p:pic>
+        <p:nvPicPr>
+          <p:cNvPr id="11" name="Picture 2" descr="Home | FritoLay">
+            <a:extLst>
+              <a:ext uri="{FF2B5EF4-FFF2-40B4-BE49-F238E27FC236}">
+                <a16:creationId xmlns:a16="http://schemas.microsoft.com/office/drawing/2014/main" id="{AD633D6F-CB9D-7548-BDF2-799AA2B9EDDF}"/>
+              </a:ext>
+            </a:extLst>
+          </p:cNvPr>
+          <p:cNvPicPr>
+            <a:picLocks noChangeAspect="1" noChangeArrowheads="1"/>
+          </p:cNvPicPr>
+          <p:nvPr/>
+        </p:nvPicPr>
+        <p:blipFill>
+          <a:blip r:embed="rId2">
+            <a:extLst>
+              <a:ext uri="{28A0092B-C50C-407E-A947-70E740481C1C}">
+                <a14:useLocalDpi xmlns:a14="http://schemas.microsoft.com/office/drawing/2010/main" val="0"/>
+              </a:ext>
+            </a:extLst>
+          </a:blip>
+          <a:srcRect/>
+          <a:stretch>
+            <a:fillRect/>
+          </a:stretch>
+        </p:blipFill>
+        <p:spPr bwMode="auto">
+          <a:xfrm>
+            <a:off x="10778771" y="6104958"/>
+            <a:ext cx="1383137" cy="726147"/>
+          </a:xfrm>
+          <a:prstGeom prst="rect">
+            <a:avLst/>
+          </a:prstGeom>
+          <a:noFill/>
+          <a:extLst>
+            <a:ext uri="{909E8E84-426E-40DD-AFC4-6F175D3DCCD1}">
+              <a14:hiddenFill xmlns:a14="http://schemas.microsoft.com/office/drawing/2010/main">
+                <a:solidFill>
+                  <a:srgbClr val="FFFFFF"/>
+                </a:solidFill>
+              </a14:hiddenFill>
+            </a:ext>
+          </a:extLst>
+        </p:spPr>
+      </p:pic>
     </p:spTree>
     <p:extLst>
       <p:ext uri="{BB962C8B-B14F-4D97-AF65-F5344CB8AC3E}">
@@ -12650,6 +13541,53 @@
           </a:p>
         </p:txBody>
       </p:sp>
+      <p:pic>
+        <p:nvPicPr>
+          <p:cNvPr id="11" name="Picture 2" descr="Home | FritoLay">
+            <a:extLst>
+              <a:ext uri="{FF2B5EF4-FFF2-40B4-BE49-F238E27FC236}">
+                <a16:creationId xmlns:a16="http://schemas.microsoft.com/office/drawing/2014/main" id="{071CEEB8-AB9A-3842-B0C4-D437241205AB}"/>
+              </a:ext>
+            </a:extLst>
+          </p:cNvPr>
+          <p:cNvPicPr>
+            <a:picLocks noChangeAspect="1" noChangeArrowheads="1"/>
+          </p:cNvPicPr>
+          <p:nvPr/>
+        </p:nvPicPr>
+        <p:blipFill>
+          <a:blip r:embed="rId2">
+            <a:extLst>
+              <a:ext uri="{28A0092B-C50C-407E-A947-70E740481C1C}">
+                <a14:useLocalDpi xmlns:a14="http://schemas.microsoft.com/office/drawing/2010/main" val="0"/>
+              </a:ext>
+            </a:extLst>
+          </a:blip>
+          <a:srcRect/>
+          <a:stretch>
+            <a:fillRect/>
+          </a:stretch>
+        </p:blipFill>
+        <p:spPr bwMode="auto">
+          <a:xfrm>
+            <a:off x="10778771" y="6104958"/>
+            <a:ext cx="1383137" cy="726147"/>
+          </a:xfrm>
+          <a:prstGeom prst="rect">
+            <a:avLst/>
+          </a:prstGeom>
+          <a:noFill/>
+          <a:extLst>
+            <a:ext uri="{909E8E84-426E-40DD-AFC4-6F175D3DCCD1}">
+              <a14:hiddenFill xmlns:a14="http://schemas.microsoft.com/office/drawing/2010/main">
+                <a:solidFill>
+                  <a:srgbClr val="FFFFFF"/>
+                </a:solidFill>
+              </a14:hiddenFill>
+            </a:ext>
+          </a:extLst>
+        </p:spPr>
+      </p:pic>
     </p:spTree>
     <p:extLst>
       <p:ext uri="{BB962C8B-B14F-4D97-AF65-F5344CB8AC3E}">
@@ -13047,8 +13985,8 @@
         </p:nvSpPr>
         <p:spPr>
           <a:xfrm>
-            <a:off x="1379787" y="1670241"/>
-            <a:ext cx="9486901" cy="4324272"/>
+            <a:off x="1352549" y="1123007"/>
+            <a:ext cx="9486901" cy="3627900"/>
           </a:xfrm>
         </p:spPr>
         <p:txBody>
@@ -13173,6 +14111,53 @@
           </a:p>
         </p:txBody>
       </p:sp>
+      <p:pic>
+        <p:nvPicPr>
+          <p:cNvPr id="11" name="Picture 2" descr="Home | FritoLay">
+            <a:extLst>
+              <a:ext uri="{FF2B5EF4-FFF2-40B4-BE49-F238E27FC236}">
+                <a16:creationId xmlns:a16="http://schemas.microsoft.com/office/drawing/2014/main" id="{985B7B24-6156-8C41-8D43-BF0F722BCABF}"/>
+              </a:ext>
+            </a:extLst>
+          </p:cNvPr>
+          <p:cNvPicPr>
+            <a:picLocks noChangeAspect="1" noChangeArrowheads="1"/>
+          </p:cNvPicPr>
+          <p:nvPr/>
+        </p:nvPicPr>
+        <p:blipFill>
+          <a:blip r:embed="rId4">
+            <a:extLst>
+              <a:ext uri="{28A0092B-C50C-407E-A947-70E740481C1C}">
+                <a14:useLocalDpi xmlns:a14="http://schemas.microsoft.com/office/drawing/2010/main" val="0"/>
+              </a:ext>
+            </a:extLst>
+          </a:blip>
+          <a:srcRect/>
+          <a:stretch>
+            <a:fillRect/>
+          </a:stretch>
+        </p:blipFill>
+        <p:spPr bwMode="auto">
+          <a:xfrm>
+            <a:off x="10778771" y="6104958"/>
+            <a:ext cx="1383137" cy="726147"/>
+          </a:xfrm>
+          <a:prstGeom prst="rect">
+            <a:avLst/>
+          </a:prstGeom>
+          <a:noFill/>
+          <a:extLst>
+            <a:ext uri="{909E8E84-426E-40DD-AFC4-6F175D3DCCD1}">
+              <a14:hiddenFill xmlns:a14="http://schemas.microsoft.com/office/drawing/2010/main">
+                <a:solidFill>
+                  <a:srgbClr val="FFFFFF"/>
+                </a:solidFill>
+              </a14:hiddenFill>
+            </a:ext>
+          </a:extLst>
+        </p:spPr>
+      </p:pic>
     </p:spTree>
     <p:extLst>
       <p:ext uri="{BB962C8B-B14F-4D97-AF65-F5344CB8AC3E}">
@@ -13517,6 +14502,53 @@
           </a:prstGeom>
         </p:spPr>
       </p:pic>
+      <p:pic>
+        <p:nvPicPr>
+          <p:cNvPr id="11" name="Picture 2" descr="Home | FritoLay">
+            <a:extLst>
+              <a:ext uri="{FF2B5EF4-FFF2-40B4-BE49-F238E27FC236}">
+                <a16:creationId xmlns:a16="http://schemas.microsoft.com/office/drawing/2014/main" id="{4286BD11-4EFB-AE4E-AC0A-313C0C69E3F0}"/>
+              </a:ext>
+            </a:extLst>
+          </p:cNvPr>
+          <p:cNvPicPr>
+            <a:picLocks noChangeAspect="1" noChangeArrowheads="1"/>
+          </p:cNvPicPr>
+          <p:nvPr/>
+        </p:nvPicPr>
+        <p:blipFill>
+          <a:blip r:embed="rId3">
+            <a:extLst>
+              <a:ext uri="{28A0092B-C50C-407E-A947-70E740481C1C}">
+                <a14:useLocalDpi xmlns:a14="http://schemas.microsoft.com/office/drawing/2010/main" val="0"/>
+              </a:ext>
+            </a:extLst>
+          </a:blip>
+          <a:srcRect/>
+          <a:stretch>
+            <a:fillRect/>
+          </a:stretch>
+        </p:blipFill>
+        <p:spPr bwMode="auto">
+          <a:xfrm>
+            <a:off x="10778771" y="6104958"/>
+            <a:ext cx="1383137" cy="726147"/>
+          </a:xfrm>
+          <a:prstGeom prst="rect">
+            <a:avLst/>
+          </a:prstGeom>
+          <a:noFill/>
+          <a:extLst>
+            <a:ext uri="{909E8E84-426E-40DD-AFC4-6F175D3DCCD1}">
+              <a14:hiddenFill xmlns:a14="http://schemas.microsoft.com/office/drawing/2010/main">
+                <a:solidFill>
+                  <a:srgbClr val="FFFFFF"/>
+                </a:solidFill>
+              </a14:hiddenFill>
+            </a:ext>
+          </a:extLst>
+        </p:spPr>
+      </p:pic>
     </p:spTree>
     <p:extLst>
       <p:ext uri="{BB962C8B-B14F-4D97-AF65-F5344CB8AC3E}">
@@ -13829,6 +14861,53 @@
           <a:prstGeom prst="rect">
             <a:avLst/>
           </a:prstGeom>
+        </p:spPr>
+      </p:pic>
+      <p:pic>
+        <p:nvPicPr>
+          <p:cNvPr id="9" name="Picture 2" descr="Home | FritoLay">
+            <a:extLst>
+              <a:ext uri="{FF2B5EF4-FFF2-40B4-BE49-F238E27FC236}">
+                <a16:creationId xmlns:a16="http://schemas.microsoft.com/office/drawing/2014/main" id="{3D34AB25-59E7-5742-8C52-1681124729AD}"/>
+              </a:ext>
+            </a:extLst>
+          </p:cNvPr>
+          <p:cNvPicPr>
+            <a:picLocks noChangeAspect="1" noChangeArrowheads="1"/>
+          </p:cNvPicPr>
+          <p:nvPr/>
+        </p:nvPicPr>
+        <p:blipFill>
+          <a:blip r:embed="rId3">
+            <a:extLst>
+              <a:ext uri="{28A0092B-C50C-407E-A947-70E740481C1C}">
+                <a14:useLocalDpi xmlns:a14="http://schemas.microsoft.com/office/drawing/2010/main" val="0"/>
+              </a:ext>
+            </a:extLst>
+          </a:blip>
+          <a:srcRect/>
+          <a:stretch>
+            <a:fillRect/>
+          </a:stretch>
+        </p:blipFill>
+        <p:spPr bwMode="auto">
+          <a:xfrm>
+            <a:off x="10778771" y="6104958"/>
+            <a:ext cx="1383137" cy="726147"/>
+          </a:xfrm>
+          <a:prstGeom prst="rect">
+            <a:avLst/>
+          </a:prstGeom>
+          <a:noFill/>
+          <a:extLst>
+            <a:ext uri="{909E8E84-426E-40DD-AFC4-6F175D3DCCD1}">
+              <a14:hiddenFill xmlns:a14="http://schemas.microsoft.com/office/drawing/2010/main">
+                <a:solidFill>
+                  <a:srgbClr val="FFFFFF"/>
+                </a:solidFill>
+              </a14:hiddenFill>
+            </a:ext>
+          </a:extLst>
         </p:spPr>
       </p:pic>
     </p:spTree>
@@ -14143,6 +15222,53 @@
           <a:prstGeom prst="rect">
             <a:avLst/>
           </a:prstGeom>
+        </p:spPr>
+      </p:pic>
+      <p:pic>
+        <p:nvPicPr>
+          <p:cNvPr id="9" name="Picture 2" descr="Home | FritoLay">
+            <a:extLst>
+              <a:ext uri="{FF2B5EF4-FFF2-40B4-BE49-F238E27FC236}">
+                <a16:creationId xmlns:a16="http://schemas.microsoft.com/office/drawing/2014/main" id="{42C89B9E-0AE2-D94C-8282-B03641D7F9EB}"/>
+              </a:ext>
+            </a:extLst>
+          </p:cNvPr>
+          <p:cNvPicPr>
+            <a:picLocks noChangeAspect="1" noChangeArrowheads="1"/>
+          </p:cNvPicPr>
+          <p:nvPr/>
+        </p:nvPicPr>
+        <p:blipFill>
+          <a:blip r:embed="rId3">
+            <a:extLst>
+              <a:ext uri="{28A0092B-C50C-407E-A947-70E740481C1C}">
+                <a14:useLocalDpi xmlns:a14="http://schemas.microsoft.com/office/drawing/2010/main" val="0"/>
+              </a:ext>
+            </a:extLst>
+          </a:blip>
+          <a:srcRect/>
+          <a:stretch>
+            <a:fillRect/>
+          </a:stretch>
+        </p:blipFill>
+        <p:spPr bwMode="auto">
+          <a:xfrm>
+            <a:off x="10778771" y="6104958"/>
+            <a:ext cx="1383137" cy="726147"/>
+          </a:xfrm>
+          <a:prstGeom prst="rect">
+            <a:avLst/>
+          </a:prstGeom>
+          <a:noFill/>
+          <a:extLst>
+            <a:ext uri="{909E8E84-426E-40DD-AFC4-6F175D3DCCD1}">
+              <a14:hiddenFill xmlns:a14="http://schemas.microsoft.com/office/drawing/2010/main">
+                <a:solidFill>
+                  <a:srgbClr val="FFFFFF"/>
+                </a:solidFill>
+              </a14:hiddenFill>
+            </a:ext>
+          </a:extLst>
         </p:spPr>
       </p:pic>
     </p:spTree>
@@ -14487,6 +15613,53 @@
           <a:prstGeom prst="rect">
             <a:avLst/>
           </a:prstGeom>
+        </p:spPr>
+      </p:pic>
+      <p:pic>
+        <p:nvPicPr>
+          <p:cNvPr id="9" name="Picture 2" descr="Home | FritoLay">
+            <a:extLst>
+              <a:ext uri="{FF2B5EF4-FFF2-40B4-BE49-F238E27FC236}">
+                <a16:creationId xmlns:a16="http://schemas.microsoft.com/office/drawing/2014/main" id="{C11DDC88-5DF0-B849-9C52-F9DC2563D691}"/>
+              </a:ext>
+            </a:extLst>
+          </p:cNvPr>
+          <p:cNvPicPr>
+            <a:picLocks noChangeAspect="1" noChangeArrowheads="1"/>
+          </p:cNvPicPr>
+          <p:nvPr/>
+        </p:nvPicPr>
+        <p:blipFill>
+          <a:blip r:embed="rId4">
+            <a:extLst>
+              <a:ext uri="{28A0092B-C50C-407E-A947-70E740481C1C}">
+                <a14:useLocalDpi xmlns:a14="http://schemas.microsoft.com/office/drawing/2010/main" val="0"/>
+              </a:ext>
+            </a:extLst>
+          </a:blip>
+          <a:srcRect/>
+          <a:stretch>
+            <a:fillRect/>
+          </a:stretch>
+        </p:blipFill>
+        <p:spPr bwMode="auto">
+          <a:xfrm>
+            <a:off x="10778771" y="6104958"/>
+            <a:ext cx="1383137" cy="726147"/>
+          </a:xfrm>
+          <a:prstGeom prst="rect">
+            <a:avLst/>
+          </a:prstGeom>
+          <a:noFill/>
+          <a:extLst>
+            <a:ext uri="{909E8E84-426E-40DD-AFC4-6F175D3DCCD1}">
+              <a14:hiddenFill xmlns:a14="http://schemas.microsoft.com/office/drawing/2010/main">
+                <a:solidFill>
+                  <a:srgbClr val="FFFFFF"/>
+                </a:solidFill>
+              </a14:hiddenFill>
+            </a:ext>
+          </a:extLst>
         </p:spPr>
       </p:pic>
     </p:spTree>
@@ -14886,6 +16059,53 @@
           </a:prstGeom>
         </p:spPr>
       </p:pic>
+      <p:pic>
+        <p:nvPicPr>
+          <p:cNvPr id="9" name="Picture 2" descr="Home | FritoLay">
+            <a:extLst>
+              <a:ext uri="{FF2B5EF4-FFF2-40B4-BE49-F238E27FC236}">
+                <a16:creationId xmlns:a16="http://schemas.microsoft.com/office/drawing/2014/main" id="{ABEA6125-B2CB-E04C-B5A2-58A456F6BCBC}"/>
+              </a:ext>
+            </a:extLst>
+          </p:cNvPr>
+          <p:cNvPicPr>
+            <a:picLocks noChangeAspect="1" noChangeArrowheads="1"/>
+          </p:cNvPicPr>
+          <p:nvPr/>
+        </p:nvPicPr>
+        <p:blipFill>
+          <a:blip r:embed="rId3">
+            <a:extLst>
+              <a:ext uri="{28A0092B-C50C-407E-A947-70E740481C1C}">
+                <a14:useLocalDpi xmlns:a14="http://schemas.microsoft.com/office/drawing/2010/main" val="0"/>
+              </a:ext>
+            </a:extLst>
+          </a:blip>
+          <a:srcRect/>
+          <a:stretch>
+            <a:fillRect/>
+          </a:stretch>
+        </p:blipFill>
+        <p:spPr bwMode="auto">
+          <a:xfrm>
+            <a:off x="10778771" y="6104958"/>
+            <a:ext cx="1383137" cy="726147"/>
+          </a:xfrm>
+          <a:prstGeom prst="rect">
+            <a:avLst/>
+          </a:prstGeom>
+          <a:noFill/>
+          <a:extLst>
+            <a:ext uri="{909E8E84-426E-40DD-AFC4-6F175D3DCCD1}">
+              <a14:hiddenFill xmlns:a14="http://schemas.microsoft.com/office/drawing/2010/main">
+                <a:solidFill>
+                  <a:srgbClr val="FFFFFF"/>
+                </a:solidFill>
+              </a14:hiddenFill>
+            </a:ext>
+          </a:extLst>
+        </p:spPr>
+      </p:pic>
     </p:spTree>
     <p:extLst>
       <p:ext uri="{BB962C8B-B14F-4D97-AF65-F5344CB8AC3E}">
@@ -15380,6 +16600,53 @@
           </a:p>
         </p:txBody>
       </p:sp>
+      <p:pic>
+        <p:nvPicPr>
+          <p:cNvPr id="12" name="Picture 2" descr="Home | FritoLay">
+            <a:extLst>
+              <a:ext uri="{FF2B5EF4-FFF2-40B4-BE49-F238E27FC236}">
+                <a16:creationId xmlns:a16="http://schemas.microsoft.com/office/drawing/2014/main" id="{B20CBF8D-06CF-4549-BD21-C4E49B147EC5}"/>
+              </a:ext>
+            </a:extLst>
+          </p:cNvPr>
+          <p:cNvPicPr>
+            <a:picLocks noChangeAspect="1" noChangeArrowheads="1"/>
+          </p:cNvPicPr>
+          <p:nvPr/>
+        </p:nvPicPr>
+        <p:blipFill>
+          <a:blip r:embed="rId5">
+            <a:extLst>
+              <a:ext uri="{28A0092B-C50C-407E-A947-70E740481C1C}">
+                <a14:useLocalDpi xmlns:a14="http://schemas.microsoft.com/office/drawing/2010/main" val="0"/>
+              </a:ext>
+            </a:extLst>
+          </a:blip>
+          <a:srcRect/>
+          <a:stretch>
+            <a:fillRect/>
+          </a:stretch>
+        </p:blipFill>
+        <p:spPr bwMode="auto">
+          <a:xfrm>
+            <a:off x="10778771" y="6104958"/>
+            <a:ext cx="1383137" cy="726147"/>
+          </a:xfrm>
+          <a:prstGeom prst="rect">
+            <a:avLst/>
+          </a:prstGeom>
+          <a:noFill/>
+          <a:extLst>
+            <a:ext uri="{909E8E84-426E-40DD-AFC4-6F175D3DCCD1}">
+              <a14:hiddenFill xmlns:a14="http://schemas.microsoft.com/office/drawing/2010/main">
+                <a:solidFill>
+                  <a:srgbClr val="FFFFFF"/>
+                </a:solidFill>
+              </a14:hiddenFill>
+            </a:ext>
+          </a:extLst>
+        </p:spPr>
+      </p:pic>
     </p:spTree>
     <p:extLst>
       <p:ext uri="{BB962C8B-B14F-4D97-AF65-F5344CB8AC3E}">
@@ -16148,6 +17415,53 @@
           </a:p>
         </p:txBody>
       </p:sp>
+      <p:pic>
+        <p:nvPicPr>
+          <p:cNvPr id="10" name="Picture 2" descr="Home | FritoLay">
+            <a:extLst>
+              <a:ext uri="{FF2B5EF4-FFF2-40B4-BE49-F238E27FC236}">
+                <a16:creationId xmlns:a16="http://schemas.microsoft.com/office/drawing/2014/main" id="{58C160A4-1C02-FA4C-86A0-10D1F6097A59}"/>
+              </a:ext>
+            </a:extLst>
+          </p:cNvPr>
+          <p:cNvPicPr>
+            <a:picLocks noChangeAspect="1" noChangeArrowheads="1"/>
+          </p:cNvPicPr>
+          <p:nvPr/>
+        </p:nvPicPr>
+        <p:blipFill>
+          <a:blip r:embed="rId3">
+            <a:extLst>
+              <a:ext uri="{28A0092B-C50C-407E-A947-70E740481C1C}">
+                <a14:useLocalDpi xmlns:a14="http://schemas.microsoft.com/office/drawing/2010/main" val="0"/>
+              </a:ext>
+            </a:extLst>
+          </a:blip>
+          <a:srcRect/>
+          <a:stretch>
+            <a:fillRect/>
+          </a:stretch>
+        </p:blipFill>
+        <p:spPr bwMode="auto">
+          <a:xfrm>
+            <a:off x="10778771" y="6104958"/>
+            <a:ext cx="1383137" cy="726147"/>
+          </a:xfrm>
+          <a:prstGeom prst="rect">
+            <a:avLst/>
+          </a:prstGeom>
+          <a:noFill/>
+          <a:extLst>
+            <a:ext uri="{909E8E84-426E-40DD-AFC4-6F175D3DCCD1}">
+              <a14:hiddenFill xmlns:a14="http://schemas.microsoft.com/office/drawing/2010/main">
+                <a:solidFill>
+                  <a:srgbClr val="FFFFFF"/>
+                </a:solidFill>
+              </a14:hiddenFill>
+            </a:ext>
+          </a:extLst>
+        </p:spPr>
+      </p:pic>
     </p:spTree>
     <p:extLst>
       <p:ext uri="{BB962C8B-B14F-4D97-AF65-F5344CB8AC3E}">

</xml_diff>